<commit_message>
Add last UC-Documentation and Updates FP Calc
</commit_message>
<xml_diff>
--- a/Documentation/Final/Final_PPt_BFFL.pptx
+++ b/Documentation/Final/Final_PPt_BFFL.pptx
@@ -206,12 +206,12 @@
           </c:marker>
           <c:xVal>
             <c:numRef>
-              <c:f>Chart!$N$4:$N$9</c:f>
+              <c:f>Chart!$N$4:$N$10</c:f>
               <c:numCache>
                 <c:formatCode>0.00</c:formatCode>
-                <c:ptCount val="6"/>
+                <c:ptCount val="7"/>
                 <c:pt idx="0">
-                  <c:v>0</c:v>
+                  <c:v>0.74650000000000005</c:v>
                 </c:pt>
                 <c:pt idx="1">
                   <c:v>6.5</c:v>
@@ -225,15 +225,18 @@
                 <c:pt idx="4">
                   <c:v>34.75</c:v>
                 </c:pt>
+                <c:pt idx="5">
+                  <c:v>50</c:v>
+                </c:pt>
               </c:numCache>
             </c:numRef>
           </c:xVal>
           <c:yVal>
             <c:numRef>
-              <c:f>Chart!$O$4:$O$9</c:f>
+              <c:f>Chart!$O$4:$O$10</c:f>
               <c:numCache>
                 <c:formatCode>0.00</c:formatCode>
-                <c:ptCount val="6"/>
+                <c:ptCount val="7"/>
                 <c:pt idx="0">
                   <c:v>0</c:v>
                 </c:pt>
@@ -249,72 +252,8 @@
                 <c:pt idx="4">
                   <c:v>48.51</c:v>
                 </c:pt>
-              </c:numCache>
-            </c:numRef>
-          </c:yVal>
-          <c:smooth val="0"/>
-          <c:extLst>
-            <c:ext xmlns:c16="http://schemas.microsoft.com/office/drawing/2014/chart" uri="{C3380CC4-5D6E-409C-BE32-E72D297353CC}">
-              <c16:uniqueId val="{00000000-D4FE-0D49-B855-D1633A349DC8}"/>
-            </c:ext>
-          </c:extLst>
-        </c:ser>
-        <c:ser>
-          <c:idx val="1"/>
-          <c:order val="1"/>
-          <c:tx>
-            <c:v>Unfinished UCs</c:v>
-          </c:tx>
-          <c:spPr>
-            <a:ln w="25400" cap="flat" cmpd="dbl" algn="ctr">
-              <a:noFill/>
-              <a:round/>
-            </a:ln>
-            <a:effectLst/>
-          </c:spPr>
-          <c:marker>
-            <c:symbol val="circle"/>
-            <c:size val="6"/>
-            <c:spPr>
-              <a:noFill/>
-              <a:ln w="34925" cap="flat" cmpd="dbl" algn="ctr">
-                <a:solidFill>
-                  <a:schemeClr val="accent2">
-                    <a:lumMod val="75000"/>
-                    <a:alpha val="70000"/>
-                  </a:schemeClr>
-                </a:solidFill>
-                <a:round/>
-              </a:ln>
-              <a:effectLst/>
-            </c:spPr>
-          </c:marker>
-          <c:xVal>
-            <c:numRef>
-              <c:f>Chart!$N$11:$N$13</c:f>
-              <c:numCache>
-                <c:formatCode>General</c:formatCode>
-                <c:ptCount val="3"/>
-                <c:pt idx="0" formatCode="0.00">
-                  <c:v>81</c:v>
-                </c:pt>
-                <c:pt idx="2" formatCode="0.00">
-                  <c:v>37.5</c:v>
-                </c:pt>
-              </c:numCache>
-            </c:numRef>
-          </c:xVal>
-          <c:yVal>
-            <c:numRef>
-              <c:f>Chart!$O$11:$O$13</c:f>
-              <c:numCache>
-                <c:formatCode>General</c:formatCode>
-                <c:ptCount val="3"/>
-                <c:pt idx="0" formatCode="0.00">
+                <c:pt idx="5">
                   <c:v>107.91</c:v>
-                </c:pt>
-                <c:pt idx="2" formatCode="0.00">
-                  <c:v>49.5</c:v>
                 </c:pt>
               </c:numCache>
             </c:numRef>
@@ -322,13 +261,13 @@
           <c:smooth val="0"/>
           <c:extLst>
             <c:ext xmlns:c16="http://schemas.microsoft.com/office/drawing/2014/chart" uri="{C3380CC4-5D6E-409C-BE32-E72D297353CC}">
-              <c16:uniqueId val="{00000001-D4FE-0D49-B855-D1633A349DC8}"/>
+              <c16:uniqueId val="{00000000-5A07-F14B-AB3B-AF69D52A9E74}"/>
             </c:ext>
           </c:extLst>
         </c:ser>
         <c:ser>
           <c:idx val="2"/>
-          <c:order val="2"/>
+          <c:order val="1"/>
           <c:tx>
             <c:v>Avg</c:v>
           </c:tx>
@@ -362,24 +301,24 @@
           </c:marker>
           <c:xVal>
             <c:numRef>
-              <c:f>Chart!$N$15:$N$16</c:f>
+              <c:f>Chart!$N$16:$N$17</c:f>
               <c:numCache>
-                <c:formatCode>0.00</c:formatCode>
+                <c:formatCode>#,##0.00</c:formatCode>
                 <c:ptCount val="2"/>
                 <c:pt idx="0">
-                  <c:v>0</c:v>
+                  <c:v>0.74650000000000005</c:v>
                 </c:pt>
                 <c:pt idx="1">
-                  <c:v>90</c:v>
+                  <c:v>68.110299999999995</c:v>
                 </c:pt>
               </c:numCache>
             </c:numRef>
           </c:xVal>
           <c:yVal>
             <c:numRef>
-              <c:f>Chart!$O$15:$O$16</c:f>
+              <c:f>Chart!$O$16:$O$17</c:f>
               <c:numCache>
-                <c:formatCode>0.00</c:formatCode>
+                <c:formatCode>#,##0.00</c:formatCode>
                 <c:ptCount val="2"/>
                 <c:pt idx="0">
                   <c:v>0</c:v>
@@ -393,7 +332,68 @@
           <c:smooth val="0"/>
           <c:extLst>
             <c:ext xmlns:c16="http://schemas.microsoft.com/office/drawing/2014/chart" uri="{C3380CC4-5D6E-409C-BE32-E72D297353CC}">
-              <c16:uniqueId val="{00000002-D4FE-0D49-B855-D1633A349DC8}"/>
+              <c16:uniqueId val="{00000001-5A07-F14B-AB3B-AF69D52A9E74}"/>
+            </c:ext>
+          </c:extLst>
+        </c:ser>
+        <c:ser>
+          <c:idx val="1"/>
+          <c:order val="2"/>
+          <c:tx>
+            <c:v>Unfinished UCs (Update)</c:v>
+          </c:tx>
+          <c:spPr>
+            <a:ln w="25400" cap="flat" cmpd="dbl" algn="ctr">
+              <a:noFill/>
+              <a:round/>
+            </a:ln>
+            <a:effectLst/>
+          </c:spPr>
+          <c:marker>
+            <c:symbol val="circle"/>
+            <c:size val="6"/>
+            <c:spPr>
+              <a:noFill/>
+              <a:ln w="34925" cap="flat" cmpd="dbl" algn="ctr">
+                <a:solidFill>
+                  <a:schemeClr val="accent2">
+                    <a:lumMod val="75000"/>
+                    <a:alpha val="70000"/>
+                  </a:schemeClr>
+                </a:solidFill>
+                <a:round/>
+              </a:ln>
+              <a:effectLst/>
+            </c:spPr>
+          </c:marker>
+          <c:xVal>
+            <c:numRef>
+              <c:f>Chart!$N$12</c:f>
+              <c:numCache>
+                <c:formatCode>0.00</c:formatCode>
+                <c:ptCount val="1"/>
+                <c:pt idx="0">
+                  <c:v>28.534099999999999</c:v>
+                </c:pt>
+              </c:numCache>
+            </c:numRef>
+          </c:xVal>
+          <c:yVal>
+            <c:numRef>
+              <c:f>Chart!$O$12</c:f>
+              <c:numCache>
+                <c:formatCode>0.00</c:formatCode>
+                <c:ptCount val="1"/>
+                <c:pt idx="0">
+                  <c:v>49.5</c:v>
+                </c:pt>
+              </c:numCache>
+            </c:numRef>
+          </c:yVal>
+          <c:smooth val="0"/>
+          <c:extLst>
+            <c:ext xmlns:c16="http://schemas.microsoft.com/office/drawing/2014/chart" uri="{C3380CC4-5D6E-409C-BE32-E72D297353CC}">
+              <c16:uniqueId val="{00000002-5A07-F14B-AB3B-AF69D52A9E74}"/>
             </c:ext>
           </c:extLst>
         </c:ser>
@@ -412,7 +412,7 @@
         <c:axId val="2037849375"/>
         <c:scaling>
           <c:orientation val="minMax"/>
-          <c:max val="180"/>
+          <c:max val="120"/>
         </c:scaling>
         <c:delete val="0"/>
         <c:axPos val="b"/>
@@ -464,14 +464,18 @@
                   </a:defRPr>
                 </a:pPr>
                 <a:r>
-                  <a:rPr lang="de-DE" sz="1200"/>
+                  <a:rPr lang="de-DE" sz="1200" dirty="0"/>
                   <a:t>Time</a:t>
                 </a:r>
                 <a:r>
-                  <a:rPr lang="de-DE" sz="1200" baseline="0"/>
-                  <a:t> Spent</a:t>
+                  <a:rPr lang="de-DE" sz="1200" baseline="0" dirty="0"/>
+                  <a:t> </a:t>
                 </a:r>
-                <a:endParaRPr lang="de-DE" sz="1200"/>
+                <a:r>
+                  <a:rPr lang="de-DE" sz="1200" baseline="0" dirty="0" err="1"/>
+                  <a:t>Spent</a:t>
+                </a:r>
+                <a:endParaRPr lang="de-DE" sz="1200" dirty="0"/>
               </a:p>
             </c:rich>
           </c:tx>
@@ -479,8 +483,8 @@
             <c:manualLayout>
               <c:xMode val="edge"/>
               <c:yMode val="edge"/>
-              <c:x val="0.4119533630287473"/>
-              <c:y val="0.94732577788745143"/>
+              <c:x val="0.76220011499314266"/>
+              <c:y val="0.89201726974624329"/>
             </c:manualLayout>
           </c:layout>
           <c:overlay val="0"/>
@@ -688,7 +692,7 @@
         <c:crossAx val="2037849375"/>
         <c:crosses val="autoZero"/>
         <c:crossBetween val="midCat"/>
-        <c:majorUnit val="5"/>
+        <c:majorUnit val="10"/>
         <c:minorUnit val="1"/>
       </c:valAx>
       <c:spPr>
@@ -701,13 +705,33 @@
     </c:plotArea>
     <c:legend>
       <c:legendPos val="r"/>
+      <c:layout>
+        <c:manualLayout>
+          <c:xMode val="edge"/>
+          <c:yMode val="edge"/>
+          <c:x val="0.42061179541049526"/>
+          <c:y val="0.65819413820841532"/>
+          <c:w val="0.28690893648857368"/>
+          <c:h val="0.19866069281855317"/>
+        </c:manualLayout>
+      </c:layout>
       <c:overlay val="0"/>
       <c:spPr>
-        <a:noFill/>
+        <a:solidFill>
+          <a:schemeClr val="bg1"/>
+        </a:solidFill>
         <a:ln>
-          <a:noFill/>
+          <a:solidFill>
+            <a:schemeClr val="tx1"/>
+          </a:solidFill>
         </a:ln>
-        <a:effectLst/>
+        <a:effectLst>
+          <a:outerShdw blurRad="50800" dist="38100" dir="2700000" algn="tl" rotWithShape="0">
+            <a:prstClr val="black">
+              <a:alpha val="40000"/>
+            </a:prstClr>
+          </a:outerShdw>
+        </a:effectLst>
       </c:spPr>
       <c:txPr>
         <a:bodyPr rot="0" spcFirstLastPara="1" vertOverflow="ellipsis" vert="horz" wrap="square" anchor="ctr" anchorCtr="1"/>
@@ -1402,7 +1426,7 @@
           <a:p>
             <a:fld id="{063E352A-7D20-8B43-87E5-0D9E60B473DC}" type="datetimeFigureOut">
               <a:rPr lang="de-DE" smtClean="0"/>
-              <a:t>13.06.21</a:t>
+              <a:t>16.06.21</a:t>
             </a:fld>
             <a:endParaRPr lang="de-DE"/>
           </a:p>
@@ -8576,7 +8600,7 @@
         <p:spPr>
           <a:xfrm>
             <a:off x="1740625" y="1795082"/>
-            <a:ext cx="4038383" cy="4203381"/>
+            <a:ext cx="4958558" cy="4203381"/>
           </a:xfrm>
           <a:prstGeom prst="rect">
             <a:avLst/>
@@ -8606,21 +8630,16 @@
             </a:r>
             <a:r>
               <a:rPr lang="de-DE" sz="2200" dirty="0"/>
-              <a:t> </a:t>
+              <a:t> finish Update-</a:t>
             </a:r>
             <a:r>
               <a:rPr lang="de-DE" sz="2200" dirty="0" err="1"/>
-              <a:t>unfinished</a:t>
+              <a:t>ShortURL</a:t>
             </a:r>
             <a:r>
               <a:rPr lang="de-DE" sz="2200" dirty="0"/>
-              <a:t> </a:t>
-            </a:r>
-            <a:r>
-              <a:rPr lang="de-DE" sz="2200" dirty="0" err="1"/>
-              <a:t>tasks</a:t>
-            </a:r>
-            <a:endParaRPr lang="de-DE" sz="2200" dirty="0"/>
+              <a:t>-UC</a:t>
+            </a:r>
           </a:p>
           <a:p>
             <a:pPr marL="457200" indent="-457200">
@@ -8776,7 +8795,7 @@
       </p:sp>
       <p:graphicFrame>
         <p:nvGraphicFramePr>
-          <p:cNvPr id="5" name="Diagramm 4">
+          <p:cNvPr id="8" name="Diagramm 7">
             <a:extLst>
               <a:ext uri="{FF2B5EF4-FFF2-40B4-BE49-F238E27FC236}">
                 <a16:creationId xmlns:a16="http://schemas.microsoft.com/office/drawing/2014/main" id="{EDD22EA7-648F-634D-9847-622DCE0C437A}"/>
@@ -8789,14 +8808,14 @@
           <p:nvPr>
             <p:extLst>
               <p:ext uri="{D42A27DB-BD31-4B8C-83A1-F6EECF244321}">
-                <p14:modId xmlns:p14="http://schemas.microsoft.com/office/powerpoint/2010/main" val="3308027232"/>
+                <p14:modId xmlns:p14="http://schemas.microsoft.com/office/powerpoint/2010/main" val="767520141"/>
               </p:ext>
             </p:extLst>
           </p:nvPr>
         </p:nvGraphicFramePr>
         <p:xfrm>
-          <a:off x="1048203" y="1083972"/>
-          <a:ext cx="7509838" cy="5202144"/>
+          <a:off x="1243173" y="1001014"/>
+          <a:ext cx="7650891" cy="5510909"/>
         </p:xfrm>
         <a:graphic>
           <a:graphicData uri="http://schemas.openxmlformats.org/drawingml/2006/chart">
@@ -8818,7 +8837,7 @@
         </p:nvSpPr>
         <p:spPr>
           <a:xfrm>
-            <a:off x="6501385" y="1111404"/>
+            <a:off x="6398783" y="1103849"/>
             <a:ext cx="1883663" cy="582978"/>
           </a:xfrm>
           <a:prstGeom prst="rect">

</xml_diff>

<commit_message>
- Invalid TargetURL Fix - Default of Flags in create set to true - Final Docs adjustments
</commit_message>
<xml_diff>
--- a/Documentation/Final/Final_PPt_BFFL.pptx
+++ b/Documentation/Final/Final_PPt_BFFL.pptx
@@ -5,34 +5,35 @@
     <p:sldMasterId id="2147483650" r:id="rId1"/>
   </p:sldMasterIdLst>
   <p:notesMasterIdLst>
-    <p:notesMasterId r:id="rId27"/>
+    <p:notesMasterId r:id="rId28"/>
   </p:notesMasterIdLst>
   <p:sldIdLst>
     <p:sldId id="256" r:id="rId2"/>
     <p:sldId id="259" r:id="rId3"/>
     <p:sldId id="258" r:id="rId4"/>
-    <p:sldId id="275" r:id="rId5"/>
-    <p:sldId id="261" r:id="rId6"/>
-    <p:sldId id="262" r:id="rId7"/>
-    <p:sldId id="285" r:id="rId8"/>
-    <p:sldId id="273" r:id="rId9"/>
-    <p:sldId id="274" r:id="rId10"/>
-    <p:sldId id="278" r:id="rId11"/>
-    <p:sldId id="289" r:id="rId12"/>
-    <p:sldId id="282" r:id="rId13"/>
-    <p:sldId id="280" r:id="rId14"/>
-    <p:sldId id="286" r:id="rId15"/>
-    <p:sldId id="276" r:id="rId16"/>
-    <p:sldId id="265" r:id="rId17"/>
-    <p:sldId id="281" r:id="rId18"/>
-    <p:sldId id="277" r:id="rId19"/>
-    <p:sldId id="287" r:id="rId20"/>
-    <p:sldId id="288" r:id="rId21"/>
-    <p:sldId id="266" r:id="rId22"/>
-    <p:sldId id="279" r:id="rId23"/>
-    <p:sldId id="268" r:id="rId24"/>
-    <p:sldId id="260" r:id="rId25"/>
-    <p:sldId id="283" r:id="rId26"/>
+    <p:sldId id="261" r:id="rId5"/>
+    <p:sldId id="275" r:id="rId6"/>
+    <p:sldId id="290" r:id="rId7"/>
+    <p:sldId id="262" r:id="rId8"/>
+    <p:sldId id="285" r:id="rId9"/>
+    <p:sldId id="273" r:id="rId10"/>
+    <p:sldId id="274" r:id="rId11"/>
+    <p:sldId id="278" r:id="rId12"/>
+    <p:sldId id="289" r:id="rId13"/>
+    <p:sldId id="282" r:id="rId14"/>
+    <p:sldId id="280" r:id="rId15"/>
+    <p:sldId id="286" r:id="rId16"/>
+    <p:sldId id="276" r:id="rId17"/>
+    <p:sldId id="277" r:id="rId18"/>
+    <p:sldId id="265" r:id="rId19"/>
+    <p:sldId id="281" r:id="rId20"/>
+    <p:sldId id="287" r:id="rId21"/>
+    <p:sldId id="288" r:id="rId22"/>
+    <p:sldId id="266" r:id="rId23"/>
+    <p:sldId id="279" r:id="rId24"/>
+    <p:sldId id="268" r:id="rId25"/>
+    <p:sldId id="260" r:id="rId26"/>
+    <p:sldId id="283" r:id="rId27"/>
   </p:sldIdLst>
   <p:sldSz cx="9144000" cy="6858000" type="screen4x3"/>
   <p:notesSz cx="6858000" cy="9144000"/>
@@ -1426,7 +1427,7 @@
           <a:p>
             <a:fld id="{063E352A-7D20-8B43-87E5-0D9E60B473DC}" type="datetimeFigureOut">
               <a:rPr lang="de-DE" smtClean="0"/>
-              <a:t>16.06.21</a:t>
+              <a:t>17.06.21</a:t>
             </a:fld>
             <a:endParaRPr lang="de-DE"/>
           </a:p>
@@ -2962,45 +2963,120 @@
           </a:p>
         </p:txBody>
       </p:sp>
+      <p:sp>
+        <p:nvSpPr>
+          <p:cNvPr id="4" name="Rectangle 4">
+            <a:extLst>
+              <a:ext uri="{FF2B5EF4-FFF2-40B4-BE49-F238E27FC236}">
+                <a16:creationId xmlns:a16="http://schemas.microsoft.com/office/drawing/2014/main" id="{F57316E5-6B89-F241-8AE3-17754E5811B3}"/>
+              </a:ext>
+            </a:extLst>
+          </p:cNvPr>
+          <p:cNvSpPr>
+            <a:spLocks noChangeArrowheads="1"/>
+          </p:cNvSpPr>
+          <p:nvPr/>
+        </p:nvSpPr>
+        <p:spPr bwMode="auto">
+          <a:xfrm>
+            <a:off x="914400" y="1287480"/>
+            <a:ext cx="9144000" cy="0"/>
+          </a:xfrm>
+          <a:prstGeom prst="rect">
+            <a:avLst/>
+          </a:prstGeom>
+          <a:noFill/>
+          <a:ln>
+            <a:noFill/>
+          </a:ln>
+          <a:effectLst/>
+          <a:extLst>
+            <a:ext uri="{909E8E84-426E-40DD-AFC4-6F175D3DCCD1}">
+              <a14:hiddenFill xmlns:a14="http://schemas.microsoft.com/office/drawing/2010/main">
+                <a:solidFill>
+                  <a:schemeClr val="accent1"/>
+                </a:solidFill>
+              </a14:hiddenFill>
+            </a:ext>
+            <a:ext uri="{91240B29-F687-4F45-9708-019B960494DF}">
+              <a14:hiddenLine xmlns:a14="http://schemas.microsoft.com/office/drawing/2010/main" w="9525">
+                <a:solidFill>
+                  <a:schemeClr val="tx1"/>
+                </a:solidFill>
+                <a:miter lim="800000"/>
+                <a:headEnd/>
+                <a:tailEnd/>
+              </a14:hiddenLine>
+            </a:ext>
+            <a:ext uri="{AF507438-7753-43E0-B8FC-AC1667EBCBE1}">
+              <a14:hiddenEffects xmlns:a14="http://schemas.microsoft.com/office/drawing/2010/main">
+                <a:effectLst>
+                  <a:outerShdw dist="35921" dir="2700000" algn="ctr" rotWithShape="0">
+                    <a:schemeClr val="bg2"/>
+                  </a:outerShdw>
+                </a:effectLst>
+              </a14:hiddenEffects>
+            </a:ext>
+          </a:extLst>
+        </p:spPr>
+        <p:txBody>
+          <a:bodyPr vert="horz" wrap="none" lIns="91440" tIns="45720" rIns="91440" bIns="45720" numCol="1" anchor="ctr" anchorCtr="0" compatLnSpc="1">
+            <a:prstTxWarp prst="textNoShape">
+              <a:avLst/>
+            </a:prstTxWarp>
+            <a:spAutoFit/>
+          </a:bodyPr>
+          <a:lstStyle/>
+          <a:p>
+            <a:endParaRPr lang="de-DE"/>
+          </a:p>
+        </p:txBody>
+      </p:sp>
       <p:pic>
         <p:nvPicPr>
-          <p:cNvPr id="4" name="Grafik 3">
+          <p:cNvPr id="1026" name="Picture 2" descr="Anklicken für Vergrößerung">
             <a:extLst>
               <a:ext uri="{FF2B5EF4-FFF2-40B4-BE49-F238E27FC236}">
-                <a16:creationId xmlns:a16="http://schemas.microsoft.com/office/drawing/2014/main" id="{FC72999A-AF86-8742-B90B-98C8F238D9AA}"/>
+                <a16:creationId xmlns:a16="http://schemas.microsoft.com/office/drawing/2014/main" id="{9094F91D-4FA3-8D4C-B360-3B8B01B0518A}"/>
               </a:ext>
             </a:extLst>
           </p:cNvPr>
           <p:cNvPicPr>
-            <a:picLocks noChangeAspect="1"/>
+            <a:picLocks noChangeAspect="1" noChangeArrowheads="1"/>
           </p:cNvPicPr>
           <p:nvPr/>
         </p:nvPicPr>
-        <p:blipFill rotWithShape="1">
-          <a:blip r:embed="rId2"/>
-          <a:srcRect b="17511"/>
-          <a:stretch/>
+        <p:blipFill>
+          <a:blip r:embed="rId2">
+            <a:extLst>
+              <a:ext uri="{28A0092B-C50C-407E-A947-70E740481C1C}">
+                <a14:useLocalDpi xmlns:a14="http://schemas.microsoft.com/office/drawing/2010/main" val="0"/>
+              </a:ext>
+            </a:extLst>
+          </a:blip>
+          <a:srcRect/>
+          <a:stretch>
+            <a:fillRect/>
+          </a:stretch>
         </p:blipFill>
-        <p:spPr>
+        <p:spPr bwMode="auto">
           <a:xfrm>
-            <a:off x="450850" y="1514665"/>
-            <a:ext cx="8242300" cy="4043773"/>
+            <a:off x="1509983" y="1443927"/>
+            <a:ext cx="5907958" cy="3970145"/>
           </a:xfrm>
           <a:prstGeom prst="rect">
             <a:avLst/>
           </a:prstGeom>
-          <a:ln>
-            <a:solidFill>
-              <a:schemeClr val="tx1"/>
-            </a:solidFill>
-          </a:ln>
-          <a:effectLst>
-            <a:outerShdw blurRad="50800" dist="38100" dir="2700000" algn="tl" rotWithShape="0">
-              <a:prstClr val="black">
-                <a:alpha val="40000"/>
-              </a:prstClr>
-            </a:outerShdw>
-          </a:effectLst>
+          <a:noFill/>
+          <a:extLst>
+            <a:ext uri="{909E8E84-426E-40DD-AFC4-6F175D3DCCD1}">
+              <a14:hiddenFill xmlns:a14="http://schemas.microsoft.com/office/drawing/2010/main">
+                <a:solidFill>
+                  <a:srgbClr val="FFFFFF"/>
+                </a:solidFill>
+              </a14:hiddenFill>
+            </a:ext>
+          </a:extLst>
         </p:spPr>
       </p:pic>
       <p:sp>
@@ -3008,7 +3084,7 @@
           <p:cNvPr id="5" name="Textfeld 4">
             <a:extLst>
               <a:ext uri="{FF2B5EF4-FFF2-40B4-BE49-F238E27FC236}">
-                <a16:creationId xmlns:a16="http://schemas.microsoft.com/office/drawing/2014/main" id="{8F6FA906-A584-414F-AB5B-64DA56FA5F4E}"/>
+                <a16:creationId xmlns:a16="http://schemas.microsoft.com/office/drawing/2014/main" id="{B1630FE8-6DF2-6B49-B892-74F44C67E8CE}"/>
               </a:ext>
             </a:extLst>
           </p:cNvPr>
@@ -3017,8 +3093,52 @@
         </p:nvSpPr>
         <p:spPr>
           <a:xfrm>
-            <a:off x="7537452" y="1444574"/>
-            <a:ext cx="1246952" cy="563392"/>
+            <a:off x="1509983" y="5506538"/>
+            <a:ext cx="5907957" cy="369332"/>
+          </a:xfrm>
+          <a:prstGeom prst="rect">
+            <a:avLst/>
+          </a:prstGeom>
+          <a:noFill/>
+        </p:spPr>
+        <p:txBody>
+          <a:bodyPr wrap="square" rtlCol="0">
+            <a:spAutoFit/>
+          </a:bodyPr>
+          <a:lstStyle/>
+          <a:p>
+            <a:pPr algn="ctr"/>
+            <a:r>
+              <a:rPr lang="de-DE" dirty="0"/>
+              <a:t>Torsten Horn (</a:t>
+            </a:r>
+            <a:r>
+              <a:rPr lang="de-DE" dirty="0" err="1"/>
+              <a:t>ed</a:t>
+            </a:r>
+            <a:r>
+              <a:rPr lang="de-DE" dirty="0"/>
+              <a:t>.)</a:t>
+            </a:r>
+          </a:p>
+        </p:txBody>
+      </p:sp>
+      <p:sp>
+        <p:nvSpPr>
+          <p:cNvPr id="7" name="Textfeld 6">
+            <a:extLst>
+              <a:ext uri="{FF2B5EF4-FFF2-40B4-BE49-F238E27FC236}">
+                <a16:creationId xmlns:a16="http://schemas.microsoft.com/office/drawing/2014/main" id="{BC99AA30-942B-B045-BACC-31A7EA37ECE8}"/>
+              </a:ext>
+            </a:extLst>
+          </p:cNvPr>
+          <p:cNvSpPr txBox="1"/>
+          <p:nvPr/>
+        </p:nvSpPr>
+        <p:spPr>
+          <a:xfrm>
+            <a:off x="7162814" y="1339141"/>
+            <a:ext cx="942405" cy="518910"/>
           </a:xfrm>
           <a:prstGeom prst="rect">
             <a:avLst/>
@@ -3047,17 +3167,16 @@
           <a:p>
             <a:pPr algn="ctr"/>
             <a:r>
-              <a:rPr lang="de-DE" sz="2000" dirty="0" err="1"/>
-              <a:t>Youtrack</a:t>
-            </a:r>
-            <a:endParaRPr lang="de-DE" sz="2000" dirty="0"/>
+              <a:rPr lang="de-DE" sz="2000" dirty="0"/>
+              <a:t>RUP</a:t>
+            </a:r>
           </a:p>
         </p:txBody>
       </p:sp>
     </p:spTree>
     <p:extLst>
       <p:ext uri="{BB962C8B-B14F-4D97-AF65-F5344CB8AC3E}">
-        <p14:creationId xmlns:p14="http://schemas.microsoft.com/office/powerpoint/2010/main" val="107337322"/>
+        <p14:creationId xmlns:p14="http://schemas.microsoft.com/office/powerpoint/2010/main" val="1516665296"/>
       </p:ext>
     </p:extLst>
   </p:cSld>
@@ -3171,12 +3290,53 @@
           </a:p>
         </p:txBody>
       </p:sp>
+      <p:pic>
+        <p:nvPicPr>
+          <p:cNvPr id="4" name="Grafik 3">
+            <a:extLst>
+              <a:ext uri="{FF2B5EF4-FFF2-40B4-BE49-F238E27FC236}">
+                <a16:creationId xmlns:a16="http://schemas.microsoft.com/office/drawing/2014/main" id="{FC72999A-AF86-8742-B90B-98C8F238D9AA}"/>
+              </a:ext>
+            </a:extLst>
+          </p:cNvPr>
+          <p:cNvPicPr>
+            <a:picLocks noChangeAspect="1"/>
+          </p:cNvPicPr>
+          <p:nvPr/>
+        </p:nvPicPr>
+        <p:blipFill rotWithShape="1">
+          <a:blip r:embed="rId2"/>
+          <a:srcRect b="17511"/>
+          <a:stretch/>
+        </p:blipFill>
+        <p:spPr>
+          <a:xfrm>
+            <a:off x="450850" y="1514665"/>
+            <a:ext cx="8242300" cy="4043773"/>
+          </a:xfrm>
+          <a:prstGeom prst="rect">
+            <a:avLst/>
+          </a:prstGeom>
+          <a:ln>
+            <a:solidFill>
+              <a:schemeClr val="tx1"/>
+            </a:solidFill>
+          </a:ln>
+          <a:effectLst>
+            <a:outerShdw blurRad="50800" dist="38100" dir="2700000" algn="tl" rotWithShape="0">
+              <a:prstClr val="black">
+                <a:alpha val="40000"/>
+              </a:prstClr>
+            </a:outerShdw>
+          </a:effectLst>
+        </p:spPr>
+      </p:pic>
       <p:sp>
         <p:nvSpPr>
-          <p:cNvPr id="7" name="Textfeld 6">
+          <p:cNvPr id="5" name="Textfeld 4">
             <a:extLst>
               <a:ext uri="{FF2B5EF4-FFF2-40B4-BE49-F238E27FC236}">
-                <a16:creationId xmlns:a16="http://schemas.microsoft.com/office/drawing/2014/main" id="{15278564-DF98-A64E-829D-790774920688}"/>
+                <a16:creationId xmlns:a16="http://schemas.microsoft.com/office/drawing/2014/main" id="{8F6FA906-A584-414F-AB5B-64DA56FA5F4E}"/>
               </a:ext>
             </a:extLst>
           </p:cNvPr>
@@ -3185,13 +3345,27 @@
         </p:nvSpPr>
         <p:spPr>
           <a:xfrm>
-            <a:off x="660881" y="2032605"/>
-            <a:ext cx="7822236" cy="1056657"/>
+            <a:off x="7537452" y="1444574"/>
+            <a:ext cx="1246952" cy="563392"/>
           </a:xfrm>
           <a:prstGeom prst="rect">
             <a:avLst/>
           </a:prstGeom>
-          <a:noFill/>
+          <a:solidFill>
+            <a:schemeClr val="bg1"/>
+          </a:solidFill>
+          <a:ln>
+            <a:solidFill>
+              <a:schemeClr val="tx1"/>
+            </a:solidFill>
+          </a:ln>
+          <a:effectLst>
+            <a:outerShdw blurRad="50800" dist="38100" dir="2700000" algn="tl" rotWithShape="0">
+              <a:prstClr val="black">
+                <a:alpha val="40000"/>
+              </a:prstClr>
+            </a:outerShdw>
+          </a:effectLst>
         </p:spPr>
         <p:txBody>
           <a:bodyPr wrap="square" rtlCol="0" anchor="ctr" anchorCtr="0">
@@ -3199,188 +3373,19 @@
           </a:bodyPr>
           <a:lstStyle/>
           <a:p>
-            <a:pPr>
-              <a:lnSpc>
-                <a:spcPts val="3500"/>
-              </a:lnSpc>
-            </a:pPr>
-            <a:r>
-              <a:rPr lang="de-DE" sz="2000" dirty="0"/>
-              <a:t>In </a:t>
-            </a:r>
+            <a:pPr algn="ctr"/>
             <a:r>
               <a:rPr lang="de-DE" sz="2000" dirty="0" err="1"/>
-              <a:t>addition</a:t>
-            </a:r>
-            <a:r>
-              <a:rPr lang="de-DE" sz="2000" dirty="0"/>
-              <a:t> </a:t>
-            </a:r>
-            <a:r>
-              <a:rPr lang="de-DE" sz="2000" dirty="0" err="1"/>
-              <a:t>to</a:t>
-            </a:r>
-            <a:r>
-              <a:rPr lang="de-DE" sz="2000" dirty="0"/>
-              <a:t> traditional </a:t>
-            </a:r>
-            <a:r>
-              <a:rPr lang="de-DE" sz="2000" dirty="0" err="1"/>
-              <a:t>documentation</a:t>
-            </a:r>
-            <a:r>
-              <a:rPr lang="de-DE" sz="2000" dirty="0"/>
-              <a:t> </a:t>
-            </a:r>
-            <a:r>
-              <a:rPr lang="de-DE" sz="2000" dirty="0" err="1"/>
-              <a:t>of</a:t>
-            </a:r>
-            <a:r>
-              <a:rPr lang="de-DE" sz="2000" dirty="0"/>
-              <a:t> </a:t>
-            </a:r>
-            <a:r>
-              <a:rPr lang="de-DE" sz="2000" dirty="0" err="1"/>
-              <a:t>project</a:t>
-            </a:r>
-            <a:r>
-              <a:rPr lang="de-DE" sz="2000" dirty="0"/>
-              <a:t> </a:t>
-            </a:r>
-            <a:r>
-              <a:rPr lang="de-DE" sz="2000" dirty="0" err="1"/>
-              <a:t>planning</a:t>
-            </a:r>
-            <a:r>
-              <a:rPr lang="de-DE" sz="2000" dirty="0"/>
-              <a:t> </a:t>
-            </a:r>
-            <a:br>
-              <a:rPr lang="de-DE" sz="2000" dirty="0"/>
-            </a:br>
-            <a:r>
-              <a:rPr lang="de-DE" sz="2000" dirty="0"/>
-              <a:t>(e. g. </a:t>
-            </a:r>
-            <a:r>
-              <a:rPr lang="de-DE" sz="2000" dirty="0" err="1"/>
-              <a:t>requirements</a:t>
-            </a:r>
-            <a:r>
-              <a:rPr lang="de-DE" sz="2000" dirty="0"/>
-              <a:t>- </a:t>
-            </a:r>
-            <a:r>
-              <a:rPr lang="de-DE" sz="2000" dirty="0" err="1"/>
-              <a:t>and</a:t>
-            </a:r>
-            <a:r>
-              <a:rPr lang="de-DE" sz="2000" dirty="0"/>
-              <a:t> </a:t>
-            </a:r>
-            <a:r>
-              <a:rPr lang="de-DE" sz="2000" dirty="0" err="1"/>
-              <a:t>risk</a:t>
-            </a:r>
-            <a:r>
-              <a:rPr lang="de-DE" sz="2000" dirty="0"/>
-              <a:t>-analysis) ...</a:t>
-            </a:r>
-          </a:p>
-        </p:txBody>
-      </p:sp>
-      <p:sp>
-        <p:nvSpPr>
-          <p:cNvPr id="5" name="Textfeld 4">
-            <a:extLst>
-              <a:ext uri="{FF2B5EF4-FFF2-40B4-BE49-F238E27FC236}">
-                <a16:creationId xmlns:a16="http://schemas.microsoft.com/office/drawing/2014/main" id="{720404AC-B4C6-9248-AB4B-123B5B390AFB}"/>
-              </a:ext>
-            </a:extLst>
-          </p:cNvPr>
-          <p:cNvSpPr txBox="1"/>
-          <p:nvPr/>
-        </p:nvSpPr>
-        <p:spPr>
-          <a:xfrm>
-            <a:off x="660881" y="3552408"/>
-            <a:ext cx="7822236" cy="1136533"/>
-          </a:xfrm>
-          <a:prstGeom prst="rect">
-            <a:avLst/>
-          </a:prstGeom>
-          <a:noFill/>
-        </p:spPr>
-        <p:txBody>
-          <a:bodyPr wrap="square" rtlCol="0" anchor="ctr" anchorCtr="0">
-            <a:noAutofit/>
-          </a:bodyPr>
-          <a:lstStyle/>
-          <a:p>
-            <a:pPr algn="r">
-              <a:lnSpc>
-                <a:spcPts val="3500"/>
-              </a:lnSpc>
-            </a:pPr>
-            <a:r>
-              <a:rPr lang="de-DE" sz="2000" dirty="0"/>
-              <a:t>... </a:t>
-            </a:r>
-            <a:r>
-              <a:rPr lang="de-DE" sz="2000" dirty="0" err="1"/>
-              <a:t>comprehensive</a:t>
-            </a:r>
-            <a:r>
-              <a:rPr lang="de-DE" sz="2000" dirty="0"/>
-              <a:t> </a:t>
-            </a:r>
-            <a:r>
-              <a:rPr lang="de-DE" sz="2000" dirty="0" err="1"/>
-              <a:t>documentation</a:t>
-            </a:r>
-            <a:r>
-              <a:rPr lang="de-DE" sz="2000" dirty="0"/>
-              <a:t> </a:t>
-            </a:r>
-          </a:p>
-          <a:p>
-            <a:pPr algn="r">
-              <a:lnSpc>
-                <a:spcPts val="3500"/>
-              </a:lnSpc>
-            </a:pPr>
-            <a:r>
-              <a:rPr lang="de-DE" sz="2000" dirty="0" err="1"/>
-              <a:t>according</a:t>
-            </a:r>
-            <a:r>
-              <a:rPr lang="de-DE" sz="2000" dirty="0"/>
-              <a:t> </a:t>
-            </a:r>
-            <a:r>
-              <a:rPr lang="de-DE" sz="2000" dirty="0" err="1"/>
-              <a:t>to</a:t>
-            </a:r>
-            <a:r>
-              <a:rPr lang="de-DE" sz="2000" dirty="0"/>
-              <a:t> RUP </a:t>
-            </a:r>
-            <a:r>
-              <a:rPr lang="de-DE" sz="2000" dirty="0" err="1"/>
-              <a:t>specification</a:t>
-            </a:r>
-            <a:r>
-              <a:rPr lang="de-DE" sz="2000" dirty="0"/>
-              <a:t> (e. g. SAD, SRS, Testplan)</a:t>
-            </a:r>
+              <a:t>Youtrack</a:t>
+            </a:r>
+            <a:endParaRPr lang="de-DE" sz="2000" dirty="0"/>
           </a:p>
         </p:txBody>
       </p:sp>
     </p:spTree>
     <p:extLst>
       <p:ext uri="{BB962C8B-B14F-4D97-AF65-F5344CB8AC3E}">
-        <p14:creationId xmlns:p14="http://schemas.microsoft.com/office/powerpoint/2010/main" val="298499812"/>
+        <p14:creationId xmlns:p14="http://schemas.microsoft.com/office/powerpoint/2010/main" val="107337322"/>
       </p:ext>
     </p:extLst>
   </p:cSld>
@@ -3432,6 +3437,329 @@
               <a:rPr lang="de-DE" smtClean="0"/>
               <a:pPr/>
               <a:t>12</a:t>
+            </a:fld>
+            <a:endParaRPr lang="de-DE" sz="1400" dirty="0"/>
+          </a:p>
+        </p:txBody>
+      </p:sp>
+      <p:sp>
+        <p:nvSpPr>
+          <p:cNvPr id="3" name="Textfeld 2">
+            <a:extLst>
+              <a:ext uri="{FF2B5EF4-FFF2-40B4-BE49-F238E27FC236}">
+                <a16:creationId xmlns:a16="http://schemas.microsoft.com/office/drawing/2014/main" id="{BD6B9D4F-AF02-214B-AF6C-D228B7DE0A6E}"/>
+              </a:ext>
+            </a:extLst>
+          </p:cNvPr>
+          <p:cNvSpPr txBox="1"/>
+          <p:nvPr/>
+        </p:nvSpPr>
+        <p:spPr>
+          <a:xfrm>
+            <a:off x="1243173" y="267127"/>
+            <a:ext cx="7541231" cy="430887"/>
+          </a:xfrm>
+          <a:prstGeom prst="rect">
+            <a:avLst/>
+          </a:prstGeom>
+          <a:noFill/>
+        </p:spPr>
+        <p:txBody>
+          <a:bodyPr wrap="square" rtlCol="0">
+            <a:spAutoFit/>
+          </a:bodyPr>
+          <a:lstStyle/>
+          <a:p>
+            <a:pPr algn="ctr"/>
+            <a:r>
+              <a:rPr lang="de-DE" sz="2200" dirty="0"/>
+              <a:t>3. Project </a:t>
+            </a:r>
+            <a:r>
+              <a:rPr lang="de-DE" sz="2200" dirty="0" err="1"/>
+              <a:t>management</a:t>
+            </a:r>
+            <a:r>
+              <a:rPr lang="de-DE" sz="2200" dirty="0"/>
+              <a:t> </a:t>
+            </a:r>
+            <a:r>
+              <a:rPr lang="de-DE" sz="2200" dirty="0" err="1"/>
+              <a:t>and</a:t>
+            </a:r>
+            <a:r>
+              <a:rPr lang="de-DE" sz="2200" dirty="0"/>
+              <a:t> </a:t>
+            </a:r>
+            <a:r>
+              <a:rPr lang="de-DE" sz="2200" dirty="0" err="1"/>
+              <a:t>approach</a:t>
+            </a:r>
+            <a:endParaRPr lang="de-DE" sz="2200" dirty="0"/>
+          </a:p>
+        </p:txBody>
+      </p:sp>
+      <p:sp>
+        <p:nvSpPr>
+          <p:cNvPr id="7" name="Textfeld 6">
+            <a:extLst>
+              <a:ext uri="{FF2B5EF4-FFF2-40B4-BE49-F238E27FC236}">
+                <a16:creationId xmlns:a16="http://schemas.microsoft.com/office/drawing/2014/main" id="{15278564-DF98-A64E-829D-790774920688}"/>
+              </a:ext>
+            </a:extLst>
+          </p:cNvPr>
+          <p:cNvSpPr txBox="1"/>
+          <p:nvPr/>
+        </p:nvSpPr>
+        <p:spPr>
+          <a:xfrm>
+            <a:off x="660881" y="2032605"/>
+            <a:ext cx="7822236" cy="1056657"/>
+          </a:xfrm>
+          <a:prstGeom prst="rect">
+            <a:avLst/>
+          </a:prstGeom>
+          <a:noFill/>
+        </p:spPr>
+        <p:txBody>
+          <a:bodyPr wrap="square" rtlCol="0" anchor="ctr" anchorCtr="0">
+            <a:noAutofit/>
+          </a:bodyPr>
+          <a:lstStyle/>
+          <a:p>
+            <a:pPr>
+              <a:lnSpc>
+                <a:spcPts val="3500"/>
+              </a:lnSpc>
+            </a:pPr>
+            <a:r>
+              <a:rPr lang="de-DE" sz="2000" dirty="0"/>
+              <a:t>In </a:t>
+            </a:r>
+            <a:r>
+              <a:rPr lang="de-DE" sz="2000" dirty="0" err="1"/>
+              <a:t>addition</a:t>
+            </a:r>
+            <a:r>
+              <a:rPr lang="de-DE" sz="2000" dirty="0"/>
+              <a:t> </a:t>
+            </a:r>
+            <a:r>
+              <a:rPr lang="de-DE" sz="2000" dirty="0" err="1"/>
+              <a:t>to</a:t>
+            </a:r>
+            <a:r>
+              <a:rPr lang="de-DE" sz="2000" dirty="0"/>
+              <a:t> traditional </a:t>
+            </a:r>
+            <a:r>
+              <a:rPr lang="de-DE" sz="2000" dirty="0" err="1"/>
+              <a:t>documentation</a:t>
+            </a:r>
+            <a:r>
+              <a:rPr lang="de-DE" sz="2000" dirty="0"/>
+              <a:t> </a:t>
+            </a:r>
+            <a:r>
+              <a:rPr lang="de-DE" sz="2000" dirty="0" err="1"/>
+              <a:t>of</a:t>
+            </a:r>
+            <a:r>
+              <a:rPr lang="de-DE" sz="2000" dirty="0"/>
+              <a:t> </a:t>
+            </a:r>
+            <a:r>
+              <a:rPr lang="de-DE" sz="2000" dirty="0" err="1"/>
+              <a:t>project</a:t>
+            </a:r>
+            <a:r>
+              <a:rPr lang="de-DE" sz="2000" dirty="0"/>
+              <a:t> </a:t>
+            </a:r>
+            <a:r>
+              <a:rPr lang="de-DE" sz="2000" dirty="0" err="1"/>
+              <a:t>planning</a:t>
+            </a:r>
+            <a:r>
+              <a:rPr lang="de-DE" sz="2000" dirty="0"/>
+              <a:t> </a:t>
+            </a:r>
+            <a:br>
+              <a:rPr lang="de-DE" sz="2000" dirty="0"/>
+            </a:br>
+            <a:r>
+              <a:rPr lang="de-DE" sz="2000" dirty="0"/>
+              <a:t>(e. g. </a:t>
+            </a:r>
+            <a:r>
+              <a:rPr lang="de-DE" sz="2000" dirty="0" err="1"/>
+              <a:t>requirements</a:t>
+            </a:r>
+            <a:r>
+              <a:rPr lang="de-DE" sz="2000" dirty="0"/>
+              <a:t>- </a:t>
+            </a:r>
+            <a:r>
+              <a:rPr lang="de-DE" sz="2000" dirty="0" err="1"/>
+              <a:t>and</a:t>
+            </a:r>
+            <a:r>
+              <a:rPr lang="de-DE" sz="2000" dirty="0"/>
+              <a:t> </a:t>
+            </a:r>
+            <a:r>
+              <a:rPr lang="de-DE" sz="2000" dirty="0" err="1"/>
+              <a:t>risk</a:t>
+            </a:r>
+            <a:r>
+              <a:rPr lang="de-DE" sz="2000" dirty="0"/>
+              <a:t>-analysis) ...</a:t>
+            </a:r>
+          </a:p>
+        </p:txBody>
+      </p:sp>
+      <p:sp>
+        <p:nvSpPr>
+          <p:cNvPr id="5" name="Textfeld 4">
+            <a:extLst>
+              <a:ext uri="{FF2B5EF4-FFF2-40B4-BE49-F238E27FC236}">
+                <a16:creationId xmlns:a16="http://schemas.microsoft.com/office/drawing/2014/main" id="{720404AC-B4C6-9248-AB4B-123B5B390AFB}"/>
+              </a:ext>
+            </a:extLst>
+          </p:cNvPr>
+          <p:cNvSpPr txBox="1"/>
+          <p:nvPr/>
+        </p:nvSpPr>
+        <p:spPr>
+          <a:xfrm>
+            <a:off x="660881" y="3552408"/>
+            <a:ext cx="7822236" cy="1136533"/>
+          </a:xfrm>
+          <a:prstGeom prst="rect">
+            <a:avLst/>
+          </a:prstGeom>
+          <a:noFill/>
+        </p:spPr>
+        <p:txBody>
+          <a:bodyPr wrap="square" rtlCol="0" anchor="ctr" anchorCtr="0">
+            <a:noAutofit/>
+          </a:bodyPr>
+          <a:lstStyle/>
+          <a:p>
+            <a:pPr algn="r">
+              <a:lnSpc>
+                <a:spcPts val="3500"/>
+              </a:lnSpc>
+            </a:pPr>
+            <a:r>
+              <a:rPr lang="de-DE" sz="2000" dirty="0"/>
+              <a:t>... </a:t>
+            </a:r>
+            <a:r>
+              <a:rPr lang="de-DE" sz="2000" dirty="0" err="1"/>
+              <a:t>comprehensive</a:t>
+            </a:r>
+            <a:r>
+              <a:rPr lang="de-DE" sz="2000" dirty="0"/>
+              <a:t> </a:t>
+            </a:r>
+            <a:r>
+              <a:rPr lang="de-DE" sz="2000" dirty="0" err="1"/>
+              <a:t>documentation</a:t>
+            </a:r>
+            <a:r>
+              <a:rPr lang="de-DE" sz="2000" dirty="0"/>
+              <a:t> </a:t>
+            </a:r>
+          </a:p>
+          <a:p>
+            <a:pPr algn="r">
+              <a:lnSpc>
+                <a:spcPts val="3500"/>
+              </a:lnSpc>
+            </a:pPr>
+            <a:r>
+              <a:rPr lang="de-DE" sz="2000" dirty="0" err="1"/>
+              <a:t>according</a:t>
+            </a:r>
+            <a:r>
+              <a:rPr lang="de-DE" sz="2000" dirty="0"/>
+              <a:t> </a:t>
+            </a:r>
+            <a:r>
+              <a:rPr lang="de-DE" sz="2000" dirty="0" err="1"/>
+              <a:t>to</a:t>
+            </a:r>
+            <a:r>
+              <a:rPr lang="de-DE" sz="2000" dirty="0"/>
+              <a:t> RUP </a:t>
+            </a:r>
+            <a:r>
+              <a:rPr lang="de-DE" sz="2000" dirty="0" err="1"/>
+              <a:t>specification</a:t>
+            </a:r>
+            <a:r>
+              <a:rPr lang="de-DE" sz="2000" dirty="0"/>
+              <a:t> (e. g. SAD, SRS, Testplan)</a:t>
+            </a:r>
+          </a:p>
+        </p:txBody>
+      </p:sp>
+    </p:spTree>
+    <p:extLst>
+      <p:ext uri="{BB962C8B-B14F-4D97-AF65-F5344CB8AC3E}">
+        <p14:creationId xmlns:p14="http://schemas.microsoft.com/office/powerpoint/2010/main" val="298499812"/>
+      </p:ext>
+    </p:extLst>
+  </p:cSld>
+  <p:clrMapOvr>
+    <a:masterClrMapping/>
+  </p:clrMapOvr>
+</p:sld>
+</file>
+
+<file path=ppt/slides/slide13.xml><?xml version="1.0" encoding="utf-8"?>
+<p:sld xmlns:a="http://schemas.openxmlformats.org/drawingml/2006/main" xmlns:r="http://schemas.openxmlformats.org/officeDocument/2006/relationships" xmlns:p="http://schemas.openxmlformats.org/presentationml/2006/main">
+  <p:cSld>
+    <p:spTree>
+      <p:nvGrpSpPr>
+        <p:cNvPr id="1" name=""/>
+        <p:cNvGrpSpPr/>
+        <p:nvPr/>
+      </p:nvGrpSpPr>
+      <p:grpSpPr>
+        <a:xfrm>
+          <a:off x="0" y="0"/>
+          <a:ext cx="0" cy="0"/>
+          <a:chOff x="0" y="0"/>
+          <a:chExt cx="0" cy="0"/>
+        </a:xfrm>
+      </p:grpSpPr>
+      <p:sp>
+        <p:nvSpPr>
+          <p:cNvPr id="2" name="Foliennummernplatzhalter 1">
+            <a:extLst>
+              <a:ext uri="{FF2B5EF4-FFF2-40B4-BE49-F238E27FC236}">
+                <a16:creationId xmlns:a16="http://schemas.microsoft.com/office/drawing/2014/main" id="{935BE36D-9786-474B-8B37-699633B82ED3}"/>
+              </a:ext>
+            </a:extLst>
+          </p:cNvPr>
+          <p:cNvSpPr>
+            <a:spLocks noGrp="1"/>
+          </p:cNvSpPr>
+          <p:nvPr>
+            <p:ph type="sldNum" sz="quarter" idx="4"/>
+          </p:nvPr>
+        </p:nvSpPr>
+        <p:spPr/>
+        <p:txBody>
+          <a:bodyPr/>
+          <a:lstStyle/>
+          <a:p>
+            <a:fld id="{90CB4078-9F56-DD45-BCAD-AB9C14C5FED1}" type="slidenum">
+              <a:rPr lang="de-DE" smtClean="0"/>
+              <a:pPr/>
+              <a:t>13</a:t>
             </a:fld>
             <a:endParaRPr lang="de-DE" sz="1400" dirty="0"/>
           </a:p>
@@ -6229,7 +6557,7 @@
 </p:sld>
 </file>
 
-<file path=ppt/slides/slide13.xml><?xml version="1.0" encoding="utf-8"?>
+<file path=ppt/slides/slide14.xml><?xml version="1.0" encoding="utf-8"?>
 <p:sld xmlns:a="http://schemas.openxmlformats.org/drawingml/2006/main" xmlns:r="http://schemas.openxmlformats.org/officeDocument/2006/relationships" xmlns:p="http://schemas.openxmlformats.org/presentationml/2006/main">
   <p:cSld>
     <p:spTree>
@@ -6270,7 +6598,7 @@
             <a:fld id="{90CB4078-9F56-DD45-BCAD-AB9C14C5FED1}" type="slidenum">
               <a:rPr lang="de-DE" smtClean="0"/>
               <a:pPr/>
-              <a:t>13</a:t>
+              <a:t>14</a:t>
             </a:fld>
             <a:endParaRPr lang="de-DE" sz="1400" dirty="0"/>
           </a:p>
@@ -6520,7 +6848,7 @@
 </p:sld>
 </file>
 
-<file path=ppt/slides/slide14.xml><?xml version="1.0" encoding="utf-8"?>
+<file path=ppt/slides/slide15.xml><?xml version="1.0" encoding="utf-8"?>
 <p:sld xmlns:a="http://schemas.openxmlformats.org/drawingml/2006/main" xmlns:r="http://schemas.openxmlformats.org/officeDocument/2006/relationships" xmlns:p="http://schemas.openxmlformats.org/presentationml/2006/main">
   <p:cSld>
     <p:spTree>
@@ -6561,7 +6889,7 @@
             <a:fld id="{90CB4078-9F56-DD45-BCAD-AB9C14C5FED1}" type="slidenum">
               <a:rPr lang="de-DE" smtClean="0"/>
               <a:pPr/>
-              <a:t>14</a:t>
+              <a:t>15</a:t>
             </a:fld>
             <a:endParaRPr lang="de-DE" sz="1400" dirty="0"/>
           </a:p>
@@ -6834,248 +7162,6 @@
     <p:extLst>
       <p:ext uri="{BB962C8B-B14F-4D97-AF65-F5344CB8AC3E}">
         <p14:creationId xmlns:p14="http://schemas.microsoft.com/office/powerpoint/2010/main" val="1361097644"/>
-      </p:ext>
-    </p:extLst>
-  </p:cSld>
-  <p:clrMapOvr>
-    <a:masterClrMapping/>
-  </p:clrMapOvr>
-</p:sld>
-</file>
-
-<file path=ppt/slides/slide15.xml><?xml version="1.0" encoding="utf-8"?>
-<p:sld xmlns:a="http://schemas.openxmlformats.org/drawingml/2006/main" xmlns:r="http://schemas.openxmlformats.org/officeDocument/2006/relationships" xmlns:p="http://schemas.openxmlformats.org/presentationml/2006/main">
-  <p:cSld>
-    <p:spTree>
-      <p:nvGrpSpPr>
-        <p:cNvPr id="1" name=""/>
-        <p:cNvGrpSpPr/>
-        <p:nvPr/>
-      </p:nvGrpSpPr>
-      <p:grpSpPr>
-        <a:xfrm>
-          <a:off x="0" y="0"/>
-          <a:ext cx="0" cy="0"/>
-          <a:chOff x="0" y="0"/>
-          <a:chExt cx="0" cy="0"/>
-        </a:xfrm>
-      </p:grpSpPr>
-      <p:sp>
-        <p:nvSpPr>
-          <p:cNvPr id="2" name="Foliennummernplatzhalter 1">
-            <a:extLst>
-              <a:ext uri="{FF2B5EF4-FFF2-40B4-BE49-F238E27FC236}">
-                <a16:creationId xmlns:a16="http://schemas.microsoft.com/office/drawing/2014/main" id="{935BE36D-9786-474B-8B37-699633B82ED3}"/>
-              </a:ext>
-            </a:extLst>
-          </p:cNvPr>
-          <p:cNvSpPr>
-            <a:spLocks noGrp="1"/>
-          </p:cNvSpPr>
-          <p:nvPr>
-            <p:ph type="sldNum" sz="quarter" idx="4"/>
-          </p:nvPr>
-        </p:nvSpPr>
-        <p:spPr/>
-        <p:txBody>
-          <a:bodyPr/>
-          <a:lstStyle/>
-          <a:p>
-            <a:fld id="{90CB4078-9F56-DD45-BCAD-AB9C14C5FED1}" type="slidenum">
-              <a:rPr lang="de-DE" smtClean="0"/>
-              <a:pPr/>
-              <a:t>15</a:t>
-            </a:fld>
-            <a:endParaRPr lang="de-DE" sz="1400" dirty="0"/>
-          </a:p>
-        </p:txBody>
-      </p:sp>
-      <p:sp>
-        <p:nvSpPr>
-          <p:cNvPr id="3" name="Textfeld 2">
-            <a:extLst>
-              <a:ext uri="{FF2B5EF4-FFF2-40B4-BE49-F238E27FC236}">
-                <a16:creationId xmlns:a16="http://schemas.microsoft.com/office/drawing/2014/main" id="{BD6B9D4F-AF02-214B-AF6C-D228B7DE0A6E}"/>
-              </a:ext>
-            </a:extLst>
-          </p:cNvPr>
-          <p:cNvSpPr txBox="1"/>
-          <p:nvPr/>
-        </p:nvSpPr>
-        <p:spPr>
-          <a:xfrm>
-            <a:off x="1243173" y="267127"/>
-            <a:ext cx="7541231" cy="430887"/>
-          </a:xfrm>
-          <a:prstGeom prst="rect">
-            <a:avLst/>
-          </a:prstGeom>
-          <a:noFill/>
-        </p:spPr>
-        <p:txBody>
-          <a:bodyPr wrap="square" rtlCol="0">
-            <a:spAutoFit/>
-          </a:bodyPr>
-          <a:lstStyle/>
-          <a:p>
-            <a:pPr algn="ctr"/>
-            <a:r>
-              <a:rPr lang="de-DE" sz="2200" dirty="0"/>
-              <a:t>4. The </a:t>
-            </a:r>
-            <a:r>
-              <a:rPr lang="de-DE" sz="2200" dirty="0" err="1"/>
-              <a:t>state</a:t>
-            </a:r>
-            <a:r>
-              <a:rPr lang="de-DE" sz="2200" dirty="0"/>
-              <a:t> </a:t>
-            </a:r>
-            <a:r>
-              <a:rPr lang="de-DE" sz="2200" dirty="0" err="1"/>
-              <a:t>of</a:t>
-            </a:r>
-            <a:r>
-              <a:rPr lang="de-DE" sz="2200" dirty="0"/>
-              <a:t> </a:t>
-            </a:r>
-            <a:r>
-              <a:rPr lang="de-DE" sz="2200" dirty="0" err="1"/>
-              <a:t>things</a:t>
-            </a:r>
-            <a:endParaRPr lang="de-DE" sz="2200" dirty="0"/>
-          </a:p>
-        </p:txBody>
-      </p:sp>
-      <p:sp>
-        <p:nvSpPr>
-          <p:cNvPr id="7" name="Textfeld 6">
-            <a:extLst>
-              <a:ext uri="{FF2B5EF4-FFF2-40B4-BE49-F238E27FC236}">
-                <a16:creationId xmlns:a16="http://schemas.microsoft.com/office/drawing/2014/main" id="{15278564-DF98-A64E-829D-790774920688}"/>
-              </a:ext>
-            </a:extLst>
-          </p:cNvPr>
-          <p:cNvSpPr txBox="1"/>
-          <p:nvPr/>
-        </p:nvSpPr>
-        <p:spPr>
-          <a:xfrm>
-            <a:off x="817081" y="3095708"/>
-            <a:ext cx="7509838" cy="610869"/>
-          </a:xfrm>
-          <a:prstGeom prst="rect">
-            <a:avLst/>
-          </a:prstGeom>
-          <a:noFill/>
-        </p:spPr>
-        <p:txBody>
-          <a:bodyPr wrap="square" rtlCol="0" anchor="ctr" anchorCtr="0">
-            <a:noAutofit/>
-          </a:bodyPr>
-          <a:lstStyle/>
-          <a:p>
-            <a:pPr algn="ctr"/>
-            <a:r>
-              <a:rPr lang="de-DE" sz="2200" dirty="0" err="1"/>
-              <a:t>UseCase-Diagram</a:t>
-            </a:r>
-            <a:endParaRPr lang="de-DE" sz="2200" dirty="0"/>
-          </a:p>
-        </p:txBody>
-      </p:sp>
-      <p:pic>
-        <p:nvPicPr>
-          <p:cNvPr id="9" name="Grafik 8">
-            <a:extLst>
-              <a:ext uri="{FF2B5EF4-FFF2-40B4-BE49-F238E27FC236}">
-                <a16:creationId xmlns:a16="http://schemas.microsoft.com/office/drawing/2014/main" id="{CAF8C139-9559-FD49-AD27-FEBD4F2094E5}"/>
-              </a:ext>
-            </a:extLst>
-          </p:cNvPr>
-          <p:cNvPicPr>
-            <a:picLocks noChangeAspect="1"/>
-          </p:cNvPicPr>
-          <p:nvPr/>
-        </p:nvPicPr>
-        <p:blipFill rotWithShape="1">
-          <a:blip r:embed="rId2"/>
-          <a:srcRect t="9103"/>
-          <a:stretch/>
-        </p:blipFill>
-        <p:spPr>
-          <a:xfrm>
-            <a:off x="365797" y="1168907"/>
-            <a:ext cx="8418607" cy="4685565"/>
-          </a:xfrm>
-          <a:prstGeom prst="rect">
-            <a:avLst/>
-          </a:prstGeom>
-        </p:spPr>
-      </p:pic>
-      <p:sp>
-        <p:nvSpPr>
-          <p:cNvPr id="10" name="Textfeld 9">
-            <a:extLst>
-              <a:ext uri="{FF2B5EF4-FFF2-40B4-BE49-F238E27FC236}">
-                <a16:creationId xmlns:a16="http://schemas.microsoft.com/office/drawing/2014/main" id="{669F23EF-DC58-FE45-B880-3B0624D82CD4}"/>
-              </a:ext>
-            </a:extLst>
-          </p:cNvPr>
-          <p:cNvSpPr txBox="1"/>
-          <p:nvPr/>
-        </p:nvSpPr>
-        <p:spPr>
-          <a:xfrm>
-            <a:off x="6257299" y="1072086"/>
-            <a:ext cx="2253653" cy="506469"/>
-          </a:xfrm>
-          <a:prstGeom prst="rect">
-            <a:avLst/>
-          </a:prstGeom>
-          <a:solidFill>
-            <a:schemeClr val="bg1"/>
-          </a:solidFill>
-          <a:ln>
-            <a:solidFill>
-              <a:schemeClr val="tx1"/>
-            </a:solidFill>
-          </a:ln>
-          <a:effectLst>
-            <a:outerShdw blurRad="50800" dist="38100" dir="2700000" algn="tl" rotWithShape="0">
-              <a:prstClr val="black">
-                <a:alpha val="40000"/>
-              </a:prstClr>
-            </a:outerShdw>
-          </a:effectLst>
-        </p:spPr>
-        <p:txBody>
-          <a:bodyPr wrap="square" rtlCol="0" anchor="ctr" anchorCtr="0">
-            <a:noAutofit/>
-          </a:bodyPr>
-          <a:lstStyle/>
-          <a:p>
-            <a:pPr algn="ctr"/>
-            <a:r>
-              <a:rPr lang="de-DE" sz="2000" dirty="0" err="1"/>
-              <a:t>Usecase</a:t>
-            </a:r>
-            <a:r>
-              <a:rPr lang="de-DE" sz="2000" dirty="0"/>
-              <a:t> </a:t>
-            </a:r>
-            <a:r>
-              <a:rPr lang="de-DE" sz="2000" dirty="0" err="1"/>
-              <a:t>diagram</a:t>
-            </a:r>
-            <a:endParaRPr lang="de-DE" sz="2000" dirty="0"/>
-          </a:p>
-        </p:txBody>
-      </p:sp>
-    </p:spTree>
-    <p:extLst>
-      <p:ext uri="{BB962C8B-B14F-4D97-AF65-F5344CB8AC3E}">
-        <p14:creationId xmlns:p14="http://schemas.microsoft.com/office/powerpoint/2010/main" val="1436968680"/>
       </p:ext>
     </p:extLst>
   </p:cSld>
@@ -7189,6 +7275,436 @@
           </a:p>
         </p:txBody>
       </p:sp>
+      <p:sp>
+        <p:nvSpPr>
+          <p:cNvPr id="7" name="Textfeld 6">
+            <a:extLst>
+              <a:ext uri="{FF2B5EF4-FFF2-40B4-BE49-F238E27FC236}">
+                <a16:creationId xmlns:a16="http://schemas.microsoft.com/office/drawing/2014/main" id="{15278564-DF98-A64E-829D-790774920688}"/>
+              </a:ext>
+            </a:extLst>
+          </p:cNvPr>
+          <p:cNvSpPr txBox="1"/>
+          <p:nvPr/>
+        </p:nvSpPr>
+        <p:spPr>
+          <a:xfrm>
+            <a:off x="817081" y="3095708"/>
+            <a:ext cx="7509838" cy="610869"/>
+          </a:xfrm>
+          <a:prstGeom prst="rect">
+            <a:avLst/>
+          </a:prstGeom>
+          <a:noFill/>
+        </p:spPr>
+        <p:txBody>
+          <a:bodyPr wrap="square" rtlCol="0" anchor="ctr" anchorCtr="0">
+            <a:noAutofit/>
+          </a:bodyPr>
+          <a:lstStyle/>
+          <a:p>
+            <a:pPr algn="ctr"/>
+            <a:r>
+              <a:rPr lang="de-DE" sz="2200" dirty="0" err="1"/>
+              <a:t>UseCase-Diagram</a:t>
+            </a:r>
+            <a:endParaRPr lang="de-DE" sz="2200" dirty="0"/>
+          </a:p>
+        </p:txBody>
+      </p:sp>
+      <p:pic>
+        <p:nvPicPr>
+          <p:cNvPr id="9" name="Grafik 8">
+            <a:extLst>
+              <a:ext uri="{FF2B5EF4-FFF2-40B4-BE49-F238E27FC236}">
+                <a16:creationId xmlns:a16="http://schemas.microsoft.com/office/drawing/2014/main" id="{CAF8C139-9559-FD49-AD27-FEBD4F2094E5}"/>
+              </a:ext>
+            </a:extLst>
+          </p:cNvPr>
+          <p:cNvPicPr>
+            <a:picLocks noChangeAspect="1"/>
+          </p:cNvPicPr>
+          <p:nvPr/>
+        </p:nvPicPr>
+        <p:blipFill rotWithShape="1">
+          <a:blip r:embed="rId2"/>
+          <a:srcRect t="9103"/>
+          <a:stretch/>
+        </p:blipFill>
+        <p:spPr>
+          <a:xfrm>
+            <a:off x="365797" y="1168907"/>
+            <a:ext cx="8418607" cy="4685565"/>
+          </a:xfrm>
+          <a:prstGeom prst="rect">
+            <a:avLst/>
+          </a:prstGeom>
+        </p:spPr>
+      </p:pic>
+      <p:sp>
+        <p:nvSpPr>
+          <p:cNvPr id="10" name="Textfeld 9">
+            <a:extLst>
+              <a:ext uri="{FF2B5EF4-FFF2-40B4-BE49-F238E27FC236}">
+                <a16:creationId xmlns:a16="http://schemas.microsoft.com/office/drawing/2014/main" id="{669F23EF-DC58-FE45-B880-3B0624D82CD4}"/>
+              </a:ext>
+            </a:extLst>
+          </p:cNvPr>
+          <p:cNvSpPr txBox="1"/>
+          <p:nvPr/>
+        </p:nvSpPr>
+        <p:spPr>
+          <a:xfrm>
+            <a:off x="6257299" y="1072086"/>
+            <a:ext cx="2253653" cy="506469"/>
+          </a:xfrm>
+          <a:prstGeom prst="rect">
+            <a:avLst/>
+          </a:prstGeom>
+          <a:solidFill>
+            <a:schemeClr val="bg1"/>
+          </a:solidFill>
+          <a:ln>
+            <a:solidFill>
+              <a:schemeClr val="tx1"/>
+            </a:solidFill>
+          </a:ln>
+          <a:effectLst>
+            <a:outerShdw blurRad="50800" dist="38100" dir="2700000" algn="tl" rotWithShape="0">
+              <a:prstClr val="black">
+                <a:alpha val="40000"/>
+              </a:prstClr>
+            </a:outerShdw>
+          </a:effectLst>
+        </p:spPr>
+        <p:txBody>
+          <a:bodyPr wrap="square" rtlCol="0" anchor="ctr" anchorCtr="0">
+            <a:noAutofit/>
+          </a:bodyPr>
+          <a:lstStyle/>
+          <a:p>
+            <a:pPr algn="ctr"/>
+            <a:r>
+              <a:rPr lang="de-DE" sz="2000" dirty="0" err="1"/>
+              <a:t>Usecase</a:t>
+            </a:r>
+            <a:r>
+              <a:rPr lang="de-DE" sz="2000" dirty="0"/>
+              <a:t> </a:t>
+            </a:r>
+            <a:r>
+              <a:rPr lang="de-DE" sz="2000" dirty="0" err="1"/>
+              <a:t>diagram</a:t>
+            </a:r>
+            <a:endParaRPr lang="de-DE" sz="2000" dirty="0"/>
+          </a:p>
+        </p:txBody>
+      </p:sp>
+    </p:spTree>
+    <p:extLst>
+      <p:ext uri="{BB962C8B-B14F-4D97-AF65-F5344CB8AC3E}">
+        <p14:creationId xmlns:p14="http://schemas.microsoft.com/office/powerpoint/2010/main" val="1436968680"/>
+      </p:ext>
+    </p:extLst>
+  </p:cSld>
+  <p:clrMapOvr>
+    <a:masterClrMapping/>
+  </p:clrMapOvr>
+</p:sld>
+</file>
+
+<file path=ppt/slides/slide17.xml><?xml version="1.0" encoding="utf-8"?>
+<p:sld xmlns:a="http://schemas.openxmlformats.org/drawingml/2006/main" xmlns:r="http://schemas.openxmlformats.org/officeDocument/2006/relationships" xmlns:p="http://schemas.openxmlformats.org/presentationml/2006/main">
+  <p:cSld>
+    <p:spTree>
+      <p:nvGrpSpPr>
+        <p:cNvPr id="1" name=""/>
+        <p:cNvGrpSpPr/>
+        <p:nvPr/>
+      </p:nvGrpSpPr>
+      <p:grpSpPr>
+        <a:xfrm>
+          <a:off x="0" y="0"/>
+          <a:ext cx="0" cy="0"/>
+          <a:chOff x="0" y="0"/>
+          <a:chExt cx="0" cy="0"/>
+        </a:xfrm>
+      </p:grpSpPr>
+      <p:sp>
+        <p:nvSpPr>
+          <p:cNvPr id="2" name="Foliennummernplatzhalter 1">
+            <a:extLst>
+              <a:ext uri="{FF2B5EF4-FFF2-40B4-BE49-F238E27FC236}">
+                <a16:creationId xmlns:a16="http://schemas.microsoft.com/office/drawing/2014/main" id="{935BE36D-9786-474B-8B37-699633B82ED3}"/>
+              </a:ext>
+            </a:extLst>
+          </p:cNvPr>
+          <p:cNvSpPr>
+            <a:spLocks noGrp="1"/>
+          </p:cNvSpPr>
+          <p:nvPr>
+            <p:ph type="sldNum" sz="quarter" idx="4"/>
+          </p:nvPr>
+        </p:nvSpPr>
+        <p:spPr/>
+        <p:txBody>
+          <a:bodyPr/>
+          <a:lstStyle/>
+          <a:p>
+            <a:fld id="{90CB4078-9F56-DD45-BCAD-AB9C14C5FED1}" type="slidenum">
+              <a:rPr lang="de-DE" smtClean="0"/>
+              <a:pPr/>
+              <a:t>17</a:t>
+            </a:fld>
+            <a:endParaRPr lang="de-DE" sz="1400" dirty="0"/>
+          </a:p>
+        </p:txBody>
+      </p:sp>
+      <p:sp>
+        <p:nvSpPr>
+          <p:cNvPr id="3" name="Textfeld 2">
+            <a:extLst>
+              <a:ext uri="{FF2B5EF4-FFF2-40B4-BE49-F238E27FC236}">
+                <a16:creationId xmlns:a16="http://schemas.microsoft.com/office/drawing/2014/main" id="{BD6B9D4F-AF02-214B-AF6C-D228B7DE0A6E}"/>
+              </a:ext>
+            </a:extLst>
+          </p:cNvPr>
+          <p:cNvSpPr txBox="1"/>
+          <p:nvPr/>
+        </p:nvSpPr>
+        <p:spPr>
+          <a:xfrm>
+            <a:off x="1243173" y="267127"/>
+            <a:ext cx="7541231" cy="430887"/>
+          </a:xfrm>
+          <a:prstGeom prst="rect">
+            <a:avLst/>
+          </a:prstGeom>
+          <a:noFill/>
+        </p:spPr>
+        <p:txBody>
+          <a:bodyPr wrap="square" rtlCol="0">
+            <a:spAutoFit/>
+          </a:bodyPr>
+          <a:lstStyle/>
+          <a:p>
+            <a:pPr algn="ctr"/>
+            <a:r>
+              <a:rPr lang="de-DE" sz="2200" dirty="0"/>
+              <a:t>4. The </a:t>
+            </a:r>
+            <a:r>
+              <a:rPr lang="de-DE" sz="2200" dirty="0" err="1"/>
+              <a:t>state</a:t>
+            </a:r>
+            <a:r>
+              <a:rPr lang="de-DE" sz="2200" dirty="0"/>
+              <a:t> </a:t>
+            </a:r>
+            <a:r>
+              <a:rPr lang="de-DE" sz="2200" dirty="0" err="1"/>
+              <a:t>of</a:t>
+            </a:r>
+            <a:r>
+              <a:rPr lang="de-DE" sz="2200" dirty="0"/>
+              <a:t> </a:t>
+            </a:r>
+            <a:r>
+              <a:rPr lang="de-DE" sz="2200" dirty="0" err="1"/>
+              <a:t>things</a:t>
+            </a:r>
+            <a:endParaRPr lang="de-DE" sz="2200" dirty="0"/>
+          </a:p>
+        </p:txBody>
+      </p:sp>
+      <p:sp>
+        <p:nvSpPr>
+          <p:cNvPr id="8" name="Textfeld 7">
+            <a:extLst>
+              <a:ext uri="{FF2B5EF4-FFF2-40B4-BE49-F238E27FC236}">
+                <a16:creationId xmlns:a16="http://schemas.microsoft.com/office/drawing/2014/main" id="{D4858632-4DA6-9C49-A4AF-A4E6A582D05A}"/>
+              </a:ext>
+            </a:extLst>
+          </p:cNvPr>
+          <p:cNvSpPr txBox="1"/>
+          <p:nvPr/>
+        </p:nvSpPr>
+        <p:spPr>
+          <a:xfrm>
+            <a:off x="420429" y="1410281"/>
+            <a:ext cx="8303142" cy="610869"/>
+          </a:xfrm>
+          <a:prstGeom prst="rect">
+            <a:avLst/>
+          </a:prstGeom>
+          <a:noFill/>
+        </p:spPr>
+        <p:txBody>
+          <a:bodyPr wrap="square" rtlCol="0" anchor="ctr" anchorCtr="0">
+            <a:noAutofit/>
+          </a:bodyPr>
+          <a:lstStyle/>
+          <a:p>
+            <a:pPr algn="ctr"/>
+            <a:r>
+              <a:rPr lang="de-DE" sz="2200" dirty="0"/>
+              <a:t>Class </a:t>
+            </a:r>
+            <a:r>
+              <a:rPr lang="de-DE" sz="2200" dirty="0" err="1"/>
+              <a:t>diagram</a:t>
+            </a:r>
+            <a:endParaRPr lang="de-DE" sz="2200" dirty="0"/>
+          </a:p>
+        </p:txBody>
+      </p:sp>
+      <p:pic>
+        <p:nvPicPr>
+          <p:cNvPr id="5" name="Grafik 4">
+            <a:extLst>
+              <a:ext uri="{FF2B5EF4-FFF2-40B4-BE49-F238E27FC236}">
+                <a16:creationId xmlns:a16="http://schemas.microsoft.com/office/drawing/2014/main" id="{3DEA4CAD-7ABA-3048-9F93-16C6D61A7458}"/>
+              </a:ext>
+            </a:extLst>
+          </p:cNvPr>
+          <p:cNvPicPr>
+            <a:picLocks noChangeAspect="1"/>
+          </p:cNvPicPr>
+          <p:nvPr/>
+        </p:nvPicPr>
+        <p:blipFill>
+          <a:blip r:embed="rId2"/>
+          <a:stretch>
+            <a:fillRect/>
+          </a:stretch>
+        </p:blipFill>
+        <p:spPr>
+          <a:xfrm>
+            <a:off x="285675" y="2021150"/>
+            <a:ext cx="8723571" cy="3256939"/>
+          </a:xfrm>
+          <a:prstGeom prst="rect">
+            <a:avLst/>
+          </a:prstGeom>
+        </p:spPr>
+      </p:pic>
+    </p:spTree>
+    <p:extLst>
+      <p:ext uri="{BB962C8B-B14F-4D97-AF65-F5344CB8AC3E}">
+        <p14:creationId xmlns:p14="http://schemas.microsoft.com/office/powerpoint/2010/main" val="1223748842"/>
+      </p:ext>
+    </p:extLst>
+  </p:cSld>
+  <p:clrMapOvr>
+    <a:masterClrMapping/>
+  </p:clrMapOvr>
+</p:sld>
+</file>
+
+<file path=ppt/slides/slide18.xml><?xml version="1.0" encoding="utf-8"?>
+<p:sld xmlns:a="http://schemas.openxmlformats.org/drawingml/2006/main" xmlns:r="http://schemas.openxmlformats.org/officeDocument/2006/relationships" xmlns:p="http://schemas.openxmlformats.org/presentationml/2006/main">
+  <p:cSld>
+    <p:spTree>
+      <p:nvGrpSpPr>
+        <p:cNvPr id="1" name=""/>
+        <p:cNvGrpSpPr/>
+        <p:nvPr/>
+      </p:nvGrpSpPr>
+      <p:grpSpPr>
+        <a:xfrm>
+          <a:off x="0" y="0"/>
+          <a:ext cx="0" cy="0"/>
+          <a:chOff x="0" y="0"/>
+          <a:chExt cx="0" cy="0"/>
+        </a:xfrm>
+      </p:grpSpPr>
+      <p:sp>
+        <p:nvSpPr>
+          <p:cNvPr id="2" name="Foliennummernplatzhalter 1">
+            <a:extLst>
+              <a:ext uri="{FF2B5EF4-FFF2-40B4-BE49-F238E27FC236}">
+                <a16:creationId xmlns:a16="http://schemas.microsoft.com/office/drawing/2014/main" id="{935BE36D-9786-474B-8B37-699633B82ED3}"/>
+              </a:ext>
+            </a:extLst>
+          </p:cNvPr>
+          <p:cNvSpPr>
+            <a:spLocks noGrp="1"/>
+          </p:cNvSpPr>
+          <p:nvPr>
+            <p:ph type="sldNum" sz="quarter" idx="4"/>
+          </p:nvPr>
+        </p:nvSpPr>
+        <p:spPr/>
+        <p:txBody>
+          <a:bodyPr/>
+          <a:lstStyle/>
+          <a:p>
+            <a:fld id="{90CB4078-9F56-DD45-BCAD-AB9C14C5FED1}" type="slidenum">
+              <a:rPr lang="de-DE" smtClean="0"/>
+              <a:pPr/>
+              <a:t>18</a:t>
+            </a:fld>
+            <a:endParaRPr lang="de-DE" sz="1400" dirty="0"/>
+          </a:p>
+        </p:txBody>
+      </p:sp>
+      <p:sp>
+        <p:nvSpPr>
+          <p:cNvPr id="3" name="Textfeld 2">
+            <a:extLst>
+              <a:ext uri="{FF2B5EF4-FFF2-40B4-BE49-F238E27FC236}">
+                <a16:creationId xmlns:a16="http://schemas.microsoft.com/office/drawing/2014/main" id="{BD6B9D4F-AF02-214B-AF6C-D228B7DE0A6E}"/>
+              </a:ext>
+            </a:extLst>
+          </p:cNvPr>
+          <p:cNvSpPr txBox="1"/>
+          <p:nvPr/>
+        </p:nvSpPr>
+        <p:spPr>
+          <a:xfrm>
+            <a:off x="1243173" y="267127"/>
+            <a:ext cx="7541231" cy="430887"/>
+          </a:xfrm>
+          <a:prstGeom prst="rect">
+            <a:avLst/>
+          </a:prstGeom>
+          <a:noFill/>
+        </p:spPr>
+        <p:txBody>
+          <a:bodyPr wrap="square" rtlCol="0">
+            <a:spAutoFit/>
+          </a:bodyPr>
+          <a:lstStyle/>
+          <a:p>
+            <a:pPr algn="ctr"/>
+            <a:r>
+              <a:rPr lang="de-DE" sz="2200" dirty="0"/>
+              <a:t>4. The </a:t>
+            </a:r>
+            <a:r>
+              <a:rPr lang="de-DE" sz="2200" dirty="0" err="1"/>
+              <a:t>state</a:t>
+            </a:r>
+            <a:r>
+              <a:rPr lang="de-DE" sz="2200" dirty="0"/>
+              <a:t> </a:t>
+            </a:r>
+            <a:r>
+              <a:rPr lang="de-DE" sz="2200" dirty="0" err="1"/>
+              <a:t>of</a:t>
+            </a:r>
+            <a:r>
+              <a:rPr lang="de-DE" sz="2200" dirty="0"/>
+              <a:t> </a:t>
+            </a:r>
+            <a:r>
+              <a:rPr lang="de-DE" sz="2200" dirty="0" err="1"/>
+              <a:t>things</a:t>
+            </a:r>
+            <a:endParaRPr lang="de-DE" sz="2200" dirty="0"/>
+          </a:p>
+        </p:txBody>
+      </p:sp>
       <p:pic>
         <p:nvPicPr>
           <p:cNvPr id="5" name="Grafik 4">
@@ -7287,7 +7803,7 @@
 </p:sld>
 </file>
 
-<file path=ppt/slides/slide17.xml><?xml version="1.0" encoding="utf-8"?>
+<file path=ppt/slides/slide19.xml><?xml version="1.0" encoding="utf-8"?>
 <p:sld xmlns:a="http://schemas.openxmlformats.org/drawingml/2006/main" xmlns:r="http://schemas.openxmlformats.org/officeDocument/2006/relationships" xmlns:p="http://schemas.openxmlformats.org/presentationml/2006/main">
   <p:cSld>
     <p:spTree>
@@ -7328,7 +7844,7 @@
             <a:fld id="{90CB4078-9F56-DD45-BCAD-AB9C14C5FED1}" type="slidenum">
               <a:rPr lang="de-DE" smtClean="0"/>
               <a:pPr/>
-              <a:t>17</a:t>
+              <a:t>19</a:t>
             </a:fld>
             <a:endParaRPr lang="de-DE" sz="1400" dirty="0"/>
           </a:p>
@@ -7522,347 +8038,6 @@
 </p:sld>
 </file>
 
-<file path=ppt/slides/slide18.xml><?xml version="1.0" encoding="utf-8"?>
-<p:sld xmlns:a="http://schemas.openxmlformats.org/drawingml/2006/main" xmlns:r="http://schemas.openxmlformats.org/officeDocument/2006/relationships" xmlns:p="http://schemas.openxmlformats.org/presentationml/2006/main">
-  <p:cSld>
-    <p:spTree>
-      <p:nvGrpSpPr>
-        <p:cNvPr id="1" name=""/>
-        <p:cNvGrpSpPr/>
-        <p:nvPr/>
-      </p:nvGrpSpPr>
-      <p:grpSpPr>
-        <a:xfrm>
-          <a:off x="0" y="0"/>
-          <a:ext cx="0" cy="0"/>
-          <a:chOff x="0" y="0"/>
-          <a:chExt cx="0" cy="0"/>
-        </a:xfrm>
-      </p:grpSpPr>
-      <p:sp>
-        <p:nvSpPr>
-          <p:cNvPr id="2" name="Foliennummernplatzhalter 1">
-            <a:extLst>
-              <a:ext uri="{FF2B5EF4-FFF2-40B4-BE49-F238E27FC236}">
-                <a16:creationId xmlns:a16="http://schemas.microsoft.com/office/drawing/2014/main" id="{935BE36D-9786-474B-8B37-699633B82ED3}"/>
-              </a:ext>
-            </a:extLst>
-          </p:cNvPr>
-          <p:cNvSpPr>
-            <a:spLocks noGrp="1"/>
-          </p:cNvSpPr>
-          <p:nvPr>
-            <p:ph type="sldNum" sz="quarter" idx="4"/>
-          </p:nvPr>
-        </p:nvSpPr>
-        <p:spPr/>
-        <p:txBody>
-          <a:bodyPr/>
-          <a:lstStyle/>
-          <a:p>
-            <a:fld id="{90CB4078-9F56-DD45-BCAD-AB9C14C5FED1}" type="slidenum">
-              <a:rPr lang="de-DE" smtClean="0"/>
-              <a:pPr/>
-              <a:t>18</a:t>
-            </a:fld>
-            <a:endParaRPr lang="de-DE" sz="1400" dirty="0"/>
-          </a:p>
-        </p:txBody>
-      </p:sp>
-      <p:sp>
-        <p:nvSpPr>
-          <p:cNvPr id="3" name="Textfeld 2">
-            <a:extLst>
-              <a:ext uri="{FF2B5EF4-FFF2-40B4-BE49-F238E27FC236}">
-                <a16:creationId xmlns:a16="http://schemas.microsoft.com/office/drawing/2014/main" id="{BD6B9D4F-AF02-214B-AF6C-D228B7DE0A6E}"/>
-              </a:ext>
-            </a:extLst>
-          </p:cNvPr>
-          <p:cNvSpPr txBox="1"/>
-          <p:nvPr/>
-        </p:nvSpPr>
-        <p:spPr>
-          <a:xfrm>
-            <a:off x="1243173" y="267127"/>
-            <a:ext cx="7541231" cy="430887"/>
-          </a:xfrm>
-          <a:prstGeom prst="rect">
-            <a:avLst/>
-          </a:prstGeom>
-          <a:noFill/>
-        </p:spPr>
-        <p:txBody>
-          <a:bodyPr wrap="square" rtlCol="0">
-            <a:spAutoFit/>
-          </a:bodyPr>
-          <a:lstStyle/>
-          <a:p>
-            <a:pPr algn="ctr"/>
-            <a:r>
-              <a:rPr lang="de-DE" sz="2200" dirty="0"/>
-              <a:t>4. The </a:t>
-            </a:r>
-            <a:r>
-              <a:rPr lang="de-DE" sz="2200" dirty="0" err="1"/>
-              <a:t>state</a:t>
-            </a:r>
-            <a:r>
-              <a:rPr lang="de-DE" sz="2200" dirty="0"/>
-              <a:t> </a:t>
-            </a:r>
-            <a:r>
-              <a:rPr lang="de-DE" sz="2200" dirty="0" err="1"/>
-              <a:t>of</a:t>
-            </a:r>
-            <a:r>
-              <a:rPr lang="de-DE" sz="2200" dirty="0"/>
-              <a:t> </a:t>
-            </a:r>
-            <a:r>
-              <a:rPr lang="de-DE" sz="2200" dirty="0" err="1"/>
-              <a:t>things</a:t>
-            </a:r>
-            <a:endParaRPr lang="de-DE" sz="2200" dirty="0"/>
-          </a:p>
-        </p:txBody>
-      </p:sp>
-      <p:sp>
-        <p:nvSpPr>
-          <p:cNvPr id="8" name="Textfeld 7">
-            <a:extLst>
-              <a:ext uri="{FF2B5EF4-FFF2-40B4-BE49-F238E27FC236}">
-                <a16:creationId xmlns:a16="http://schemas.microsoft.com/office/drawing/2014/main" id="{D4858632-4DA6-9C49-A4AF-A4E6A582D05A}"/>
-              </a:ext>
-            </a:extLst>
-          </p:cNvPr>
-          <p:cNvSpPr txBox="1"/>
-          <p:nvPr/>
-        </p:nvSpPr>
-        <p:spPr>
-          <a:xfrm>
-            <a:off x="420429" y="1410281"/>
-            <a:ext cx="8303142" cy="610869"/>
-          </a:xfrm>
-          <a:prstGeom prst="rect">
-            <a:avLst/>
-          </a:prstGeom>
-          <a:noFill/>
-        </p:spPr>
-        <p:txBody>
-          <a:bodyPr wrap="square" rtlCol="0" anchor="ctr" anchorCtr="0">
-            <a:noAutofit/>
-          </a:bodyPr>
-          <a:lstStyle/>
-          <a:p>
-            <a:pPr algn="ctr"/>
-            <a:r>
-              <a:rPr lang="de-DE" sz="2200" dirty="0"/>
-              <a:t>Class </a:t>
-            </a:r>
-            <a:r>
-              <a:rPr lang="de-DE" sz="2200" dirty="0" err="1"/>
-              <a:t>diagram</a:t>
-            </a:r>
-            <a:endParaRPr lang="de-DE" sz="2200" dirty="0"/>
-          </a:p>
-        </p:txBody>
-      </p:sp>
-      <p:pic>
-        <p:nvPicPr>
-          <p:cNvPr id="5" name="Grafik 4">
-            <a:extLst>
-              <a:ext uri="{FF2B5EF4-FFF2-40B4-BE49-F238E27FC236}">
-                <a16:creationId xmlns:a16="http://schemas.microsoft.com/office/drawing/2014/main" id="{3DEA4CAD-7ABA-3048-9F93-16C6D61A7458}"/>
-              </a:ext>
-            </a:extLst>
-          </p:cNvPr>
-          <p:cNvPicPr>
-            <a:picLocks noChangeAspect="1"/>
-          </p:cNvPicPr>
-          <p:nvPr/>
-        </p:nvPicPr>
-        <p:blipFill>
-          <a:blip r:embed="rId2"/>
-          <a:stretch>
-            <a:fillRect/>
-          </a:stretch>
-        </p:blipFill>
-        <p:spPr>
-          <a:xfrm>
-            <a:off x="285675" y="2021150"/>
-            <a:ext cx="8723571" cy="3256939"/>
-          </a:xfrm>
-          <a:prstGeom prst="rect">
-            <a:avLst/>
-          </a:prstGeom>
-        </p:spPr>
-      </p:pic>
-    </p:spTree>
-    <p:extLst>
-      <p:ext uri="{BB962C8B-B14F-4D97-AF65-F5344CB8AC3E}">
-        <p14:creationId xmlns:p14="http://schemas.microsoft.com/office/powerpoint/2010/main" val="1223748842"/>
-      </p:ext>
-    </p:extLst>
-  </p:cSld>
-  <p:clrMapOvr>
-    <a:masterClrMapping/>
-  </p:clrMapOvr>
-</p:sld>
-</file>
-
-<file path=ppt/slides/slide19.xml><?xml version="1.0" encoding="utf-8"?>
-<p:sld xmlns:a="http://schemas.openxmlformats.org/drawingml/2006/main" xmlns:r="http://schemas.openxmlformats.org/officeDocument/2006/relationships" xmlns:p="http://schemas.openxmlformats.org/presentationml/2006/main">
-  <p:cSld>
-    <p:spTree>
-      <p:nvGrpSpPr>
-        <p:cNvPr id="1" name=""/>
-        <p:cNvGrpSpPr/>
-        <p:nvPr/>
-      </p:nvGrpSpPr>
-      <p:grpSpPr>
-        <a:xfrm>
-          <a:off x="0" y="0"/>
-          <a:ext cx="0" cy="0"/>
-          <a:chOff x="0" y="0"/>
-          <a:chExt cx="0" cy="0"/>
-        </a:xfrm>
-      </p:grpSpPr>
-      <p:sp>
-        <p:nvSpPr>
-          <p:cNvPr id="2" name="Foliennummernplatzhalter 1">
-            <a:extLst>
-              <a:ext uri="{FF2B5EF4-FFF2-40B4-BE49-F238E27FC236}">
-                <a16:creationId xmlns:a16="http://schemas.microsoft.com/office/drawing/2014/main" id="{935BE36D-9786-474B-8B37-699633B82ED3}"/>
-              </a:ext>
-            </a:extLst>
-          </p:cNvPr>
-          <p:cNvSpPr>
-            <a:spLocks noGrp="1"/>
-          </p:cNvSpPr>
-          <p:nvPr>
-            <p:ph type="sldNum" sz="quarter" idx="4"/>
-          </p:nvPr>
-        </p:nvSpPr>
-        <p:spPr/>
-        <p:txBody>
-          <a:bodyPr/>
-          <a:lstStyle/>
-          <a:p>
-            <a:fld id="{90CB4078-9F56-DD45-BCAD-AB9C14C5FED1}" type="slidenum">
-              <a:rPr lang="de-DE" smtClean="0"/>
-              <a:pPr/>
-              <a:t>19</a:t>
-            </a:fld>
-            <a:endParaRPr lang="de-DE" sz="1400" dirty="0"/>
-          </a:p>
-        </p:txBody>
-      </p:sp>
-      <p:sp>
-        <p:nvSpPr>
-          <p:cNvPr id="3" name="Textfeld 2">
-            <a:extLst>
-              <a:ext uri="{FF2B5EF4-FFF2-40B4-BE49-F238E27FC236}">
-                <a16:creationId xmlns:a16="http://schemas.microsoft.com/office/drawing/2014/main" id="{BD6B9D4F-AF02-214B-AF6C-D228B7DE0A6E}"/>
-              </a:ext>
-            </a:extLst>
-          </p:cNvPr>
-          <p:cNvSpPr txBox="1"/>
-          <p:nvPr/>
-        </p:nvSpPr>
-        <p:spPr>
-          <a:xfrm>
-            <a:off x="1243173" y="267127"/>
-            <a:ext cx="7541231" cy="430887"/>
-          </a:xfrm>
-          <a:prstGeom prst="rect">
-            <a:avLst/>
-          </a:prstGeom>
-          <a:noFill/>
-        </p:spPr>
-        <p:txBody>
-          <a:bodyPr wrap="square" rtlCol="0">
-            <a:spAutoFit/>
-          </a:bodyPr>
-          <a:lstStyle/>
-          <a:p>
-            <a:pPr algn="ctr"/>
-            <a:r>
-              <a:rPr lang="de-DE" sz="2200" dirty="0"/>
-              <a:t>4. The </a:t>
-            </a:r>
-            <a:r>
-              <a:rPr lang="de-DE" sz="2200" dirty="0" err="1"/>
-              <a:t>state</a:t>
-            </a:r>
-            <a:r>
-              <a:rPr lang="de-DE" sz="2200" dirty="0"/>
-              <a:t> </a:t>
-            </a:r>
-            <a:r>
-              <a:rPr lang="de-DE" sz="2200" dirty="0" err="1"/>
-              <a:t>of</a:t>
-            </a:r>
-            <a:r>
-              <a:rPr lang="de-DE" sz="2200" dirty="0"/>
-              <a:t> </a:t>
-            </a:r>
-            <a:r>
-              <a:rPr lang="de-DE" sz="2200" dirty="0" err="1"/>
-              <a:t>things</a:t>
-            </a:r>
-            <a:endParaRPr lang="de-DE" sz="2200" dirty="0"/>
-          </a:p>
-        </p:txBody>
-      </p:sp>
-      <p:sp>
-        <p:nvSpPr>
-          <p:cNvPr id="8" name="Textfeld 7">
-            <a:extLst>
-              <a:ext uri="{FF2B5EF4-FFF2-40B4-BE49-F238E27FC236}">
-                <a16:creationId xmlns:a16="http://schemas.microsoft.com/office/drawing/2014/main" id="{D4858632-4DA6-9C49-A4AF-A4E6A582D05A}"/>
-              </a:ext>
-            </a:extLst>
-          </p:cNvPr>
-          <p:cNvSpPr txBox="1"/>
-          <p:nvPr/>
-        </p:nvSpPr>
-        <p:spPr>
-          <a:xfrm>
-            <a:off x="3726082" y="2803688"/>
-            <a:ext cx="1691835" cy="1250623"/>
-          </a:xfrm>
-          <a:prstGeom prst="rect">
-            <a:avLst/>
-          </a:prstGeom>
-          <a:noFill/>
-        </p:spPr>
-        <p:txBody>
-          <a:bodyPr wrap="square" rtlCol="0" anchor="ctr" anchorCtr="0">
-            <a:noAutofit/>
-          </a:bodyPr>
-          <a:lstStyle/>
-          <a:p>
-            <a:pPr algn="ctr"/>
-            <a:r>
-              <a:rPr lang="de-DE" sz="3600" dirty="0"/>
-              <a:t>Demo</a:t>
-            </a:r>
-          </a:p>
-        </p:txBody>
-      </p:sp>
-    </p:spTree>
-    <p:extLst>
-      <p:ext uri="{BB962C8B-B14F-4D97-AF65-F5344CB8AC3E}">
-        <p14:creationId xmlns:p14="http://schemas.microsoft.com/office/powerpoint/2010/main" val="2501473223"/>
-      </p:ext>
-    </p:extLst>
-  </p:cSld>
-  <p:clrMapOvr>
-    <a:masterClrMapping/>
-  </p:clrMapOvr>
-</p:sld>
-</file>
-
 <file path=ppt/slides/slide2.xml><?xml version="1.0" encoding="utf-8"?>
 <p:sld xmlns:a="http://schemas.openxmlformats.org/drawingml/2006/main" xmlns:r="http://schemas.openxmlformats.org/officeDocument/2006/relationships" xmlns:p="http://schemas.openxmlformats.org/presentationml/2006/main">
   <p:cSld>
@@ -7981,6 +8156,53 @@
             </a:pPr>
             <a:r>
               <a:rPr lang="de-DE" sz="2200" b="1" dirty="0"/>
+              <a:t>Felix </a:t>
+            </a:r>
+            <a:r>
+              <a:rPr lang="de-DE" sz="2200" b="1" dirty="0" err="1"/>
+              <a:t>Hirschel</a:t>
+            </a:r>
+            <a:r>
+              <a:rPr lang="de-DE" sz="2200" b="1" dirty="0"/>
+              <a:t> 			</a:t>
+            </a:r>
+            <a:r>
+              <a:rPr lang="de-DE" sz="2200" dirty="0"/>
+              <a:t>(</a:t>
+            </a:r>
+            <a:r>
+              <a:rPr lang="de-DE" sz="2200" dirty="0" err="1"/>
+              <a:t>Full</a:t>
+            </a:r>
+            <a:r>
+              <a:rPr lang="de-DE" sz="2200" dirty="0"/>
+              <a:t> Stack Development </a:t>
+            </a:r>
+            <a:r>
+              <a:rPr lang="de-DE" sz="2200" dirty="0" err="1"/>
+              <a:t>and</a:t>
+            </a:r>
+            <a:r>
+              <a:rPr lang="de-DE" sz="2200" dirty="0"/>
+              <a:t> </a:t>
+            </a:r>
+            <a:r>
+              <a:rPr lang="de-DE" sz="2200" dirty="0" err="1"/>
+              <a:t>Testing</a:t>
+            </a:r>
+            <a:r>
+              <a:rPr lang="de-DE" sz="2200" dirty="0"/>
+              <a:t>)</a:t>
+            </a:r>
+          </a:p>
+          <a:p>
+            <a:pPr marL="9525">
+              <a:lnSpc>
+                <a:spcPts val="6000"/>
+              </a:lnSpc>
+            </a:pPr>
+            <a:r>
+              <a:rPr lang="de-DE" sz="2200" b="1" dirty="0"/>
               <a:t>Lars </a:t>
             </a:r>
             <a:r>
@@ -8006,49 +8228,6 @@
             <a:r>
               <a:rPr lang="de-DE" sz="2200" dirty="0"/>
               <a:t> PM)</a:t>
-            </a:r>
-            <a:br>
-              <a:rPr lang="de-DE" sz="2200" dirty="0"/>
-            </a:br>
-            <a:r>
-              <a:rPr lang="de-DE" sz="2200" b="1" dirty="0"/>
-              <a:t>Felix </a:t>
-            </a:r>
-            <a:r>
-              <a:rPr lang="de-DE" sz="2200" b="1" dirty="0" err="1"/>
-              <a:t>Hirschel</a:t>
-            </a:r>
-            <a:r>
-              <a:rPr lang="de-DE" sz="2200" b="1" dirty="0"/>
-              <a:t> 			</a:t>
-            </a:r>
-            <a:r>
-              <a:rPr lang="de-DE" sz="2200" dirty="0"/>
-              <a:t>(</a:t>
-            </a:r>
-            <a:r>
-              <a:rPr lang="de-DE" sz="2200" dirty="0" err="1"/>
-              <a:t>Full</a:t>
-            </a:r>
-            <a:r>
-              <a:rPr lang="de-DE" sz="2200" dirty="0"/>
-              <a:t> Stack Development </a:t>
-            </a:r>
-            <a:r>
-              <a:rPr lang="de-DE" sz="2200" dirty="0" err="1"/>
-              <a:t>and</a:t>
-            </a:r>
-            <a:r>
-              <a:rPr lang="de-DE" sz="2200" dirty="0"/>
-              <a:t> </a:t>
-            </a:r>
-            <a:r>
-              <a:rPr lang="de-DE" sz="2200" dirty="0" err="1"/>
-              <a:t>Testing</a:t>
-            </a:r>
-            <a:r>
-              <a:rPr lang="de-DE" sz="2200" dirty="0"/>
-              <a:t>)</a:t>
             </a:r>
             <a:br>
               <a:rPr lang="de-DE" sz="2200" dirty="0"/>
@@ -8181,10 +8360,10 @@
       </p:sp>
       <p:sp>
         <p:nvSpPr>
-          <p:cNvPr id="1087" name="Textfeld 1086">
+          <p:cNvPr id="3" name="Textfeld 2">
             <a:extLst>
               <a:ext uri="{FF2B5EF4-FFF2-40B4-BE49-F238E27FC236}">
-                <a16:creationId xmlns:a16="http://schemas.microsoft.com/office/drawing/2014/main" id="{F85A51C6-6B57-204E-809C-B14D8CB91615}"/>
+                <a16:creationId xmlns:a16="http://schemas.microsoft.com/office/drawing/2014/main" id="{BD6B9D4F-AF02-214B-AF6C-D228B7DE0A6E}"/>
               </a:ext>
             </a:extLst>
           </p:cNvPr>
@@ -8210,7 +8389,15 @@
             <a:pPr algn="ctr"/>
             <a:r>
               <a:rPr lang="de-DE" sz="2200" dirty="0"/>
-              <a:t>Table </a:t>
+              <a:t>4. The </a:t>
+            </a:r>
+            <a:r>
+              <a:rPr lang="de-DE" sz="2200" dirty="0" err="1"/>
+              <a:t>state</a:t>
+            </a:r>
+            <a:r>
+              <a:rPr lang="de-DE" sz="2200" dirty="0"/>
+              <a:t> </a:t>
             </a:r>
             <a:r>
               <a:rPr lang="de-DE" sz="2200" dirty="0" err="1"/>
@@ -8222,7 +8409,7 @@
             </a:r>
             <a:r>
               <a:rPr lang="de-DE" sz="2200" dirty="0" err="1"/>
-              <a:t>contents</a:t>
+              <a:t>things</a:t>
             </a:r>
             <a:endParaRPr lang="de-DE" sz="2200" dirty="0"/>
           </a:p>
@@ -8230,10 +8417,10 @@
       </p:sp>
       <p:sp>
         <p:nvSpPr>
-          <p:cNvPr id="1088" name="Textfeld 1087">
+          <p:cNvPr id="8" name="Textfeld 7">
             <a:extLst>
               <a:ext uri="{FF2B5EF4-FFF2-40B4-BE49-F238E27FC236}">
-                <a16:creationId xmlns:a16="http://schemas.microsoft.com/office/drawing/2014/main" id="{42C5708C-846E-AD45-9B85-2D63BCC69AF8}"/>
+                <a16:creationId xmlns:a16="http://schemas.microsoft.com/office/drawing/2014/main" id="{D4858632-4DA6-9C49-A4AF-A4E6A582D05A}"/>
               </a:ext>
             </a:extLst>
           </p:cNvPr>
@@ -8242,8 +8429,8 @@
         </p:nvSpPr>
         <p:spPr>
           <a:xfrm>
-            <a:off x="2671277" y="924680"/>
-            <a:ext cx="4880225" cy="5085703"/>
+            <a:off x="3726082" y="2803688"/>
+            <a:ext cx="1691835" cy="1250623"/>
           </a:xfrm>
           <a:prstGeom prst="rect">
             <a:avLst/>
@@ -8251,201 +8438,23 @@
           <a:noFill/>
         </p:spPr>
         <p:txBody>
-          <a:bodyPr wrap="square" lIns="90000" rtlCol="0" anchor="t" anchorCtr="0">
+          <a:bodyPr wrap="square" rtlCol="0" anchor="ctr" anchorCtr="0">
             <a:noAutofit/>
           </a:bodyPr>
           <a:lstStyle/>
           <a:p>
-            <a:pPr marL="342900" indent="-342900">
-              <a:lnSpc>
-                <a:spcPct val="300000"/>
-              </a:lnSpc>
-              <a:buFont typeface="+mj-lt"/>
-              <a:buAutoNum type="arabicPeriod"/>
-            </a:pPr>
-            <a:r>
-              <a:rPr lang="de-DE" sz="2200" dirty="0" err="1"/>
-              <a:t>What</a:t>
-            </a:r>
-            <a:r>
-              <a:rPr lang="de-DE" sz="2200" dirty="0"/>
-              <a:t> </a:t>
-            </a:r>
-            <a:r>
-              <a:rPr lang="de-DE" sz="2200" dirty="0" err="1"/>
-              <a:t>is</a:t>
-            </a:r>
-            <a:r>
-              <a:rPr lang="de-DE" sz="2200" dirty="0"/>
-              <a:t> „URL </a:t>
-            </a:r>
-            <a:r>
-              <a:rPr lang="de-DE" sz="2200" dirty="0" err="1"/>
-              <a:t>Shortening</a:t>
-            </a:r>
-            <a:r>
-              <a:rPr lang="de-DE" sz="2200" dirty="0"/>
-              <a:t>“?</a:t>
-            </a:r>
-          </a:p>
-          <a:p>
-            <a:pPr marL="342900" indent="-342900">
-              <a:lnSpc>
-                <a:spcPct val="300000"/>
-              </a:lnSpc>
-              <a:buFont typeface="+mj-lt"/>
-              <a:buAutoNum type="arabicPeriod"/>
-            </a:pPr>
-            <a:r>
-              <a:rPr lang="de-DE" sz="2200" dirty="0" err="1"/>
-              <a:t>Why</a:t>
-            </a:r>
-            <a:r>
-              <a:rPr lang="de-DE" sz="2200" dirty="0"/>
-              <a:t> do </a:t>
-            </a:r>
-            <a:r>
-              <a:rPr lang="de-DE" sz="2200" dirty="0" err="1"/>
-              <a:t>you</a:t>
-            </a:r>
-            <a:r>
-              <a:rPr lang="de-DE" sz="2200" dirty="0"/>
-              <a:t> </a:t>
-            </a:r>
-            <a:r>
-              <a:rPr lang="de-DE" sz="2200" dirty="0" err="1"/>
-              <a:t>need</a:t>
-            </a:r>
-            <a:r>
-              <a:rPr lang="de-DE" sz="2200" dirty="0"/>
-              <a:t> BFFL?</a:t>
-            </a:r>
-          </a:p>
-          <a:p>
-            <a:pPr marL="342900" indent="-342900">
-              <a:lnSpc>
-                <a:spcPct val="300000"/>
-              </a:lnSpc>
-              <a:buFont typeface="+mj-lt"/>
-              <a:buAutoNum type="arabicPeriod"/>
-            </a:pPr>
-            <a:r>
-              <a:rPr lang="de-DE" sz="2200" dirty="0"/>
-              <a:t>Project </a:t>
-            </a:r>
-            <a:r>
-              <a:rPr lang="de-DE" sz="2200" dirty="0" err="1"/>
-              <a:t>management</a:t>
-            </a:r>
-            <a:r>
-              <a:rPr lang="de-DE" sz="2200" dirty="0"/>
-              <a:t> </a:t>
-            </a:r>
-            <a:r>
-              <a:rPr lang="de-DE" sz="2200" dirty="0" err="1"/>
-              <a:t>and</a:t>
-            </a:r>
-            <a:r>
-              <a:rPr lang="de-DE" sz="2200" dirty="0"/>
-              <a:t> </a:t>
-            </a:r>
-            <a:r>
-              <a:rPr lang="de-DE" sz="2200" dirty="0" err="1"/>
-              <a:t>approach</a:t>
-            </a:r>
-            <a:endParaRPr lang="de-DE" sz="2200" dirty="0"/>
-          </a:p>
-          <a:p>
-            <a:pPr marL="342900" indent="-342900">
-              <a:lnSpc>
-                <a:spcPct val="300000"/>
-              </a:lnSpc>
-              <a:buFont typeface="+mj-lt"/>
-              <a:buAutoNum type="arabicPeriod"/>
-            </a:pPr>
-            <a:r>
-              <a:rPr lang="de-DE" sz="2200" dirty="0"/>
-              <a:t>State </a:t>
-            </a:r>
-            <a:r>
-              <a:rPr lang="de-DE" sz="2200" dirty="0" err="1"/>
-              <a:t>of</a:t>
-            </a:r>
-            <a:r>
-              <a:rPr lang="de-DE" sz="2200" dirty="0"/>
-              <a:t> </a:t>
-            </a:r>
-            <a:r>
-              <a:rPr lang="de-DE" sz="2200" dirty="0" err="1"/>
-              <a:t>things</a:t>
-            </a:r>
-            <a:endParaRPr lang="de-DE" sz="2200" dirty="0"/>
-          </a:p>
-          <a:p>
-            <a:pPr marL="342900" indent="-342900">
-              <a:lnSpc>
-                <a:spcPct val="300000"/>
-              </a:lnSpc>
-              <a:buFont typeface="+mj-lt"/>
-              <a:buAutoNum type="arabicPeriod"/>
-            </a:pPr>
-            <a:r>
-              <a:rPr lang="de-DE" sz="2200" dirty="0"/>
-              <a:t>Outlook</a:t>
-            </a:r>
-          </a:p>
-        </p:txBody>
-      </p:sp>
-      <p:sp>
-        <p:nvSpPr>
-          <p:cNvPr id="1089" name="Dreieck 1088">
-            <a:extLst>
-              <a:ext uri="{FF2B5EF4-FFF2-40B4-BE49-F238E27FC236}">
-                <a16:creationId xmlns:a16="http://schemas.microsoft.com/office/drawing/2014/main" id="{EA0C8883-C05D-F74E-B032-885D45E71914}"/>
-              </a:ext>
-            </a:extLst>
-          </p:cNvPr>
-          <p:cNvSpPr/>
-          <p:nvPr/>
-        </p:nvSpPr>
-        <p:spPr>
-          <a:xfrm rot="5400000">
-            <a:off x="1885008" y="5443228"/>
-            <a:ext cx="626361" cy="434798"/>
-          </a:xfrm>
-          <a:prstGeom prst="triangle">
-            <a:avLst/>
-          </a:prstGeom>
-        </p:spPr>
-        <p:style>
-          <a:lnRef idx="2">
-            <a:schemeClr val="accent1">
-              <a:shade val="50000"/>
-            </a:schemeClr>
-          </a:lnRef>
-          <a:fillRef idx="1">
-            <a:schemeClr val="accent1"/>
-          </a:fillRef>
-          <a:effectRef idx="0">
-            <a:schemeClr val="accent1"/>
-          </a:effectRef>
-          <a:fontRef idx="minor">
-            <a:schemeClr val="lt1"/>
-          </a:fontRef>
-        </p:style>
-        <p:txBody>
-          <a:bodyPr rtlCol="0" anchor="ctr"/>
-          <a:lstStyle/>
-          <a:p>
             <a:pPr algn="ctr"/>
-            <a:endParaRPr lang="de-DE"/>
+            <a:r>
+              <a:rPr lang="de-DE" sz="3600" dirty="0"/>
+              <a:t>Demo</a:t>
+            </a:r>
           </a:p>
         </p:txBody>
       </p:sp>
     </p:spTree>
     <p:extLst>
       <p:ext uri="{BB962C8B-B14F-4D97-AF65-F5344CB8AC3E}">
-        <p14:creationId xmlns:p14="http://schemas.microsoft.com/office/powerpoint/2010/main" val="2014156101"/>
+        <p14:creationId xmlns:p14="http://schemas.microsoft.com/office/powerpoint/2010/main" val="2501473223"/>
       </p:ext>
     </p:extLst>
   </p:cSld>
@@ -8504,10 +8513,10 @@
       </p:sp>
       <p:sp>
         <p:nvSpPr>
-          <p:cNvPr id="3" name="Textfeld 2">
+          <p:cNvPr id="1087" name="Textfeld 1086">
             <a:extLst>
               <a:ext uri="{FF2B5EF4-FFF2-40B4-BE49-F238E27FC236}">
-                <a16:creationId xmlns:a16="http://schemas.microsoft.com/office/drawing/2014/main" id="{BD6B9D4F-AF02-214B-AF6C-D228B7DE0A6E}"/>
+                <a16:creationId xmlns:a16="http://schemas.microsoft.com/office/drawing/2014/main" id="{F85A51C6-6B57-204E-809C-B14D8CB91615}"/>
               </a:ext>
             </a:extLst>
           </p:cNvPr>
@@ -8533,17 +8542,30 @@
             <a:pPr algn="ctr"/>
             <a:r>
               <a:rPr lang="de-DE" sz="2200" dirty="0"/>
-              <a:t>5. Outlook</a:t>
-            </a:r>
+              <a:t>Table </a:t>
+            </a:r>
+            <a:r>
+              <a:rPr lang="de-DE" sz="2200" dirty="0" err="1"/>
+              <a:t>of</a:t>
+            </a:r>
+            <a:r>
+              <a:rPr lang="de-DE" sz="2200" dirty="0"/>
+              <a:t> </a:t>
+            </a:r>
+            <a:r>
+              <a:rPr lang="de-DE" sz="2200" dirty="0" err="1"/>
+              <a:t>contents</a:t>
+            </a:r>
+            <a:endParaRPr lang="de-DE" sz="2200" dirty="0"/>
           </a:p>
         </p:txBody>
       </p:sp>
       <p:sp>
         <p:nvSpPr>
-          <p:cNvPr id="8" name="Textfeld 7">
+          <p:cNvPr id="1088" name="Textfeld 1087">
             <a:extLst>
               <a:ext uri="{FF2B5EF4-FFF2-40B4-BE49-F238E27FC236}">
-                <a16:creationId xmlns:a16="http://schemas.microsoft.com/office/drawing/2014/main" id="{4F948EB6-FA92-2744-9B85-EF0FA557337B}"/>
+                <a16:creationId xmlns:a16="http://schemas.microsoft.com/office/drawing/2014/main" id="{42C5708C-846E-AD45-9B85-2D63BCC69AF8}"/>
               </a:ext>
             </a:extLst>
           </p:cNvPr>
@@ -8552,8 +8574,8 @@
         </p:nvSpPr>
         <p:spPr>
           <a:xfrm>
-            <a:off x="1424145" y="1338097"/>
-            <a:ext cx="1332031" cy="461665"/>
+            <a:off x="2671277" y="924680"/>
+            <a:ext cx="4880225" cy="5085703"/>
           </a:xfrm>
           <a:prstGeom prst="rect">
             <a:avLst/>
@@ -8561,59 +8583,12 @@
           <a:noFill/>
         </p:spPr>
         <p:txBody>
-          <a:bodyPr wrap="none" rtlCol="0">
-            <a:spAutoFit/>
-          </a:bodyPr>
-          <a:lstStyle/>
-          <a:p>
-            <a:r>
-              <a:rPr lang="de-DE" sz="2400" u="sng" dirty="0" err="1"/>
-              <a:t>ToDo</a:t>
-            </a:r>
-            <a:r>
-              <a:rPr lang="de-DE" sz="2400" u="sng" dirty="0"/>
-              <a:t> </a:t>
-            </a:r>
-            <a:r>
-              <a:rPr lang="de-DE" sz="2400" u="sng" dirty="0" err="1"/>
-              <a:t>list</a:t>
-            </a:r>
-            <a:r>
-              <a:rPr lang="de-DE" sz="2400" u="sng" dirty="0"/>
-              <a:t>:</a:t>
-            </a:r>
-          </a:p>
-        </p:txBody>
-      </p:sp>
-      <p:sp>
-        <p:nvSpPr>
-          <p:cNvPr id="9" name="Textfeld 8">
-            <a:extLst>
-              <a:ext uri="{FF2B5EF4-FFF2-40B4-BE49-F238E27FC236}">
-                <a16:creationId xmlns:a16="http://schemas.microsoft.com/office/drawing/2014/main" id="{6AF14281-088C-9846-B04F-78A5E1BAF7E7}"/>
-              </a:ext>
-            </a:extLst>
-          </p:cNvPr>
-          <p:cNvSpPr txBox="1"/>
-          <p:nvPr/>
-        </p:nvSpPr>
-        <p:spPr>
-          <a:xfrm>
-            <a:off x="1740625" y="1795082"/>
-            <a:ext cx="4958558" cy="4203381"/>
-          </a:xfrm>
-          <a:prstGeom prst="rect">
-            <a:avLst/>
-          </a:prstGeom>
-          <a:noFill/>
-        </p:spPr>
-        <p:txBody>
-          <a:bodyPr wrap="square" tIns="0" rtlCol="0" anchor="t" anchorCtr="0">
+          <a:bodyPr wrap="square" lIns="90000" rtlCol="0" anchor="t" anchorCtr="0">
             <a:noAutofit/>
           </a:bodyPr>
           <a:lstStyle/>
           <a:p>
-            <a:pPr marL="457200" indent="-457200">
+            <a:pPr marL="342900" indent="-342900">
               <a:lnSpc>
                 <a:spcPct val="300000"/>
               </a:lnSpc>
@@ -8621,28 +8596,32 @@
               <a:buAutoNum type="arabicPeriod"/>
             </a:pPr>
             <a:r>
+              <a:rPr lang="de-DE" sz="2200" dirty="0" err="1"/>
+              <a:t>What</a:t>
+            </a:r>
+            <a:r>
               <a:rPr lang="de-DE" sz="2200" dirty="0"/>
-              <a:t>Fixes </a:t>
+              <a:t> </a:t>
             </a:r>
             <a:r>
               <a:rPr lang="de-DE" sz="2200" dirty="0" err="1"/>
-              <a:t>and</a:t>
+              <a:t>is</a:t>
             </a:r>
             <a:r>
               <a:rPr lang="de-DE" sz="2200" dirty="0"/>
-              <a:t> finish Update-</a:t>
+              <a:t> „URL </a:t>
             </a:r>
             <a:r>
               <a:rPr lang="de-DE" sz="2200" dirty="0" err="1"/>
-              <a:t>ShortURL</a:t>
+              <a:t>Shortening</a:t>
             </a:r>
             <a:r>
               <a:rPr lang="de-DE" sz="2200" dirty="0"/>
-              <a:t>-UC</a:t>
+              <a:t>“?</a:t>
             </a:r>
           </a:p>
           <a:p>
-            <a:pPr marL="457200" indent="-457200">
+            <a:pPr marL="342900" indent="-342900">
               <a:lnSpc>
                 <a:spcPct val="300000"/>
               </a:lnSpc>
@@ -8650,17 +8629,32 @@
               <a:buAutoNum type="arabicPeriod"/>
             </a:pPr>
             <a:r>
+              <a:rPr lang="de-DE" sz="2200" dirty="0" err="1"/>
+              <a:t>Why</a:t>
+            </a:r>
+            <a:r>
               <a:rPr lang="de-DE" sz="2200" dirty="0"/>
-              <a:t>Group </a:t>
+              <a:t> do </a:t>
             </a:r>
             <a:r>
               <a:rPr lang="de-DE" sz="2200" dirty="0" err="1"/>
-              <a:t>management</a:t>
-            </a:r>
-            <a:endParaRPr lang="de-DE" sz="2200" dirty="0"/>
+              <a:t>you</a:t>
+            </a:r>
+            <a:r>
+              <a:rPr lang="de-DE" sz="2200" dirty="0"/>
+              <a:t> </a:t>
+            </a:r>
+            <a:r>
+              <a:rPr lang="de-DE" sz="2200" dirty="0" err="1"/>
+              <a:t>need</a:t>
+            </a:r>
+            <a:r>
+              <a:rPr lang="de-DE" sz="2200" dirty="0"/>
+              <a:t> BFFL?</a:t>
+            </a:r>
           </a:p>
           <a:p>
-            <a:pPr marL="457200" indent="-457200">
+            <a:pPr marL="342900" indent="-342900">
               <a:lnSpc>
                 <a:spcPct val="300000"/>
               </a:lnSpc>
@@ -8669,16 +8663,32 @@
             </a:pPr>
             <a:r>
               <a:rPr lang="de-DE" sz="2200" dirty="0"/>
-              <a:t>Admin </a:t>
+              <a:t>Project </a:t>
             </a:r>
             <a:r>
               <a:rPr lang="de-DE" sz="2200" dirty="0" err="1"/>
-              <a:t>console</a:t>
+              <a:t>management</a:t>
+            </a:r>
+            <a:r>
+              <a:rPr lang="de-DE" sz="2200" dirty="0"/>
+              <a:t> </a:t>
+            </a:r>
+            <a:r>
+              <a:rPr lang="de-DE" sz="2200" dirty="0" err="1"/>
+              <a:t>and</a:t>
+            </a:r>
+            <a:r>
+              <a:rPr lang="de-DE" sz="2200" dirty="0"/>
+              <a:t> </a:t>
+            </a:r>
+            <a:r>
+              <a:rPr lang="de-DE" sz="2200" dirty="0" err="1"/>
+              <a:t>approach</a:t>
             </a:r>
             <a:endParaRPr lang="de-DE" sz="2200" dirty="0"/>
           </a:p>
           <a:p>
-            <a:pPr marL="457200" indent="-457200">
+            <a:pPr marL="342900" indent="-342900">
               <a:lnSpc>
                 <a:spcPct val="300000"/>
               </a:lnSpc>
@@ -8687,20 +8697,87 @@
             </a:pPr>
             <a:r>
               <a:rPr lang="de-DE" sz="2200" dirty="0"/>
-              <a:t>Data </a:t>
+              <a:t>State </a:t>
             </a:r>
             <a:r>
               <a:rPr lang="de-DE" sz="2200" dirty="0" err="1"/>
-              <a:t>analysis</a:t>
+              <a:t>of</a:t>
+            </a:r>
+            <a:r>
+              <a:rPr lang="de-DE" sz="2200" dirty="0"/>
+              <a:t> </a:t>
+            </a:r>
+            <a:r>
+              <a:rPr lang="de-DE" sz="2200" dirty="0" err="1"/>
+              <a:t>things</a:t>
             </a:r>
             <a:endParaRPr lang="de-DE" sz="2200" dirty="0"/>
+          </a:p>
+          <a:p>
+            <a:pPr marL="342900" indent="-342900">
+              <a:lnSpc>
+                <a:spcPct val="300000"/>
+              </a:lnSpc>
+              <a:buFont typeface="+mj-lt"/>
+              <a:buAutoNum type="arabicPeriod"/>
+            </a:pPr>
+            <a:r>
+              <a:rPr lang="de-DE" sz="2200" dirty="0"/>
+              <a:t>Outlook</a:t>
+            </a:r>
+          </a:p>
+        </p:txBody>
+      </p:sp>
+      <p:sp>
+        <p:nvSpPr>
+          <p:cNvPr id="1089" name="Dreieck 1088">
+            <a:extLst>
+              <a:ext uri="{FF2B5EF4-FFF2-40B4-BE49-F238E27FC236}">
+                <a16:creationId xmlns:a16="http://schemas.microsoft.com/office/drawing/2014/main" id="{EA0C8883-C05D-F74E-B032-885D45E71914}"/>
+              </a:ext>
+            </a:extLst>
+          </p:cNvPr>
+          <p:cNvSpPr/>
+          <p:nvPr/>
+        </p:nvSpPr>
+        <p:spPr>
+          <a:xfrm rot="5400000">
+            <a:off x="1885008" y="5443228"/>
+            <a:ext cx="626361" cy="434798"/>
+          </a:xfrm>
+          <a:prstGeom prst="triangle">
+            <a:avLst/>
+          </a:prstGeom>
+        </p:spPr>
+        <p:style>
+          <a:lnRef idx="2">
+            <a:schemeClr val="accent1">
+              <a:shade val="50000"/>
+            </a:schemeClr>
+          </a:lnRef>
+          <a:fillRef idx="1">
+            <a:schemeClr val="accent1"/>
+          </a:fillRef>
+          <a:effectRef idx="0">
+            <a:schemeClr val="accent1"/>
+          </a:effectRef>
+          <a:fontRef idx="minor">
+            <a:schemeClr val="lt1"/>
+          </a:fontRef>
+        </p:style>
+        <p:txBody>
+          <a:bodyPr rtlCol="0" anchor="ctr"/>
+          <a:lstStyle/>
+          <a:p>
+            <a:pPr algn="ctr"/>
+            <a:endParaRPr lang="de-DE"/>
           </a:p>
         </p:txBody>
       </p:sp>
     </p:spTree>
     <p:extLst>
       <p:ext uri="{BB962C8B-B14F-4D97-AF65-F5344CB8AC3E}">
-        <p14:creationId xmlns:p14="http://schemas.microsoft.com/office/powerpoint/2010/main" val="1719607759"/>
+        <p14:creationId xmlns:p14="http://schemas.microsoft.com/office/powerpoint/2010/main" val="2014156101"/>
       </p:ext>
     </p:extLst>
   </p:cSld>
@@ -8793,6 +8870,261 @@
           </a:p>
         </p:txBody>
       </p:sp>
+      <p:sp>
+        <p:nvSpPr>
+          <p:cNvPr id="8" name="Textfeld 7">
+            <a:extLst>
+              <a:ext uri="{FF2B5EF4-FFF2-40B4-BE49-F238E27FC236}">
+                <a16:creationId xmlns:a16="http://schemas.microsoft.com/office/drawing/2014/main" id="{4F948EB6-FA92-2744-9B85-EF0FA557337B}"/>
+              </a:ext>
+            </a:extLst>
+          </p:cNvPr>
+          <p:cNvSpPr txBox="1"/>
+          <p:nvPr/>
+        </p:nvSpPr>
+        <p:spPr>
+          <a:xfrm>
+            <a:off x="1424145" y="1338097"/>
+            <a:ext cx="1332031" cy="461665"/>
+          </a:xfrm>
+          <a:prstGeom prst="rect">
+            <a:avLst/>
+          </a:prstGeom>
+          <a:noFill/>
+        </p:spPr>
+        <p:txBody>
+          <a:bodyPr wrap="none" rtlCol="0">
+            <a:spAutoFit/>
+          </a:bodyPr>
+          <a:lstStyle/>
+          <a:p>
+            <a:r>
+              <a:rPr lang="de-DE" sz="2400" u="sng" dirty="0" err="1"/>
+              <a:t>ToDo</a:t>
+            </a:r>
+            <a:r>
+              <a:rPr lang="de-DE" sz="2400" u="sng" dirty="0"/>
+              <a:t> </a:t>
+            </a:r>
+            <a:r>
+              <a:rPr lang="de-DE" sz="2400" u="sng" dirty="0" err="1"/>
+              <a:t>list</a:t>
+            </a:r>
+            <a:r>
+              <a:rPr lang="de-DE" sz="2400" u="sng" dirty="0"/>
+              <a:t>:</a:t>
+            </a:r>
+          </a:p>
+        </p:txBody>
+      </p:sp>
+      <p:sp>
+        <p:nvSpPr>
+          <p:cNvPr id="9" name="Textfeld 8">
+            <a:extLst>
+              <a:ext uri="{FF2B5EF4-FFF2-40B4-BE49-F238E27FC236}">
+                <a16:creationId xmlns:a16="http://schemas.microsoft.com/office/drawing/2014/main" id="{6AF14281-088C-9846-B04F-78A5E1BAF7E7}"/>
+              </a:ext>
+            </a:extLst>
+          </p:cNvPr>
+          <p:cNvSpPr txBox="1"/>
+          <p:nvPr/>
+        </p:nvSpPr>
+        <p:spPr>
+          <a:xfrm>
+            <a:off x="1740625" y="1795082"/>
+            <a:ext cx="4958558" cy="4203381"/>
+          </a:xfrm>
+          <a:prstGeom prst="rect">
+            <a:avLst/>
+          </a:prstGeom>
+          <a:noFill/>
+        </p:spPr>
+        <p:txBody>
+          <a:bodyPr wrap="square" tIns="0" rtlCol="0" anchor="t" anchorCtr="0">
+            <a:noAutofit/>
+          </a:bodyPr>
+          <a:lstStyle/>
+          <a:p>
+            <a:pPr marL="457200" indent="-457200">
+              <a:lnSpc>
+                <a:spcPct val="300000"/>
+              </a:lnSpc>
+              <a:buFont typeface="+mj-lt"/>
+              <a:buAutoNum type="arabicPeriod"/>
+            </a:pPr>
+            <a:r>
+              <a:rPr lang="de-DE" sz="2200" dirty="0"/>
+              <a:t>Fixes </a:t>
+            </a:r>
+            <a:r>
+              <a:rPr lang="de-DE" sz="2200" dirty="0" err="1"/>
+              <a:t>and</a:t>
+            </a:r>
+            <a:r>
+              <a:rPr lang="de-DE" sz="2200" dirty="0"/>
+              <a:t> finish Update-</a:t>
+            </a:r>
+            <a:r>
+              <a:rPr lang="de-DE" sz="2200" dirty="0" err="1"/>
+              <a:t>ShortURL</a:t>
+            </a:r>
+            <a:r>
+              <a:rPr lang="de-DE" sz="2200" dirty="0"/>
+              <a:t>-UC</a:t>
+            </a:r>
+          </a:p>
+          <a:p>
+            <a:pPr marL="457200" indent="-457200">
+              <a:lnSpc>
+                <a:spcPct val="300000"/>
+              </a:lnSpc>
+              <a:buFont typeface="+mj-lt"/>
+              <a:buAutoNum type="arabicPeriod"/>
+            </a:pPr>
+            <a:r>
+              <a:rPr lang="de-DE" sz="2200" dirty="0"/>
+              <a:t>Group </a:t>
+            </a:r>
+            <a:r>
+              <a:rPr lang="de-DE" sz="2200" dirty="0" err="1"/>
+              <a:t>management</a:t>
+            </a:r>
+            <a:endParaRPr lang="de-DE" sz="2200" dirty="0"/>
+          </a:p>
+          <a:p>
+            <a:pPr marL="457200" indent="-457200">
+              <a:lnSpc>
+                <a:spcPct val="300000"/>
+              </a:lnSpc>
+              <a:buFont typeface="+mj-lt"/>
+              <a:buAutoNum type="arabicPeriod"/>
+            </a:pPr>
+            <a:r>
+              <a:rPr lang="de-DE" sz="2200" dirty="0"/>
+              <a:t>Admin </a:t>
+            </a:r>
+            <a:r>
+              <a:rPr lang="de-DE" sz="2200" dirty="0" err="1"/>
+              <a:t>console</a:t>
+            </a:r>
+            <a:endParaRPr lang="de-DE" sz="2200" dirty="0"/>
+          </a:p>
+          <a:p>
+            <a:pPr marL="457200" indent="-457200">
+              <a:lnSpc>
+                <a:spcPct val="300000"/>
+              </a:lnSpc>
+              <a:buFont typeface="+mj-lt"/>
+              <a:buAutoNum type="arabicPeriod"/>
+            </a:pPr>
+            <a:r>
+              <a:rPr lang="de-DE" sz="2200" dirty="0"/>
+              <a:t>Data </a:t>
+            </a:r>
+            <a:r>
+              <a:rPr lang="de-DE" sz="2200" dirty="0" err="1"/>
+              <a:t>analysis</a:t>
+            </a:r>
+            <a:endParaRPr lang="de-DE" sz="2200" dirty="0"/>
+          </a:p>
+        </p:txBody>
+      </p:sp>
+    </p:spTree>
+    <p:extLst>
+      <p:ext uri="{BB962C8B-B14F-4D97-AF65-F5344CB8AC3E}">
+        <p14:creationId xmlns:p14="http://schemas.microsoft.com/office/powerpoint/2010/main" val="1719607759"/>
+      </p:ext>
+    </p:extLst>
+  </p:cSld>
+  <p:clrMapOvr>
+    <a:masterClrMapping/>
+  </p:clrMapOvr>
+</p:sld>
+</file>
+
+<file path=ppt/slides/slide23.xml><?xml version="1.0" encoding="utf-8"?>
+<p:sld xmlns:a="http://schemas.openxmlformats.org/drawingml/2006/main" xmlns:r="http://schemas.openxmlformats.org/officeDocument/2006/relationships" xmlns:p="http://schemas.openxmlformats.org/presentationml/2006/main">
+  <p:cSld>
+    <p:spTree>
+      <p:nvGrpSpPr>
+        <p:cNvPr id="1" name=""/>
+        <p:cNvGrpSpPr/>
+        <p:nvPr/>
+      </p:nvGrpSpPr>
+      <p:grpSpPr>
+        <a:xfrm>
+          <a:off x="0" y="0"/>
+          <a:ext cx="0" cy="0"/>
+          <a:chOff x="0" y="0"/>
+          <a:chExt cx="0" cy="0"/>
+        </a:xfrm>
+      </p:grpSpPr>
+      <p:sp>
+        <p:nvSpPr>
+          <p:cNvPr id="2" name="Foliennummernplatzhalter 1">
+            <a:extLst>
+              <a:ext uri="{FF2B5EF4-FFF2-40B4-BE49-F238E27FC236}">
+                <a16:creationId xmlns:a16="http://schemas.microsoft.com/office/drawing/2014/main" id="{935BE36D-9786-474B-8B37-699633B82ED3}"/>
+              </a:ext>
+            </a:extLst>
+          </p:cNvPr>
+          <p:cNvSpPr>
+            <a:spLocks noGrp="1"/>
+          </p:cNvSpPr>
+          <p:nvPr>
+            <p:ph type="sldNum" sz="quarter" idx="4"/>
+          </p:nvPr>
+        </p:nvSpPr>
+        <p:spPr/>
+        <p:txBody>
+          <a:bodyPr/>
+          <a:lstStyle/>
+          <a:p>
+            <a:fld id="{90CB4078-9F56-DD45-BCAD-AB9C14C5FED1}" type="slidenum">
+              <a:rPr lang="de-DE" smtClean="0"/>
+              <a:pPr/>
+              <a:t>23</a:t>
+            </a:fld>
+            <a:endParaRPr lang="de-DE" sz="1400" dirty="0"/>
+          </a:p>
+        </p:txBody>
+      </p:sp>
+      <p:sp>
+        <p:nvSpPr>
+          <p:cNvPr id="3" name="Textfeld 2">
+            <a:extLst>
+              <a:ext uri="{FF2B5EF4-FFF2-40B4-BE49-F238E27FC236}">
+                <a16:creationId xmlns:a16="http://schemas.microsoft.com/office/drawing/2014/main" id="{BD6B9D4F-AF02-214B-AF6C-D228B7DE0A6E}"/>
+              </a:ext>
+            </a:extLst>
+          </p:cNvPr>
+          <p:cNvSpPr txBox="1"/>
+          <p:nvPr/>
+        </p:nvSpPr>
+        <p:spPr>
+          <a:xfrm>
+            <a:off x="1243173" y="267127"/>
+            <a:ext cx="7541231" cy="430887"/>
+          </a:xfrm>
+          <a:prstGeom prst="rect">
+            <a:avLst/>
+          </a:prstGeom>
+          <a:noFill/>
+        </p:spPr>
+        <p:txBody>
+          <a:bodyPr wrap="square" rtlCol="0">
+            <a:spAutoFit/>
+          </a:bodyPr>
+          <a:lstStyle/>
+          <a:p>
+            <a:pPr algn="ctr"/>
+            <a:r>
+              <a:rPr lang="de-DE" sz="2200" dirty="0"/>
+              <a:t>5. Outlook</a:t>
+            </a:r>
+          </a:p>
+        </p:txBody>
+      </p:sp>
       <p:graphicFrame>
         <p:nvGraphicFramePr>
           <p:cNvPr id="8" name="Diagramm 7">
@@ -8891,7 +9223,7 @@
 </p:sld>
 </file>
 
-<file path=ppt/slides/slide23.xml><?xml version="1.0" encoding="utf-8"?>
+<file path=ppt/slides/slide24.xml><?xml version="1.0" encoding="utf-8"?>
 <p:sld xmlns:a="http://schemas.openxmlformats.org/drawingml/2006/main" xmlns:r="http://schemas.openxmlformats.org/officeDocument/2006/relationships" xmlns:p="http://schemas.openxmlformats.org/presentationml/2006/main">
   <p:cSld>
     <p:spTree>
@@ -9455,7 +9787,7 @@
 </p:sld>
 </file>
 
-<file path=ppt/slides/slide24.xml><?xml version="1.0" encoding="utf-8"?>
+<file path=ppt/slides/slide25.xml><?xml version="1.0" encoding="utf-8"?>
 <p:sld xmlns:a="http://schemas.openxmlformats.org/drawingml/2006/main" xmlns:r="http://schemas.openxmlformats.org/officeDocument/2006/relationships" xmlns:p="http://schemas.openxmlformats.org/presentationml/2006/main">
   <p:cSld>
     <p:spTree>
@@ -9496,7 +9828,7 @@
             <a:fld id="{90CB4078-9F56-DD45-BCAD-AB9C14C5FED1}" type="slidenum">
               <a:rPr lang="de-DE" smtClean="0"/>
               <a:pPr/>
-              <a:t>24</a:t>
+              <a:t>25</a:t>
             </a:fld>
             <a:endParaRPr lang="de-DE" sz="1400" dirty="0"/>
           </a:p>
@@ -9808,7 +10140,7 @@
 </p:sld>
 </file>
 
-<file path=ppt/slides/slide25.xml><?xml version="1.0" encoding="utf-8"?>
+<file path=ppt/slides/slide26.xml><?xml version="1.0" encoding="utf-8"?>
 <p:sld xmlns:a="http://schemas.openxmlformats.org/drawingml/2006/main" xmlns:r="http://schemas.openxmlformats.org/officeDocument/2006/relationships" xmlns:p="http://schemas.openxmlformats.org/presentationml/2006/main">
   <p:cSld>
     <p:spTree>
@@ -9849,7 +10181,7 @@
             <a:fld id="{90CB4078-9F56-DD45-BCAD-AB9C14C5FED1}" type="slidenum">
               <a:rPr lang="de-DE" smtClean="0"/>
               <a:pPr/>
-              <a:t>25</a:t>
+              <a:t>26</a:t>
             </a:fld>
             <a:endParaRPr lang="de-DE" sz="1400" dirty="0"/>
           </a:p>
@@ -10478,681 +10810,6 @@
 </file>
 
 <file path=ppt/slides/slide4.xml><?xml version="1.0" encoding="utf-8"?>
-<p:sld xmlns:a="http://schemas.openxmlformats.org/drawingml/2006/main" xmlns:r="http://schemas.openxmlformats.org/officeDocument/2006/relationships" xmlns:p="http://schemas.openxmlformats.org/presentationml/2006/main">
-  <p:cSld>
-    <p:spTree>
-      <p:nvGrpSpPr>
-        <p:cNvPr id="1" name=""/>
-        <p:cNvGrpSpPr/>
-        <p:nvPr/>
-      </p:nvGrpSpPr>
-      <p:grpSpPr>
-        <a:xfrm>
-          <a:off x="0" y="0"/>
-          <a:ext cx="0" cy="0"/>
-          <a:chOff x="0" y="0"/>
-          <a:chExt cx="0" cy="0"/>
-        </a:xfrm>
-      </p:grpSpPr>
-      <p:sp>
-        <p:nvSpPr>
-          <p:cNvPr id="2" name="Foliennummernplatzhalter 1">
-            <a:extLst>
-              <a:ext uri="{FF2B5EF4-FFF2-40B4-BE49-F238E27FC236}">
-                <a16:creationId xmlns:a16="http://schemas.microsoft.com/office/drawing/2014/main" id="{935BE36D-9786-474B-8B37-699633B82ED3}"/>
-              </a:ext>
-            </a:extLst>
-          </p:cNvPr>
-          <p:cNvSpPr>
-            <a:spLocks noGrp="1"/>
-          </p:cNvSpPr>
-          <p:nvPr>
-            <p:ph type="sldNum" sz="quarter" idx="4"/>
-          </p:nvPr>
-        </p:nvSpPr>
-        <p:spPr/>
-        <p:txBody>
-          <a:bodyPr/>
-          <a:lstStyle/>
-          <a:p>
-            <a:fld id="{90CB4078-9F56-DD45-BCAD-AB9C14C5FED1}" type="slidenum">
-              <a:rPr lang="de-DE" smtClean="0"/>
-              <a:pPr/>
-              <a:t>4</a:t>
-            </a:fld>
-            <a:endParaRPr lang="de-DE" sz="1400" dirty="0"/>
-          </a:p>
-        </p:txBody>
-      </p:sp>
-      <p:sp>
-        <p:nvSpPr>
-          <p:cNvPr id="3" name="Textfeld 2">
-            <a:extLst>
-              <a:ext uri="{FF2B5EF4-FFF2-40B4-BE49-F238E27FC236}">
-                <a16:creationId xmlns:a16="http://schemas.microsoft.com/office/drawing/2014/main" id="{BD6B9D4F-AF02-214B-AF6C-D228B7DE0A6E}"/>
-              </a:ext>
-            </a:extLst>
-          </p:cNvPr>
-          <p:cNvSpPr txBox="1"/>
-          <p:nvPr/>
-        </p:nvSpPr>
-        <p:spPr>
-          <a:xfrm>
-            <a:off x="1243173" y="267127"/>
-            <a:ext cx="7541231" cy="430887"/>
-          </a:xfrm>
-          <a:prstGeom prst="rect">
-            <a:avLst/>
-          </a:prstGeom>
-          <a:noFill/>
-        </p:spPr>
-        <p:txBody>
-          <a:bodyPr wrap="square" rtlCol="0">
-            <a:spAutoFit/>
-          </a:bodyPr>
-          <a:lstStyle/>
-          <a:p>
-            <a:pPr algn="ctr"/>
-            <a:r>
-              <a:rPr lang="de-DE" sz="2200" dirty="0"/>
-              <a:t>1. </a:t>
-            </a:r>
-            <a:r>
-              <a:rPr lang="de-DE" sz="2200" dirty="0" err="1"/>
-              <a:t>What</a:t>
-            </a:r>
-            <a:r>
-              <a:rPr lang="de-DE" sz="2200" dirty="0"/>
-              <a:t> </a:t>
-            </a:r>
-            <a:r>
-              <a:rPr lang="de-DE" sz="2200" dirty="0" err="1"/>
-              <a:t>is</a:t>
-            </a:r>
-            <a:r>
-              <a:rPr lang="de-DE" sz="2200" dirty="0"/>
-              <a:t> „URL </a:t>
-            </a:r>
-            <a:r>
-              <a:rPr lang="de-DE" sz="2200" dirty="0" err="1"/>
-              <a:t>Shortening</a:t>
-            </a:r>
-            <a:r>
-              <a:rPr lang="de-DE" sz="2200" dirty="0"/>
-              <a:t>“</a:t>
-            </a:r>
-          </a:p>
-        </p:txBody>
-      </p:sp>
-      <p:sp>
-        <p:nvSpPr>
-          <p:cNvPr id="5" name="Textfeld 4">
-            <a:extLst>
-              <a:ext uri="{FF2B5EF4-FFF2-40B4-BE49-F238E27FC236}">
-                <a16:creationId xmlns:a16="http://schemas.microsoft.com/office/drawing/2014/main" id="{FD07F353-9E11-4142-B738-A14F6ECCCD6A}"/>
-              </a:ext>
-            </a:extLst>
-          </p:cNvPr>
-          <p:cNvSpPr txBox="1"/>
-          <p:nvPr/>
-        </p:nvSpPr>
-        <p:spPr>
-          <a:xfrm>
-            <a:off x="658300" y="1280160"/>
-            <a:ext cx="8039930" cy="1372271"/>
-          </a:xfrm>
-          <a:prstGeom prst="rect">
-            <a:avLst/>
-          </a:prstGeom>
-          <a:solidFill>
-            <a:schemeClr val="bg1"/>
-          </a:solidFill>
-          <a:ln w="15875">
-            <a:solidFill>
-              <a:schemeClr val="tx1"/>
-            </a:solidFill>
-          </a:ln>
-          <a:effectLst>
-            <a:outerShdw blurRad="50800" dist="38100" dir="2700000" algn="tl" rotWithShape="0">
-              <a:prstClr val="black">
-                <a:alpha val="40000"/>
-              </a:prstClr>
-            </a:outerShdw>
-          </a:effectLst>
-        </p:spPr>
-        <p:txBody>
-          <a:bodyPr wrap="square" lIns="108000" tIns="108000" rIns="108000" bIns="108000" rtlCol="0">
-            <a:spAutoFit/>
-          </a:bodyPr>
-          <a:lstStyle/>
-          <a:p>
-            <a:pPr algn="just" fontAlgn="base">
-              <a:spcAft>
-                <a:spcPts val="600"/>
-              </a:spcAft>
-            </a:pPr>
-            <a:r>
-              <a:rPr lang="de-DE" i="1" dirty="0"/>
-              <a:t>„URL-</a:t>
-            </a:r>
-            <a:r>
-              <a:rPr lang="de-DE" i="1" dirty="0" err="1"/>
-              <a:t>shorteners</a:t>
-            </a:r>
-            <a:r>
-              <a:rPr lang="de-DE" i="1" dirty="0"/>
-              <a:t> </a:t>
-            </a:r>
-            <a:r>
-              <a:rPr lang="de-DE" i="1" dirty="0" err="1"/>
-              <a:t>are</a:t>
-            </a:r>
-            <a:r>
-              <a:rPr lang="de-DE" i="1" dirty="0"/>
-              <a:t> </a:t>
-            </a:r>
-            <a:r>
-              <a:rPr lang="de-DE" i="1" dirty="0" err="1"/>
-              <a:t>webservices</a:t>
-            </a:r>
-            <a:r>
-              <a:rPr lang="de-DE" i="1" dirty="0"/>
-              <a:t> </a:t>
-            </a:r>
-            <a:r>
-              <a:rPr lang="de-DE" i="1" dirty="0" err="1"/>
-              <a:t>that</a:t>
-            </a:r>
-            <a:r>
-              <a:rPr lang="de-DE" i="1" dirty="0"/>
-              <a:t> </a:t>
-            </a:r>
-            <a:r>
-              <a:rPr lang="de-DE" i="1" dirty="0" err="1"/>
-              <a:t>can</a:t>
-            </a:r>
-            <a:r>
-              <a:rPr lang="de-DE" i="1" dirty="0"/>
-              <a:t> </a:t>
-            </a:r>
-            <a:r>
-              <a:rPr lang="de-DE" i="1" dirty="0" err="1"/>
-              <a:t>be</a:t>
-            </a:r>
-            <a:r>
-              <a:rPr lang="de-DE" i="1" dirty="0"/>
-              <a:t> </a:t>
-            </a:r>
-            <a:r>
-              <a:rPr lang="de-DE" i="1" dirty="0" err="1"/>
-              <a:t>used</a:t>
-            </a:r>
-            <a:r>
-              <a:rPr lang="de-DE" i="1" dirty="0"/>
-              <a:t> on </a:t>
-            </a:r>
-            <a:r>
-              <a:rPr lang="de-DE" i="1" dirty="0" err="1"/>
-              <a:t>the</a:t>
-            </a:r>
-            <a:r>
-              <a:rPr lang="de-DE" i="1" dirty="0"/>
-              <a:t> World Wide Web. </a:t>
-            </a:r>
-            <a:r>
-              <a:rPr lang="de-DE" i="1" dirty="0" err="1"/>
-              <a:t>They</a:t>
-            </a:r>
-            <a:r>
-              <a:rPr lang="de-DE" i="1" dirty="0"/>
-              <a:t> en-</a:t>
-            </a:r>
-            <a:r>
-              <a:rPr lang="de-DE" i="1" dirty="0" err="1"/>
-              <a:t>able</a:t>
-            </a:r>
-            <a:r>
-              <a:rPr lang="de-DE" i="1" dirty="0"/>
-              <a:t> </a:t>
-            </a:r>
-            <a:r>
-              <a:rPr lang="de-DE" i="1" dirty="0" err="1"/>
-              <a:t>the</a:t>
-            </a:r>
-            <a:r>
-              <a:rPr lang="de-DE" i="1" dirty="0"/>
-              <a:t> </a:t>
-            </a:r>
-            <a:r>
-              <a:rPr lang="de-DE" i="1" dirty="0" err="1"/>
-              <a:t>creation</a:t>
-            </a:r>
-            <a:r>
-              <a:rPr lang="de-DE" i="1" dirty="0"/>
-              <a:t> </a:t>
-            </a:r>
-            <a:r>
-              <a:rPr lang="de-DE" i="1" dirty="0" err="1"/>
-              <a:t>of</a:t>
-            </a:r>
-            <a:r>
-              <a:rPr lang="de-DE" i="1" dirty="0"/>
-              <a:t> a </a:t>
-            </a:r>
-            <a:r>
-              <a:rPr lang="de-DE" i="1" dirty="0" err="1"/>
-              <a:t>shortened</a:t>
-            </a:r>
-            <a:r>
-              <a:rPr lang="de-DE" i="1" dirty="0"/>
-              <a:t>, alternative web </a:t>
-            </a:r>
-            <a:r>
-              <a:rPr lang="de-DE" i="1" dirty="0" err="1"/>
-              <a:t>address</a:t>
-            </a:r>
-            <a:r>
-              <a:rPr lang="de-DE" i="1" dirty="0"/>
-              <a:t>, </a:t>
-            </a:r>
-            <a:r>
-              <a:rPr lang="de-DE" i="1" dirty="0" err="1"/>
-              <a:t>which</a:t>
-            </a:r>
-            <a:r>
-              <a:rPr lang="de-DE" i="1" dirty="0"/>
-              <a:t> </a:t>
-            </a:r>
-            <a:r>
-              <a:rPr lang="de-DE" i="1" dirty="0" err="1"/>
-              <a:t>can</a:t>
-            </a:r>
-            <a:r>
-              <a:rPr lang="de-DE" i="1" dirty="0"/>
-              <a:t> </a:t>
-            </a:r>
-            <a:r>
-              <a:rPr lang="de-DE" i="1" dirty="0" err="1"/>
-              <a:t>be</a:t>
-            </a:r>
-            <a:r>
-              <a:rPr lang="de-DE" i="1" dirty="0"/>
-              <a:t> </a:t>
-            </a:r>
-            <a:r>
-              <a:rPr lang="de-DE" i="1" dirty="0" err="1"/>
-              <a:t>used</a:t>
-            </a:r>
-            <a:r>
-              <a:rPr lang="de-DE" i="1" dirty="0"/>
-              <a:t> just like </a:t>
-            </a:r>
-            <a:r>
-              <a:rPr lang="de-DE" i="1" dirty="0" err="1"/>
-              <a:t>the</a:t>
-            </a:r>
-            <a:r>
-              <a:rPr lang="de-DE" i="1" dirty="0"/>
-              <a:t> original "</a:t>
-            </a:r>
-            <a:r>
-              <a:rPr lang="de-DE" i="1" dirty="0" err="1"/>
-              <a:t>long</a:t>
-            </a:r>
-            <a:r>
-              <a:rPr lang="de-DE" i="1" dirty="0"/>
-              <a:t>" URL.“</a:t>
-            </a:r>
-          </a:p>
-          <a:p>
-            <a:pPr algn="just" fontAlgn="base"/>
-            <a:r>
-              <a:rPr lang="de-DE" sz="1600" dirty="0"/>
-              <a:t>– </a:t>
-            </a:r>
-            <a:r>
-              <a:rPr lang="de-DE" sz="1600" dirty="0" err="1"/>
-              <a:t>Schwickert</a:t>
-            </a:r>
-            <a:r>
-              <a:rPr lang="de-DE" sz="1600" dirty="0"/>
-              <a:t>, Axel et al.: Shorty – Der URL-</a:t>
-            </a:r>
-            <a:r>
-              <a:rPr lang="de-DE" sz="1600" dirty="0" err="1"/>
-              <a:t>Shortener</a:t>
-            </a:r>
-            <a:r>
-              <a:rPr lang="de-DE" sz="1600" dirty="0"/>
-              <a:t> der Professur für Wirtschaftsinformatik</a:t>
-            </a:r>
-          </a:p>
-        </p:txBody>
-      </p:sp>
-      <p:graphicFrame>
-        <p:nvGraphicFramePr>
-          <p:cNvPr id="6" name="Tabelle 6">
-            <a:extLst>
-              <a:ext uri="{FF2B5EF4-FFF2-40B4-BE49-F238E27FC236}">
-                <a16:creationId xmlns:a16="http://schemas.microsoft.com/office/drawing/2014/main" id="{421F2D8F-915E-B349-B407-FC154AF3DFE0}"/>
-              </a:ext>
-            </a:extLst>
-          </p:cNvPr>
-          <p:cNvGraphicFramePr>
-            <a:graphicFrameLocks noGrp="1"/>
-          </p:cNvGraphicFramePr>
-          <p:nvPr/>
-        </p:nvGraphicFramePr>
-        <p:xfrm>
-          <a:off x="817081" y="3706577"/>
-          <a:ext cx="7509838" cy="2216239"/>
-        </p:xfrm>
-        <a:graphic>
-          <a:graphicData uri="http://schemas.openxmlformats.org/drawingml/2006/table">
-            <a:tbl>
-              <a:tblPr firstRow="1" bandRow="1">
-                <a:tableStyleId>{D7AC3CCA-C797-4891-BE02-D94E43425B78}</a:tableStyleId>
-              </a:tblPr>
-              <a:tblGrid>
-                <a:gridCol w="2756264">
-                  <a:extLst>
-                    <a:ext uri="{9D8B030D-6E8A-4147-A177-3AD203B41FA5}">
-                      <a16:colId xmlns:a16="http://schemas.microsoft.com/office/drawing/2014/main" val="1548805028"/>
-                    </a:ext>
-                  </a:extLst>
-                </a:gridCol>
-                <a:gridCol w="4753574">
-                  <a:extLst>
-                    <a:ext uri="{9D8B030D-6E8A-4147-A177-3AD203B41FA5}">
-                      <a16:colId xmlns:a16="http://schemas.microsoft.com/office/drawing/2014/main" val="2643050741"/>
-                    </a:ext>
-                  </a:extLst>
-                </a:gridCol>
-              </a:tblGrid>
-              <a:tr h="667929">
-                <a:tc>
-                  <a:txBody>
-                    <a:bodyPr/>
-                    <a:lstStyle/>
-                    <a:p>
-                      <a:pPr algn="ctr"/>
-                      <a:r>
-                        <a:rPr lang="de-DE" dirty="0">
-                          <a:solidFill>
-                            <a:schemeClr val="bg1"/>
-                          </a:solidFill>
-                        </a:rPr>
-                        <a:t>Short URLs</a:t>
-                      </a:r>
-                    </a:p>
-                  </a:txBody>
-                  <a:tcPr anchor="ctr">
-                    <a:solidFill>
-                      <a:schemeClr val="accent1">
-                        <a:lumMod val="75000"/>
-                      </a:schemeClr>
-                    </a:solidFill>
-                  </a:tcPr>
-                </a:tc>
-                <a:tc>
-                  <a:txBody>
-                    <a:bodyPr/>
-                    <a:lstStyle/>
-                    <a:p>
-                      <a:pPr algn="ctr"/>
-                      <a:r>
-                        <a:rPr lang="de-DE" dirty="0">
-                          <a:solidFill>
-                            <a:schemeClr val="bg1"/>
-                          </a:solidFill>
-                        </a:rPr>
-                        <a:t>Target URL</a:t>
-                      </a:r>
-                    </a:p>
-                  </a:txBody>
-                  <a:tcPr anchor="ctr">
-                    <a:solidFill>
-                      <a:schemeClr val="accent1">
-                        <a:lumMod val="75000"/>
-                      </a:schemeClr>
-                    </a:solidFill>
-                  </a:tcPr>
-                </a:tc>
-                <a:extLst>
-                  <a:ext uri="{0D108BD9-81ED-4DB2-BD59-A6C34878D82A}">
-                    <a16:rowId xmlns:a16="http://schemas.microsoft.com/office/drawing/2014/main" val="562904647"/>
-                  </a:ext>
-                </a:extLst>
-              </a:tr>
-              <a:tr h="880381">
-                <a:tc>
-                  <a:txBody>
-                    <a:bodyPr/>
-                    <a:lstStyle/>
-                    <a:p>
-                      <a:pPr algn="ctr"/>
-                      <a:r>
-                        <a:rPr lang="de-DE" dirty="0"/>
-                        <a:t>https://</a:t>
-                      </a:r>
-                      <a:r>
-                        <a:rPr lang="de-DE" dirty="0" err="1"/>
-                        <a:t>www.dhbwka</a:t>
-                      </a:r>
-                      <a:r>
-                        <a:rPr lang="de-DE" dirty="0"/>
-                        <a:t>/</a:t>
-                      </a:r>
-                      <a:r>
-                        <a:rPr lang="de-DE" dirty="0" err="1"/>
-                        <a:t>inf</a:t>
-                      </a:r>
-                      <a:endParaRPr lang="de-DE" dirty="0"/>
-                    </a:p>
-                  </a:txBody>
-                  <a:tcPr anchor="ctr">
-                    <a:solidFill>
-                      <a:schemeClr val="accent1">
-                        <a:lumMod val="40000"/>
-                        <a:lumOff val="60000"/>
-                      </a:schemeClr>
-                    </a:solidFill>
-                  </a:tcPr>
-                </a:tc>
-                <a:tc>
-                  <a:txBody>
-                    <a:bodyPr/>
-                    <a:lstStyle/>
-                    <a:p>
-                      <a:pPr algn="ctr"/>
-                      <a:r>
-                        <a:rPr lang="de-DE" dirty="0"/>
-                        <a:t>https://</a:t>
-                      </a:r>
-                      <a:r>
-                        <a:rPr lang="de-DE" dirty="0" err="1"/>
-                        <a:t>www.karlsruhe.dhbw.de</a:t>
-                      </a:r>
-                      <a:r>
-                        <a:rPr lang="de-DE" dirty="0"/>
-                        <a:t>/</a:t>
-                      </a:r>
-                      <a:r>
-                        <a:rPr lang="de-DE" dirty="0" err="1"/>
-                        <a:t>inf</a:t>
-                      </a:r>
-                      <a:r>
-                        <a:rPr lang="de-DE" dirty="0"/>
-                        <a:t>/</a:t>
-                      </a:r>
-                      <a:r>
-                        <a:rPr lang="de-DE" dirty="0" err="1"/>
-                        <a:t>studienverlauf-organisatorisches.html#anchor-main-content</a:t>
-                      </a:r>
-                      <a:endParaRPr lang="de-DE" dirty="0"/>
-                    </a:p>
-                  </a:txBody>
-                  <a:tcPr anchor="ctr">
-                    <a:solidFill>
-                      <a:schemeClr val="accent1">
-                        <a:lumMod val="40000"/>
-                        <a:lumOff val="60000"/>
-                      </a:schemeClr>
-                    </a:solidFill>
-                  </a:tcPr>
-                </a:tc>
-                <a:extLst>
-                  <a:ext uri="{0D108BD9-81ED-4DB2-BD59-A6C34878D82A}">
-                    <a16:rowId xmlns:a16="http://schemas.microsoft.com/office/drawing/2014/main" val="2187896029"/>
-                  </a:ext>
-                </a:extLst>
-              </a:tr>
-              <a:tr h="667929">
-                <a:tc>
-                  <a:txBody>
-                    <a:bodyPr/>
-                    <a:lstStyle/>
-                    <a:p>
-                      <a:pPr algn="ctr"/>
-                      <a:r>
-                        <a:rPr lang="de-DE" dirty="0"/>
-                        <a:t>...</a:t>
-                      </a:r>
-                    </a:p>
-                  </a:txBody>
-                  <a:tcPr anchor="ctr">
-                    <a:solidFill>
-                      <a:schemeClr val="accent1">
-                        <a:lumMod val="20000"/>
-                        <a:lumOff val="80000"/>
-                      </a:schemeClr>
-                    </a:solidFill>
-                  </a:tcPr>
-                </a:tc>
-                <a:tc>
-                  <a:txBody>
-                    <a:bodyPr/>
-                    <a:lstStyle/>
-                    <a:p>
-                      <a:pPr algn="ctr"/>
-                      <a:r>
-                        <a:rPr lang="de-DE" dirty="0"/>
-                        <a:t>...</a:t>
-                      </a:r>
-                    </a:p>
-                  </a:txBody>
-                  <a:tcPr anchor="ctr">
-                    <a:solidFill>
-                      <a:schemeClr val="accent1">
-                        <a:lumMod val="20000"/>
-                        <a:lumOff val="80000"/>
-                      </a:schemeClr>
-                    </a:solidFill>
-                  </a:tcPr>
-                </a:tc>
-                <a:extLst>
-                  <a:ext uri="{0D108BD9-81ED-4DB2-BD59-A6C34878D82A}">
-                    <a16:rowId xmlns:a16="http://schemas.microsoft.com/office/drawing/2014/main" val="2202569640"/>
-                  </a:ext>
-                </a:extLst>
-              </a:tr>
-            </a:tbl>
-          </a:graphicData>
-        </a:graphic>
-      </p:graphicFrame>
-      <p:sp>
-        <p:nvSpPr>
-          <p:cNvPr id="7" name="Textfeld 6">
-            <a:extLst>
-              <a:ext uri="{FF2B5EF4-FFF2-40B4-BE49-F238E27FC236}">
-                <a16:creationId xmlns:a16="http://schemas.microsoft.com/office/drawing/2014/main" id="{15278564-DF98-A64E-829D-790774920688}"/>
-              </a:ext>
-            </a:extLst>
-          </p:cNvPr>
-          <p:cNvSpPr txBox="1"/>
-          <p:nvPr/>
-        </p:nvSpPr>
-        <p:spPr>
-          <a:xfrm>
-            <a:off x="817081" y="3095708"/>
-            <a:ext cx="7509838" cy="610869"/>
-          </a:xfrm>
-          <a:prstGeom prst="rect">
-            <a:avLst/>
-          </a:prstGeom>
-          <a:noFill/>
-        </p:spPr>
-        <p:txBody>
-          <a:bodyPr wrap="square" rtlCol="0" anchor="ctr" anchorCtr="0">
-            <a:noAutofit/>
-          </a:bodyPr>
-          <a:lstStyle/>
-          <a:p>
-            <a:pPr algn="ctr"/>
-            <a:r>
-              <a:rPr lang="de-DE" sz="2200" dirty="0"/>
-              <a:t>Database Table</a:t>
-            </a:r>
-          </a:p>
-        </p:txBody>
-      </p:sp>
-      <p:cxnSp>
-        <p:nvCxnSpPr>
-          <p:cNvPr id="9" name="Gerade Verbindung 8">
-            <a:extLst>
-              <a:ext uri="{FF2B5EF4-FFF2-40B4-BE49-F238E27FC236}">
-                <a16:creationId xmlns:a16="http://schemas.microsoft.com/office/drawing/2014/main" id="{462BD368-2915-814E-A663-5B1347CC9D23}"/>
-              </a:ext>
-            </a:extLst>
-          </p:cNvPr>
-          <p:cNvCxnSpPr>
-            <a:cxnSpLocks/>
-          </p:cNvCxnSpPr>
-          <p:nvPr/>
-        </p:nvCxnSpPr>
-        <p:spPr>
-          <a:xfrm>
-            <a:off x="1417320" y="3036736"/>
-            <a:ext cx="6463175" cy="0"/>
-          </a:xfrm>
-          <a:prstGeom prst="line">
-            <a:avLst/>
-          </a:prstGeom>
-          <a:ln w="12700">
-            <a:solidFill>
-              <a:schemeClr val="tx1"/>
-            </a:solidFill>
-          </a:ln>
-        </p:spPr>
-        <p:style>
-          <a:lnRef idx="1">
-            <a:schemeClr val="accent1"/>
-          </a:lnRef>
-          <a:fillRef idx="0">
-            <a:schemeClr val="accent1"/>
-          </a:fillRef>
-          <a:effectRef idx="0">
-            <a:schemeClr val="accent1"/>
-          </a:effectRef>
-          <a:fontRef idx="minor">
-            <a:schemeClr val="tx1"/>
-          </a:fontRef>
-        </p:style>
-      </p:cxnSp>
-    </p:spTree>
-    <p:extLst>
-      <p:ext uri="{BB962C8B-B14F-4D97-AF65-F5344CB8AC3E}">
-        <p14:creationId xmlns:p14="http://schemas.microsoft.com/office/powerpoint/2010/main" val="2828759260"/>
-      </p:ext>
-    </p:extLst>
-  </p:cSld>
-  <p:clrMapOvr>
-    <a:masterClrMapping/>
-  </p:clrMapOvr>
-</p:sld>
-</file>
-
-<file path=ppt/slides/slide5.xml><?xml version="1.0" encoding="utf-8"?>
 <p:sld xmlns:a="http://schemas.openxmlformats.org/drawingml/2006/main" xmlns:r="http://schemas.openxmlformats.org/officeDocument/2006/relationships" xmlns:p="http://schemas.openxmlformats.org/presentationml/2006/main">
   <p:cSld>
     <p:spTree>
@@ -11293,7 +10950,7 @@
             <a:fld id="{90CB4078-9F56-DD45-BCAD-AB9C14C5FED1}" type="slidenum">
               <a:rPr lang="de-DE" smtClean="0"/>
               <a:pPr/>
-              <a:t>5</a:t>
+              <a:t>4</a:t>
             </a:fld>
             <a:endParaRPr lang="de-DE" sz="1400" dirty="0"/>
           </a:p>
@@ -13458,6 +13115,348 @@
 </p:sld>
 </file>
 
+<file path=ppt/slides/slide5.xml><?xml version="1.0" encoding="utf-8"?>
+<p:sld xmlns:a="http://schemas.openxmlformats.org/drawingml/2006/main" xmlns:r="http://schemas.openxmlformats.org/officeDocument/2006/relationships" xmlns:p="http://schemas.openxmlformats.org/presentationml/2006/main">
+  <p:cSld>
+    <p:spTree>
+      <p:nvGrpSpPr>
+        <p:cNvPr id="1" name=""/>
+        <p:cNvGrpSpPr/>
+        <p:nvPr/>
+      </p:nvGrpSpPr>
+      <p:grpSpPr>
+        <a:xfrm>
+          <a:off x="0" y="0"/>
+          <a:ext cx="0" cy="0"/>
+          <a:chOff x="0" y="0"/>
+          <a:chExt cx="0" cy="0"/>
+        </a:xfrm>
+      </p:grpSpPr>
+      <p:sp>
+        <p:nvSpPr>
+          <p:cNvPr id="2" name="Foliennummernplatzhalter 1">
+            <a:extLst>
+              <a:ext uri="{FF2B5EF4-FFF2-40B4-BE49-F238E27FC236}">
+                <a16:creationId xmlns:a16="http://schemas.microsoft.com/office/drawing/2014/main" id="{935BE36D-9786-474B-8B37-699633B82ED3}"/>
+              </a:ext>
+            </a:extLst>
+          </p:cNvPr>
+          <p:cNvSpPr>
+            <a:spLocks noGrp="1"/>
+          </p:cNvSpPr>
+          <p:nvPr>
+            <p:ph type="sldNum" sz="quarter" idx="4"/>
+          </p:nvPr>
+        </p:nvSpPr>
+        <p:spPr/>
+        <p:txBody>
+          <a:bodyPr/>
+          <a:lstStyle/>
+          <a:p>
+            <a:fld id="{90CB4078-9F56-DD45-BCAD-AB9C14C5FED1}" type="slidenum">
+              <a:rPr lang="de-DE" smtClean="0"/>
+              <a:pPr/>
+              <a:t>5</a:t>
+            </a:fld>
+            <a:endParaRPr lang="de-DE" sz="1400" dirty="0"/>
+          </a:p>
+        </p:txBody>
+      </p:sp>
+      <p:sp>
+        <p:nvSpPr>
+          <p:cNvPr id="3" name="Textfeld 2">
+            <a:extLst>
+              <a:ext uri="{FF2B5EF4-FFF2-40B4-BE49-F238E27FC236}">
+                <a16:creationId xmlns:a16="http://schemas.microsoft.com/office/drawing/2014/main" id="{BD6B9D4F-AF02-214B-AF6C-D228B7DE0A6E}"/>
+              </a:ext>
+            </a:extLst>
+          </p:cNvPr>
+          <p:cNvSpPr txBox="1"/>
+          <p:nvPr/>
+        </p:nvSpPr>
+        <p:spPr>
+          <a:xfrm>
+            <a:off x="1243173" y="267127"/>
+            <a:ext cx="7541231" cy="430887"/>
+          </a:xfrm>
+          <a:prstGeom prst="rect">
+            <a:avLst/>
+          </a:prstGeom>
+          <a:noFill/>
+        </p:spPr>
+        <p:txBody>
+          <a:bodyPr wrap="square" rtlCol="0">
+            <a:spAutoFit/>
+          </a:bodyPr>
+          <a:lstStyle/>
+          <a:p>
+            <a:pPr algn="ctr"/>
+            <a:r>
+              <a:rPr lang="de-DE" sz="2200" dirty="0"/>
+              <a:t>1. </a:t>
+            </a:r>
+            <a:r>
+              <a:rPr lang="de-DE" sz="2200" dirty="0" err="1"/>
+              <a:t>What</a:t>
+            </a:r>
+            <a:r>
+              <a:rPr lang="de-DE" sz="2200" dirty="0"/>
+              <a:t> </a:t>
+            </a:r>
+            <a:r>
+              <a:rPr lang="de-DE" sz="2200" dirty="0" err="1"/>
+              <a:t>is</a:t>
+            </a:r>
+            <a:r>
+              <a:rPr lang="de-DE" sz="2200" dirty="0"/>
+              <a:t> „URL </a:t>
+            </a:r>
+            <a:r>
+              <a:rPr lang="de-DE" sz="2200" dirty="0" err="1"/>
+              <a:t>Shortening</a:t>
+            </a:r>
+            <a:r>
+              <a:rPr lang="de-DE" sz="2200" dirty="0"/>
+              <a:t>“</a:t>
+            </a:r>
+          </a:p>
+        </p:txBody>
+      </p:sp>
+      <p:sp>
+        <p:nvSpPr>
+          <p:cNvPr id="8" name="Textfeld 7">
+            <a:extLst>
+              <a:ext uri="{FF2B5EF4-FFF2-40B4-BE49-F238E27FC236}">
+                <a16:creationId xmlns:a16="http://schemas.microsoft.com/office/drawing/2014/main" id="{AECA693E-7E1B-0C4C-9D15-2AADF575BC2C}"/>
+              </a:ext>
+            </a:extLst>
+          </p:cNvPr>
+          <p:cNvSpPr txBox="1"/>
+          <p:nvPr/>
+        </p:nvSpPr>
+        <p:spPr>
+          <a:xfrm>
+            <a:off x="1623301" y="1805340"/>
+            <a:ext cx="6761747" cy="3599256"/>
+          </a:xfrm>
+          <a:prstGeom prst="rect">
+            <a:avLst/>
+          </a:prstGeom>
+          <a:noFill/>
+        </p:spPr>
+        <p:txBody>
+          <a:bodyPr wrap="square" lIns="90000" rtlCol="0" anchor="t" anchorCtr="0">
+            <a:noAutofit/>
+          </a:bodyPr>
+          <a:lstStyle/>
+          <a:p>
+            <a:pPr marL="9525">
+              <a:lnSpc>
+                <a:spcPts val="6000"/>
+              </a:lnSpc>
+            </a:pPr>
+            <a:r>
+              <a:rPr lang="de-DE" sz="2200" b="1" dirty="0" err="1"/>
+              <a:t>Benefits</a:t>
+            </a:r>
+            <a:r>
+              <a:rPr lang="de-DE" sz="2200" b="1" dirty="0"/>
+              <a:t> </a:t>
+            </a:r>
+            <a:r>
+              <a:rPr lang="de-DE" sz="2200" b="1" dirty="0" err="1"/>
+              <a:t>of</a:t>
+            </a:r>
+            <a:r>
+              <a:rPr lang="de-DE" sz="2200" b="1" dirty="0"/>
+              <a:t> </a:t>
+            </a:r>
+            <a:r>
+              <a:rPr lang="de-DE" sz="2200" b="1" dirty="0" err="1"/>
+              <a:t>ShortURLs</a:t>
+            </a:r>
+            <a:r>
+              <a:rPr lang="de-DE" sz="2200" b="1" dirty="0"/>
+              <a:t>:</a:t>
+            </a:r>
+          </a:p>
+          <a:p>
+            <a:pPr marL="466725" indent="-457200">
+              <a:lnSpc>
+                <a:spcPts val="6000"/>
+              </a:lnSpc>
+              <a:buFont typeface="+mj-lt"/>
+              <a:buAutoNum type="arabicPeriod"/>
+            </a:pPr>
+            <a:r>
+              <a:rPr lang="de-DE" sz="2200" dirty="0"/>
+              <a:t>Shorter URLs </a:t>
+            </a:r>
+            <a:r>
+              <a:rPr lang="de-DE" sz="2200" dirty="0" err="1"/>
+              <a:t>for</a:t>
+            </a:r>
+            <a:r>
+              <a:rPr lang="de-DE" sz="2200" dirty="0"/>
+              <a:t> </a:t>
+            </a:r>
+            <a:r>
+              <a:rPr lang="de-DE" sz="2200" dirty="0" err="1"/>
+              <a:t>the</a:t>
+            </a:r>
+            <a:r>
+              <a:rPr lang="de-DE" sz="2200" dirty="0"/>
+              <a:t> same </a:t>
+            </a:r>
+            <a:r>
+              <a:rPr lang="de-DE" sz="2200" dirty="0" err="1"/>
+              <a:t>target</a:t>
+            </a:r>
+            <a:r>
+              <a:rPr lang="de-DE" sz="2200" dirty="0"/>
+              <a:t> </a:t>
+            </a:r>
+            <a:r>
+              <a:rPr lang="de-DE" sz="2200" dirty="0" err="1"/>
+              <a:t>address</a:t>
+            </a:r>
+            <a:endParaRPr lang="de-DE" sz="2200" dirty="0"/>
+          </a:p>
+          <a:p>
+            <a:pPr marL="466725" indent="-457200">
+              <a:lnSpc>
+                <a:spcPts val="6000"/>
+              </a:lnSpc>
+              <a:buFont typeface="+mj-lt"/>
+              <a:buAutoNum type="arabicPeriod"/>
+            </a:pPr>
+            <a:r>
+              <a:rPr lang="de-DE" sz="2200" dirty="0"/>
+              <a:t>Target </a:t>
+            </a:r>
+            <a:r>
+              <a:rPr lang="de-DE" sz="2200" dirty="0" err="1"/>
+              <a:t>address</a:t>
+            </a:r>
+            <a:r>
+              <a:rPr lang="de-DE" sz="2200" dirty="0"/>
+              <a:t> </a:t>
+            </a:r>
+            <a:r>
+              <a:rPr lang="de-DE" sz="2200" dirty="0" err="1"/>
+              <a:t>can</a:t>
+            </a:r>
+            <a:r>
+              <a:rPr lang="de-DE" sz="2200" dirty="0"/>
+              <a:t> </a:t>
+            </a:r>
+            <a:r>
+              <a:rPr lang="de-DE" sz="2200" dirty="0" err="1"/>
+              <a:t>be</a:t>
+            </a:r>
+            <a:r>
+              <a:rPr lang="de-DE" sz="2200" dirty="0"/>
+              <a:t> </a:t>
+            </a:r>
+            <a:r>
+              <a:rPr lang="de-DE" sz="2200" dirty="0" err="1"/>
+              <a:t>changed</a:t>
+            </a:r>
+            <a:r>
+              <a:rPr lang="de-DE" sz="2200" dirty="0"/>
+              <a:t> </a:t>
+            </a:r>
+            <a:r>
+              <a:rPr lang="de-DE" sz="2200" dirty="0" err="1"/>
+              <a:t>afterwards</a:t>
+            </a:r>
+            <a:endParaRPr lang="de-DE" sz="2200" dirty="0"/>
+          </a:p>
+          <a:p>
+            <a:pPr marL="466725" indent="-457200">
+              <a:lnSpc>
+                <a:spcPts val="6000"/>
+              </a:lnSpc>
+              <a:buFont typeface="+mj-lt"/>
+              <a:buAutoNum type="arabicPeriod"/>
+            </a:pPr>
+            <a:r>
+              <a:rPr lang="de-DE" sz="2200" dirty="0" err="1"/>
+              <a:t>Collect</a:t>
+            </a:r>
+            <a:r>
+              <a:rPr lang="de-DE" sz="2200" dirty="0"/>
+              <a:t> </a:t>
+            </a:r>
+            <a:r>
+              <a:rPr lang="de-DE" sz="2200" dirty="0" err="1"/>
+              <a:t>and</a:t>
+            </a:r>
+            <a:r>
+              <a:rPr lang="de-DE" sz="2200" dirty="0"/>
+              <a:t> </a:t>
+            </a:r>
+            <a:r>
+              <a:rPr lang="de-DE" sz="2200" dirty="0" err="1"/>
+              <a:t>analyze</a:t>
+            </a:r>
+            <a:r>
+              <a:rPr lang="de-DE" sz="2200" dirty="0"/>
+              <a:t> </a:t>
+            </a:r>
+            <a:r>
+              <a:rPr lang="de-DE" sz="2200" dirty="0" err="1"/>
+              <a:t>data</a:t>
+            </a:r>
+            <a:r>
+              <a:rPr lang="de-DE" sz="2200" dirty="0"/>
+              <a:t> </a:t>
+            </a:r>
+            <a:r>
+              <a:rPr lang="de-DE" sz="2200" dirty="0" err="1"/>
+              <a:t>from</a:t>
+            </a:r>
+            <a:r>
+              <a:rPr lang="de-DE" sz="2200" dirty="0"/>
+              <a:t> </a:t>
+            </a:r>
+            <a:r>
+              <a:rPr lang="de-DE" sz="2200" dirty="0" err="1"/>
+              <a:t>usage</a:t>
+            </a:r>
+            <a:r>
+              <a:rPr lang="de-DE" sz="2200" dirty="0"/>
+              <a:t> </a:t>
+            </a:r>
+            <a:r>
+              <a:rPr lang="de-DE" sz="2200" dirty="0" err="1"/>
+              <a:t>of</a:t>
+            </a:r>
+            <a:r>
+              <a:rPr lang="de-DE" sz="2200" dirty="0"/>
+              <a:t> </a:t>
+            </a:r>
+            <a:r>
+              <a:rPr lang="de-DE" sz="2200" dirty="0" err="1"/>
+              <a:t>ShortURLs</a:t>
+            </a:r>
+            <a:endParaRPr lang="de-DE" sz="2200" dirty="0"/>
+          </a:p>
+        </p:txBody>
+      </p:sp>
+    </p:spTree>
+    <p:extLst>
+      <p:ext uri="{BB962C8B-B14F-4D97-AF65-F5344CB8AC3E}">
+        <p14:creationId xmlns:p14="http://schemas.microsoft.com/office/powerpoint/2010/main" val="2828759260"/>
+      </p:ext>
+    </p:extLst>
+  </p:cSld>
+  <p:clrMapOvr>
+    <a:masterClrMapping/>
+  </p:clrMapOvr>
+</p:sld>
+</file>
+
 <file path=ppt/slides/slide6.xml><?xml version="1.0" encoding="utf-8"?>
 <p:sld xmlns:a="http://schemas.openxmlformats.org/drawingml/2006/main" xmlns:r="http://schemas.openxmlformats.org/officeDocument/2006/relationships" xmlns:p="http://schemas.openxmlformats.org/presentationml/2006/main">
   <p:cSld>
@@ -13500,6 +13499,329 @@
               <a:rPr lang="de-DE" smtClean="0"/>
               <a:pPr/>
               <a:t>6</a:t>
+            </a:fld>
+            <a:endParaRPr lang="de-DE" sz="1400" dirty="0"/>
+          </a:p>
+        </p:txBody>
+      </p:sp>
+      <p:sp>
+        <p:nvSpPr>
+          <p:cNvPr id="1087" name="Textfeld 1086">
+            <a:extLst>
+              <a:ext uri="{FF2B5EF4-FFF2-40B4-BE49-F238E27FC236}">
+                <a16:creationId xmlns:a16="http://schemas.microsoft.com/office/drawing/2014/main" id="{F85A51C6-6B57-204E-809C-B14D8CB91615}"/>
+              </a:ext>
+            </a:extLst>
+          </p:cNvPr>
+          <p:cNvSpPr txBox="1"/>
+          <p:nvPr/>
+        </p:nvSpPr>
+        <p:spPr>
+          <a:xfrm>
+            <a:off x="1243173" y="267127"/>
+            <a:ext cx="7541231" cy="430887"/>
+          </a:xfrm>
+          <a:prstGeom prst="rect">
+            <a:avLst/>
+          </a:prstGeom>
+          <a:noFill/>
+        </p:spPr>
+        <p:txBody>
+          <a:bodyPr wrap="square" rtlCol="0">
+            <a:spAutoFit/>
+          </a:bodyPr>
+          <a:lstStyle/>
+          <a:p>
+            <a:pPr algn="ctr"/>
+            <a:r>
+              <a:rPr lang="de-DE" sz="2200" dirty="0"/>
+              <a:t>Table </a:t>
+            </a:r>
+            <a:r>
+              <a:rPr lang="de-DE" sz="2200" dirty="0" err="1"/>
+              <a:t>of</a:t>
+            </a:r>
+            <a:r>
+              <a:rPr lang="de-DE" sz="2200" dirty="0"/>
+              <a:t> </a:t>
+            </a:r>
+            <a:r>
+              <a:rPr lang="de-DE" sz="2200" dirty="0" err="1"/>
+              <a:t>contents</a:t>
+            </a:r>
+            <a:endParaRPr lang="de-DE" sz="2200" dirty="0"/>
+          </a:p>
+        </p:txBody>
+      </p:sp>
+      <p:sp>
+        <p:nvSpPr>
+          <p:cNvPr id="1088" name="Textfeld 1087">
+            <a:extLst>
+              <a:ext uri="{FF2B5EF4-FFF2-40B4-BE49-F238E27FC236}">
+                <a16:creationId xmlns:a16="http://schemas.microsoft.com/office/drawing/2014/main" id="{42C5708C-846E-AD45-9B85-2D63BCC69AF8}"/>
+              </a:ext>
+            </a:extLst>
+          </p:cNvPr>
+          <p:cNvSpPr txBox="1"/>
+          <p:nvPr/>
+        </p:nvSpPr>
+        <p:spPr>
+          <a:xfrm>
+            <a:off x="2671277" y="924680"/>
+            <a:ext cx="4880225" cy="5085703"/>
+          </a:xfrm>
+          <a:prstGeom prst="rect">
+            <a:avLst/>
+          </a:prstGeom>
+          <a:noFill/>
+        </p:spPr>
+        <p:txBody>
+          <a:bodyPr wrap="square" lIns="90000" rtlCol="0" anchor="t" anchorCtr="0">
+            <a:noAutofit/>
+          </a:bodyPr>
+          <a:lstStyle/>
+          <a:p>
+            <a:pPr marL="342900" indent="-342900">
+              <a:lnSpc>
+                <a:spcPct val="300000"/>
+              </a:lnSpc>
+              <a:buFont typeface="+mj-lt"/>
+              <a:buAutoNum type="arabicPeriod"/>
+            </a:pPr>
+            <a:r>
+              <a:rPr lang="de-DE" sz="2200" dirty="0" err="1"/>
+              <a:t>What</a:t>
+            </a:r>
+            <a:r>
+              <a:rPr lang="de-DE" sz="2200" dirty="0"/>
+              <a:t> </a:t>
+            </a:r>
+            <a:r>
+              <a:rPr lang="de-DE" sz="2200" dirty="0" err="1"/>
+              <a:t>is</a:t>
+            </a:r>
+            <a:r>
+              <a:rPr lang="de-DE" sz="2200" dirty="0"/>
+              <a:t> „URL </a:t>
+            </a:r>
+            <a:r>
+              <a:rPr lang="de-DE" sz="2200" dirty="0" err="1"/>
+              <a:t>Shortening</a:t>
+            </a:r>
+            <a:r>
+              <a:rPr lang="de-DE" sz="2200" dirty="0"/>
+              <a:t>“?</a:t>
+            </a:r>
+          </a:p>
+          <a:p>
+            <a:pPr marL="342900" indent="-342900">
+              <a:lnSpc>
+                <a:spcPct val="300000"/>
+              </a:lnSpc>
+              <a:buFont typeface="+mj-lt"/>
+              <a:buAutoNum type="arabicPeriod"/>
+            </a:pPr>
+            <a:r>
+              <a:rPr lang="de-DE" sz="2200" dirty="0" err="1"/>
+              <a:t>Why</a:t>
+            </a:r>
+            <a:r>
+              <a:rPr lang="de-DE" sz="2200" dirty="0"/>
+              <a:t> do </a:t>
+            </a:r>
+            <a:r>
+              <a:rPr lang="de-DE" sz="2200" dirty="0" err="1"/>
+              <a:t>you</a:t>
+            </a:r>
+            <a:r>
+              <a:rPr lang="de-DE" sz="2200" dirty="0"/>
+              <a:t> </a:t>
+            </a:r>
+            <a:r>
+              <a:rPr lang="de-DE" sz="2200" dirty="0" err="1"/>
+              <a:t>need</a:t>
+            </a:r>
+            <a:r>
+              <a:rPr lang="de-DE" sz="2200" dirty="0"/>
+              <a:t> BFFL?</a:t>
+            </a:r>
+          </a:p>
+          <a:p>
+            <a:pPr marL="342900" indent="-342900">
+              <a:lnSpc>
+                <a:spcPct val="300000"/>
+              </a:lnSpc>
+              <a:buFont typeface="+mj-lt"/>
+              <a:buAutoNum type="arabicPeriod"/>
+            </a:pPr>
+            <a:r>
+              <a:rPr lang="de-DE" sz="2200" dirty="0"/>
+              <a:t>Project </a:t>
+            </a:r>
+            <a:r>
+              <a:rPr lang="de-DE" sz="2200" dirty="0" err="1"/>
+              <a:t>management</a:t>
+            </a:r>
+            <a:r>
+              <a:rPr lang="de-DE" sz="2200" dirty="0"/>
+              <a:t> </a:t>
+            </a:r>
+            <a:r>
+              <a:rPr lang="de-DE" sz="2200" dirty="0" err="1"/>
+              <a:t>and</a:t>
+            </a:r>
+            <a:r>
+              <a:rPr lang="de-DE" sz="2200" dirty="0"/>
+              <a:t> </a:t>
+            </a:r>
+            <a:r>
+              <a:rPr lang="de-DE" sz="2200" dirty="0" err="1"/>
+              <a:t>approach</a:t>
+            </a:r>
+            <a:endParaRPr lang="de-DE" sz="2200" dirty="0"/>
+          </a:p>
+          <a:p>
+            <a:pPr marL="342900" indent="-342900">
+              <a:lnSpc>
+                <a:spcPct val="300000"/>
+              </a:lnSpc>
+              <a:buFont typeface="+mj-lt"/>
+              <a:buAutoNum type="arabicPeriod"/>
+            </a:pPr>
+            <a:r>
+              <a:rPr lang="de-DE" sz="2200" dirty="0"/>
+              <a:t>State </a:t>
+            </a:r>
+            <a:r>
+              <a:rPr lang="de-DE" sz="2200" dirty="0" err="1"/>
+              <a:t>of</a:t>
+            </a:r>
+            <a:r>
+              <a:rPr lang="de-DE" sz="2200" dirty="0"/>
+              <a:t> </a:t>
+            </a:r>
+            <a:r>
+              <a:rPr lang="de-DE" sz="2200" dirty="0" err="1"/>
+              <a:t>things</a:t>
+            </a:r>
+            <a:endParaRPr lang="de-DE" sz="2200" dirty="0"/>
+          </a:p>
+          <a:p>
+            <a:pPr marL="342900" indent="-342900">
+              <a:lnSpc>
+                <a:spcPct val="300000"/>
+              </a:lnSpc>
+              <a:buFont typeface="+mj-lt"/>
+              <a:buAutoNum type="arabicPeriod"/>
+            </a:pPr>
+            <a:r>
+              <a:rPr lang="de-DE" sz="2200" dirty="0"/>
+              <a:t>Outlook</a:t>
+            </a:r>
+          </a:p>
+        </p:txBody>
+      </p:sp>
+      <p:sp>
+        <p:nvSpPr>
+          <p:cNvPr id="1089" name="Dreieck 1088">
+            <a:extLst>
+              <a:ext uri="{FF2B5EF4-FFF2-40B4-BE49-F238E27FC236}">
+                <a16:creationId xmlns:a16="http://schemas.microsoft.com/office/drawing/2014/main" id="{EA0C8883-C05D-F74E-B032-885D45E71914}"/>
+              </a:ext>
+            </a:extLst>
+          </p:cNvPr>
+          <p:cNvSpPr/>
+          <p:nvPr/>
+        </p:nvSpPr>
+        <p:spPr>
+          <a:xfrm rot="5400000">
+            <a:off x="1885008" y="2419505"/>
+            <a:ext cx="626361" cy="434798"/>
+          </a:xfrm>
+          <a:prstGeom prst="triangle">
+            <a:avLst/>
+          </a:prstGeom>
+        </p:spPr>
+        <p:style>
+          <a:lnRef idx="2">
+            <a:schemeClr val="accent1">
+              <a:shade val="50000"/>
+            </a:schemeClr>
+          </a:lnRef>
+          <a:fillRef idx="1">
+            <a:schemeClr val="accent1"/>
+          </a:fillRef>
+          <a:effectRef idx="0">
+            <a:schemeClr val="accent1"/>
+          </a:effectRef>
+          <a:fontRef idx="minor">
+            <a:schemeClr val="lt1"/>
+          </a:fontRef>
+        </p:style>
+        <p:txBody>
+          <a:bodyPr rtlCol="0" anchor="ctr"/>
+          <a:lstStyle/>
+          <a:p>
+            <a:pPr algn="ctr"/>
+            <a:endParaRPr lang="de-DE"/>
+          </a:p>
+        </p:txBody>
+      </p:sp>
+    </p:spTree>
+    <p:extLst>
+      <p:ext uri="{BB962C8B-B14F-4D97-AF65-F5344CB8AC3E}">
+        <p14:creationId xmlns:p14="http://schemas.microsoft.com/office/powerpoint/2010/main" val="1133644128"/>
+      </p:ext>
+    </p:extLst>
+  </p:cSld>
+  <p:clrMapOvr>
+    <a:masterClrMapping/>
+  </p:clrMapOvr>
+</p:sld>
+</file>
+
+<file path=ppt/slides/slide7.xml><?xml version="1.0" encoding="utf-8"?>
+<p:sld xmlns:a="http://schemas.openxmlformats.org/drawingml/2006/main" xmlns:r="http://schemas.openxmlformats.org/officeDocument/2006/relationships" xmlns:p="http://schemas.openxmlformats.org/presentationml/2006/main">
+  <p:cSld>
+    <p:spTree>
+      <p:nvGrpSpPr>
+        <p:cNvPr id="1" name=""/>
+        <p:cNvGrpSpPr/>
+        <p:nvPr/>
+      </p:nvGrpSpPr>
+      <p:grpSpPr>
+        <a:xfrm>
+          <a:off x="0" y="0"/>
+          <a:ext cx="0" cy="0"/>
+          <a:chOff x="0" y="0"/>
+          <a:chExt cx="0" cy="0"/>
+        </a:xfrm>
+      </p:grpSpPr>
+      <p:sp>
+        <p:nvSpPr>
+          <p:cNvPr id="2" name="Foliennummernplatzhalter 1">
+            <a:extLst>
+              <a:ext uri="{FF2B5EF4-FFF2-40B4-BE49-F238E27FC236}">
+                <a16:creationId xmlns:a16="http://schemas.microsoft.com/office/drawing/2014/main" id="{935BE36D-9786-474B-8B37-699633B82ED3}"/>
+              </a:ext>
+            </a:extLst>
+          </p:cNvPr>
+          <p:cNvSpPr>
+            <a:spLocks noGrp="1"/>
+          </p:cNvSpPr>
+          <p:nvPr>
+            <p:ph type="sldNum" sz="quarter" idx="4"/>
+          </p:nvPr>
+        </p:nvSpPr>
+        <p:spPr/>
+        <p:txBody>
+          <a:bodyPr/>
+          <a:lstStyle/>
+          <a:p>
+            <a:fld id="{90CB4078-9F56-DD45-BCAD-AB9C14C5FED1}" type="slidenum">
+              <a:rPr lang="de-DE" smtClean="0"/>
+              <a:pPr/>
+              <a:t>7</a:t>
             </a:fld>
             <a:endParaRPr lang="de-DE" sz="1400" dirty="0"/>
           </a:p>
@@ -14507,7 +14829,7 @@
 </p:sld>
 </file>
 
-<file path=ppt/slides/slide7.xml><?xml version="1.0" encoding="utf-8"?>
+<file path=ppt/slides/slide8.xml><?xml version="1.0" encoding="utf-8"?>
 <p:sld xmlns:a="http://schemas.openxmlformats.org/drawingml/2006/main" xmlns:r="http://schemas.openxmlformats.org/officeDocument/2006/relationships" xmlns:p="http://schemas.openxmlformats.org/presentationml/2006/main">
   <p:cSld>
     <p:spTree>
@@ -14548,7 +14870,7 @@
             <a:fld id="{90CB4078-9F56-DD45-BCAD-AB9C14C5FED1}" type="slidenum">
               <a:rPr lang="de-DE" smtClean="0"/>
               <a:pPr/>
-              <a:t>7</a:t>
+              <a:t>8</a:t>
             </a:fld>
             <a:endParaRPr lang="de-DE" sz="1400" dirty="0"/>
           </a:p>
@@ -14830,7 +15152,7 @@
 </p:sld>
 </file>
 
-<file path=ppt/slides/slide8.xml><?xml version="1.0" encoding="utf-8"?>
+<file path=ppt/slides/slide9.xml><?xml version="1.0" encoding="utf-8"?>
 <p:sld xmlns:a="http://schemas.openxmlformats.org/drawingml/2006/main" xmlns:r="http://schemas.openxmlformats.org/officeDocument/2006/relationships" xmlns:p="http://schemas.openxmlformats.org/presentationml/2006/main">
   <p:cSld>
     <p:spTree>
@@ -14871,7 +15193,7 @@
             <a:fld id="{90CB4078-9F56-DD45-BCAD-AB9C14C5FED1}" type="slidenum">
               <a:rPr lang="de-DE" smtClean="0"/>
               <a:pPr/>
-              <a:t>8</a:t>
+              <a:t>9</a:t>
             </a:fld>
             <a:endParaRPr lang="de-DE" sz="1400" dirty="0"/>
           </a:p>
@@ -15174,333 +15496,6 @@
     <p:extLst>
       <p:ext uri="{BB962C8B-B14F-4D97-AF65-F5344CB8AC3E}">
         <p14:creationId xmlns:p14="http://schemas.microsoft.com/office/powerpoint/2010/main" val="1240023609"/>
-      </p:ext>
-    </p:extLst>
-  </p:cSld>
-  <p:clrMapOvr>
-    <a:masterClrMapping/>
-  </p:clrMapOvr>
-</p:sld>
-</file>
-
-<file path=ppt/slides/slide9.xml><?xml version="1.0" encoding="utf-8"?>
-<p:sld xmlns:a="http://schemas.openxmlformats.org/drawingml/2006/main" xmlns:r="http://schemas.openxmlformats.org/officeDocument/2006/relationships" xmlns:p="http://schemas.openxmlformats.org/presentationml/2006/main">
-  <p:cSld>
-    <p:spTree>
-      <p:nvGrpSpPr>
-        <p:cNvPr id="1" name=""/>
-        <p:cNvGrpSpPr/>
-        <p:nvPr/>
-      </p:nvGrpSpPr>
-      <p:grpSpPr>
-        <a:xfrm>
-          <a:off x="0" y="0"/>
-          <a:ext cx="0" cy="0"/>
-          <a:chOff x="0" y="0"/>
-          <a:chExt cx="0" cy="0"/>
-        </a:xfrm>
-      </p:grpSpPr>
-      <p:sp>
-        <p:nvSpPr>
-          <p:cNvPr id="2" name="Foliennummernplatzhalter 1">
-            <a:extLst>
-              <a:ext uri="{FF2B5EF4-FFF2-40B4-BE49-F238E27FC236}">
-                <a16:creationId xmlns:a16="http://schemas.microsoft.com/office/drawing/2014/main" id="{935BE36D-9786-474B-8B37-699633B82ED3}"/>
-              </a:ext>
-            </a:extLst>
-          </p:cNvPr>
-          <p:cNvSpPr>
-            <a:spLocks noGrp="1"/>
-          </p:cNvSpPr>
-          <p:nvPr>
-            <p:ph type="sldNum" sz="quarter" idx="4"/>
-          </p:nvPr>
-        </p:nvSpPr>
-        <p:spPr/>
-        <p:txBody>
-          <a:bodyPr/>
-          <a:lstStyle/>
-          <a:p>
-            <a:fld id="{90CB4078-9F56-DD45-BCAD-AB9C14C5FED1}" type="slidenum">
-              <a:rPr lang="de-DE" smtClean="0"/>
-              <a:pPr/>
-              <a:t>9</a:t>
-            </a:fld>
-            <a:endParaRPr lang="de-DE" sz="1400" dirty="0"/>
-          </a:p>
-        </p:txBody>
-      </p:sp>
-      <p:sp>
-        <p:nvSpPr>
-          <p:cNvPr id="3" name="Textfeld 2">
-            <a:extLst>
-              <a:ext uri="{FF2B5EF4-FFF2-40B4-BE49-F238E27FC236}">
-                <a16:creationId xmlns:a16="http://schemas.microsoft.com/office/drawing/2014/main" id="{BD6B9D4F-AF02-214B-AF6C-D228B7DE0A6E}"/>
-              </a:ext>
-            </a:extLst>
-          </p:cNvPr>
-          <p:cNvSpPr txBox="1"/>
-          <p:nvPr/>
-        </p:nvSpPr>
-        <p:spPr>
-          <a:xfrm>
-            <a:off x="1243173" y="267127"/>
-            <a:ext cx="7541231" cy="430887"/>
-          </a:xfrm>
-          <a:prstGeom prst="rect">
-            <a:avLst/>
-          </a:prstGeom>
-          <a:noFill/>
-        </p:spPr>
-        <p:txBody>
-          <a:bodyPr wrap="square" rtlCol="0">
-            <a:spAutoFit/>
-          </a:bodyPr>
-          <a:lstStyle/>
-          <a:p>
-            <a:pPr algn="ctr"/>
-            <a:r>
-              <a:rPr lang="de-DE" sz="2200" dirty="0"/>
-              <a:t>3. Project </a:t>
-            </a:r>
-            <a:r>
-              <a:rPr lang="de-DE" sz="2200" dirty="0" err="1"/>
-              <a:t>management</a:t>
-            </a:r>
-            <a:r>
-              <a:rPr lang="de-DE" sz="2200" dirty="0"/>
-              <a:t> </a:t>
-            </a:r>
-            <a:r>
-              <a:rPr lang="de-DE" sz="2200" dirty="0" err="1"/>
-              <a:t>and</a:t>
-            </a:r>
-            <a:r>
-              <a:rPr lang="de-DE" sz="2200" dirty="0"/>
-              <a:t> </a:t>
-            </a:r>
-            <a:r>
-              <a:rPr lang="de-DE" sz="2200" dirty="0" err="1"/>
-              <a:t>approach</a:t>
-            </a:r>
-            <a:endParaRPr lang="de-DE" sz="2200" dirty="0"/>
-          </a:p>
-        </p:txBody>
-      </p:sp>
-      <p:sp>
-        <p:nvSpPr>
-          <p:cNvPr id="4" name="Rectangle 4">
-            <a:extLst>
-              <a:ext uri="{FF2B5EF4-FFF2-40B4-BE49-F238E27FC236}">
-                <a16:creationId xmlns:a16="http://schemas.microsoft.com/office/drawing/2014/main" id="{F57316E5-6B89-F241-8AE3-17754E5811B3}"/>
-              </a:ext>
-            </a:extLst>
-          </p:cNvPr>
-          <p:cNvSpPr>
-            <a:spLocks noChangeArrowheads="1"/>
-          </p:cNvSpPr>
-          <p:nvPr/>
-        </p:nvSpPr>
-        <p:spPr bwMode="auto">
-          <a:xfrm>
-            <a:off x="914400" y="1287480"/>
-            <a:ext cx="9144000" cy="0"/>
-          </a:xfrm>
-          <a:prstGeom prst="rect">
-            <a:avLst/>
-          </a:prstGeom>
-          <a:noFill/>
-          <a:ln>
-            <a:noFill/>
-          </a:ln>
-          <a:effectLst/>
-          <a:extLst>
-            <a:ext uri="{909E8E84-426E-40DD-AFC4-6F175D3DCCD1}">
-              <a14:hiddenFill xmlns:a14="http://schemas.microsoft.com/office/drawing/2010/main">
-                <a:solidFill>
-                  <a:schemeClr val="accent1"/>
-                </a:solidFill>
-              </a14:hiddenFill>
-            </a:ext>
-            <a:ext uri="{91240B29-F687-4F45-9708-019B960494DF}">
-              <a14:hiddenLine xmlns:a14="http://schemas.microsoft.com/office/drawing/2010/main" w="9525">
-                <a:solidFill>
-                  <a:schemeClr val="tx1"/>
-                </a:solidFill>
-                <a:miter lim="800000"/>
-                <a:headEnd/>
-                <a:tailEnd/>
-              </a14:hiddenLine>
-            </a:ext>
-            <a:ext uri="{AF507438-7753-43E0-B8FC-AC1667EBCBE1}">
-              <a14:hiddenEffects xmlns:a14="http://schemas.microsoft.com/office/drawing/2010/main">
-                <a:effectLst>
-                  <a:outerShdw dist="35921" dir="2700000" algn="ctr" rotWithShape="0">
-                    <a:schemeClr val="bg2"/>
-                  </a:outerShdw>
-                </a:effectLst>
-              </a14:hiddenEffects>
-            </a:ext>
-          </a:extLst>
-        </p:spPr>
-        <p:txBody>
-          <a:bodyPr vert="horz" wrap="none" lIns="91440" tIns="45720" rIns="91440" bIns="45720" numCol="1" anchor="ctr" anchorCtr="0" compatLnSpc="1">
-            <a:prstTxWarp prst="textNoShape">
-              <a:avLst/>
-            </a:prstTxWarp>
-            <a:spAutoFit/>
-          </a:bodyPr>
-          <a:lstStyle/>
-          <a:p>
-            <a:endParaRPr lang="de-DE"/>
-          </a:p>
-        </p:txBody>
-      </p:sp>
-      <p:pic>
-        <p:nvPicPr>
-          <p:cNvPr id="1026" name="Picture 2" descr="Anklicken für Vergrößerung">
-            <a:extLst>
-              <a:ext uri="{FF2B5EF4-FFF2-40B4-BE49-F238E27FC236}">
-                <a16:creationId xmlns:a16="http://schemas.microsoft.com/office/drawing/2014/main" id="{9094F91D-4FA3-8D4C-B360-3B8B01B0518A}"/>
-              </a:ext>
-            </a:extLst>
-          </p:cNvPr>
-          <p:cNvPicPr>
-            <a:picLocks noChangeAspect="1" noChangeArrowheads="1"/>
-          </p:cNvPicPr>
-          <p:nvPr/>
-        </p:nvPicPr>
-        <p:blipFill>
-          <a:blip r:embed="rId2">
-            <a:extLst>
-              <a:ext uri="{28A0092B-C50C-407E-A947-70E740481C1C}">
-                <a14:useLocalDpi xmlns:a14="http://schemas.microsoft.com/office/drawing/2010/main" val="0"/>
-              </a:ext>
-            </a:extLst>
-          </a:blip>
-          <a:srcRect/>
-          <a:stretch>
-            <a:fillRect/>
-          </a:stretch>
-        </p:blipFill>
-        <p:spPr bwMode="auto">
-          <a:xfrm>
-            <a:off x="1509983" y="1443927"/>
-            <a:ext cx="5907958" cy="3970145"/>
-          </a:xfrm>
-          <a:prstGeom prst="rect">
-            <a:avLst/>
-          </a:prstGeom>
-          <a:noFill/>
-          <a:extLst>
-            <a:ext uri="{909E8E84-426E-40DD-AFC4-6F175D3DCCD1}">
-              <a14:hiddenFill xmlns:a14="http://schemas.microsoft.com/office/drawing/2010/main">
-                <a:solidFill>
-                  <a:srgbClr val="FFFFFF"/>
-                </a:solidFill>
-              </a14:hiddenFill>
-            </a:ext>
-          </a:extLst>
-        </p:spPr>
-      </p:pic>
-      <p:sp>
-        <p:nvSpPr>
-          <p:cNvPr id="5" name="Textfeld 4">
-            <a:extLst>
-              <a:ext uri="{FF2B5EF4-FFF2-40B4-BE49-F238E27FC236}">
-                <a16:creationId xmlns:a16="http://schemas.microsoft.com/office/drawing/2014/main" id="{B1630FE8-6DF2-6B49-B892-74F44C67E8CE}"/>
-              </a:ext>
-            </a:extLst>
-          </p:cNvPr>
-          <p:cNvSpPr txBox="1"/>
-          <p:nvPr/>
-        </p:nvSpPr>
-        <p:spPr>
-          <a:xfrm>
-            <a:off x="1509983" y="5506538"/>
-            <a:ext cx="5907957" cy="369332"/>
-          </a:xfrm>
-          <a:prstGeom prst="rect">
-            <a:avLst/>
-          </a:prstGeom>
-          <a:noFill/>
-        </p:spPr>
-        <p:txBody>
-          <a:bodyPr wrap="square" rtlCol="0">
-            <a:spAutoFit/>
-          </a:bodyPr>
-          <a:lstStyle/>
-          <a:p>
-            <a:pPr algn="ctr"/>
-            <a:r>
-              <a:rPr lang="de-DE" dirty="0"/>
-              <a:t>Torsten Horn (</a:t>
-            </a:r>
-            <a:r>
-              <a:rPr lang="de-DE" dirty="0" err="1"/>
-              <a:t>ed</a:t>
-            </a:r>
-            <a:r>
-              <a:rPr lang="de-DE" dirty="0"/>
-              <a:t>.)</a:t>
-            </a:r>
-          </a:p>
-        </p:txBody>
-      </p:sp>
-      <p:sp>
-        <p:nvSpPr>
-          <p:cNvPr id="7" name="Textfeld 6">
-            <a:extLst>
-              <a:ext uri="{FF2B5EF4-FFF2-40B4-BE49-F238E27FC236}">
-                <a16:creationId xmlns:a16="http://schemas.microsoft.com/office/drawing/2014/main" id="{BC99AA30-942B-B045-BACC-31A7EA37ECE8}"/>
-              </a:ext>
-            </a:extLst>
-          </p:cNvPr>
-          <p:cNvSpPr txBox="1"/>
-          <p:nvPr/>
-        </p:nvSpPr>
-        <p:spPr>
-          <a:xfrm>
-            <a:off x="7162814" y="1339141"/>
-            <a:ext cx="942405" cy="518910"/>
-          </a:xfrm>
-          <a:prstGeom prst="rect">
-            <a:avLst/>
-          </a:prstGeom>
-          <a:solidFill>
-            <a:schemeClr val="bg1"/>
-          </a:solidFill>
-          <a:ln>
-            <a:solidFill>
-              <a:schemeClr val="tx1"/>
-            </a:solidFill>
-          </a:ln>
-          <a:effectLst>
-            <a:outerShdw blurRad="50800" dist="38100" dir="2700000" algn="tl" rotWithShape="0">
-              <a:prstClr val="black">
-                <a:alpha val="40000"/>
-              </a:prstClr>
-            </a:outerShdw>
-          </a:effectLst>
-        </p:spPr>
-        <p:txBody>
-          <a:bodyPr wrap="square" rtlCol="0" anchor="ctr" anchorCtr="0">
-            <a:noAutofit/>
-          </a:bodyPr>
-          <a:lstStyle/>
-          <a:p>
-            <a:pPr algn="ctr"/>
-            <a:r>
-              <a:rPr lang="de-DE" sz="2000" dirty="0"/>
-              <a:t>RUP</a:t>
-            </a:r>
-          </a:p>
-        </p:txBody>
-      </p:sp>
-    </p:spTree>
-    <p:extLst>
-      <p:ext uri="{BB962C8B-B14F-4D97-AF65-F5344CB8AC3E}">
-        <p14:creationId xmlns:p14="http://schemas.microsoft.com/office/powerpoint/2010/main" val="1516665296"/>
       </p:ext>
     </p:extLst>
   </p:cSld>

</xml_diff>

<commit_message>
Updated Team Roles in Final Presentation
</commit_message>
<xml_diff>
--- a/Documentation/Final/Final_PPt_BFFL.pptx
+++ b/Documentation/Final/Final_PPt_BFFL.pptx
@@ -149,6 +149,35 @@
     </p:ext>
   </p:extLst>
 </p:presentation>
+</file>
+
+<file path=ppt/changesInfos/changesInfo1.xml><?xml version="1.0" encoding="utf-8"?>
+<pc:chgInfo xmlns:a="http://schemas.openxmlformats.org/drawingml/2006/main" xmlns:r="http://schemas.openxmlformats.org/officeDocument/2006/relationships" xmlns:ac="http://schemas.microsoft.com/office/drawing/2013/main/command" xmlns:pc="http://schemas.microsoft.com/office/powerpoint/2013/main/command">
+  <pc:docChgLst>
+    <pc:chgData name="Schaefer, Bastian (DI FA CTR COS-P&amp;ST)" userId="987e7b83-fb5f-4b8d-8d4a-f46c3642afbc" providerId="ADAL" clId="{26E15116-65C0-4910-B924-436AC7EFC5BD}"/>
+    <pc:docChg chg="undo custSel modSld">
+      <pc:chgData name="Schaefer, Bastian (DI FA CTR COS-P&amp;ST)" userId="987e7b83-fb5f-4b8d-8d4a-f46c3642afbc" providerId="ADAL" clId="{26E15116-65C0-4910-B924-436AC7EFC5BD}" dt="2021-06-18T09:52:20.697" v="132" actId="20577"/>
+      <pc:docMkLst>
+        <pc:docMk/>
+      </pc:docMkLst>
+      <pc:sldChg chg="modSp mod">
+        <pc:chgData name="Schaefer, Bastian (DI FA CTR COS-P&amp;ST)" userId="987e7b83-fb5f-4b8d-8d4a-f46c3642afbc" providerId="ADAL" clId="{26E15116-65C0-4910-B924-436AC7EFC5BD}" dt="2021-06-18T09:52:20.697" v="132" actId="20577"/>
+        <pc:sldMkLst>
+          <pc:docMk/>
+          <pc:sldMk cId="4078138942" sldId="259"/>
+        </pc:sldMkLst>
+        <pc:spChg chg="mod">
+          <ac:chgData name="Schaefer, Bastian (DI FA CTR COS-P&amp;ST)" userId="987e7b83-fb5f-4b8d-8d4a-f46c3642afbc" providerId="ADAL" clId="{26E15116-65C0-4910-B924-436AC7EFC5BD}" dt="2021-06-18T09:52:20.697" v="132" actId="20577"/>
+          <ac:spMkLst>
+            <pc:docMk/>
+            <pc:sldMk cId="4078138942" sldId="259"/>
+            <ac:spMk id="7" creationId="{15278564-DF98-A64E-829D-790774920688}"/>
+          </ac:spMkLst>
+        </pc:spChg>
+      </pc:sldChg>
+    </pc:docChg>
+  </pc:docChgLst>
+</pc:chgInfo>
 </file>
 
 <file path=ppt/charts/chart1.xml><?xml version="1.0" encoding="utf-8"?>
@@ -1427,7 +1456,7 @@
           <a:p>
             <a:fld id="{063E352A-7D20-8B43-87E5-0D9E60B473DC}" type="datetimeFigureOut">
               <a:rPr lang="de-DE" smtClean="0"/>
-              <a:t>17.06.21</a:t>
+              <a:t>18.06.2021</a:t>
             </a:fld>
             <a:endParaRPr lang="de-DE"/>
           </a:p>
@@ -8135,8 +8164,8 @@
         </p:nvSpPr>
         <p:spPr>
           <a:xfrm>
-            <a:off x="899962" y="1629372"/>
-            <a:ext cx="7344076" cy="3599256"/>
+            <a:off x="899961" y="1629372"/>
+            <a:ext cx="7541231" cy="3599256"/>
           </a:xfrm>
           <a:prstGeom prst="rect">
             <a:avLst/>
@@ -8156,43 +8185,23 @@
             </a:pPr>
             <a:r>
               <a:rPr lang="de-DE" sz="2200" b="1" dirty="0"/>
-              <a:t>Felix </a:t>
+              <a:t>Lars </a:t>
             </a:r>
             <a:r>
               <a:rPr lang="de-DE" sz="2200" b="1" dirty="0" err="1"/>
-              <a:t>Hirschel</a:t>
-            </a:r>
-            <a:r>
-              <a:rPr lang="de-DE" sz="2200" b="1" dirty="0"/>
-              <a:t> 			</a:t>
+              <a:t>Hudalla</a:t>
             </a:r>
             <a:r>
               <a:rPr lang="de-DE" sz="2200" dirty="0"/>
-              <a:t>(</a:t>
+              <a:t> 			(Project Manager, </a:t>
             </a:r>
             <a:r>
               <a:rPr lang="de-DE" sz="2200" dirty="0" err="1"/>
-              <a:t>Full</a:t>
+              <a:t>Implementer</a:t>
             </a:r>
             <a:r>
               <a:rPr lang="de-DE" sz="2200" dirty="0"/>
-              <a:t> Stack Development </a:t>
-            </a:r>
-            <a:r>
-              <a:rPr lang="de-DE" sz="2200" dirty="0" err="1"/>
-              <a:t>and</a:t>
-            </a:r>
-            <a:r>
-              <a:rPr lang="de-DE" sz="2200" dirty="0"/>
-              <a:t> </a:t>
-            </a:r>
-            <a:r>
-              <a:rPr lang="de-DE" sz="2200" dirty="0" err="1"/>
-              <a:t>Testing</a:t>
-            </a:r>
-            <a:r>
-              <a:rPr lang="de-DE" sz="2200" dirty="0"/>
-              <a:t>)</a:t>
+              <a:t>) </a:t>
             </a:r>
           </a:p>
           <a:p>
@@ -8203,31 +8212,11 @@
             </a:pPr>
             <a:r>
               <a:rPr lang="de-DE" sz="2200" b="1" dirty="0"/>
-              <a:t>Lars </a:t>
-            </a:r>
-            <a:r>
-              <a:rPr lang="de-DE" sz="2200" b="1" dirty="0" err="1"/>
-              <a:t>Hudalla</a:t>
+              <a:t>Felix Hirschel 			</a:t>
             </a:r>
             <a:r>
               <a:rPr lang="de-DE" sz="2200" dirty="0"/>
-              <a:t> 			(</a:t>
-            </a:r>
-            <a:r>
-              <a:rPr lang="de-DE" sz="2200" dirty="0" err="1"/>
-              <a:t>Full</a:t>
-            </a:r>
-            <a:r>
-              <a:rPr lang="de-DE" sz="2200" dirty="0"/>
-              <a:t> Stack Development </a:t>
-            </a:r>
-            <a:r>
-              <a:rPr lang="de-DE" sz="2200" dirty="0" err="1"/>
-              <a:t>and</a:t>
-            </a:r>
-            <a:r>
-              <a:rPr lang="de-DE" sz="2200" dirty="0"/>
-              <a:t> PM)</a:t>
+              <a:t>(Designer, Test Designer)</a:t>
             </a:r>
             <a:br>
               <a:rPr lang="de-DE" sz="2200" dirty="0"/>
@@ -8238,23 +8227,15 @@
             </a:r>
             <a:r>
               <a:rPr lang="de-DE" sz="2200" dirty="0"/>
-              <a:t> 		(</a:t>
+              <a:t> 		(Designer, </a:t>
             </a:r>
             <a:r>
               <a:rPr lang="de-DE" sz="2200" dirty="0" err="1"/>
-              <a:t>Full</a:t>
+              <a:t>Implementer</a:t>
             </a:r>
             <a:r>
               <a:rPr lang="de-DE" sz="2200" dirty="0"/>
-              <a:t> Stack Development </a:t>
-            </a:r>
-            <a:r>
-              <a:rPr lang="de-DE" sz="2200" dirty="0" err="1"/>
-              <a:t>and</a:t>
-            </a:r>
-            <a:r>
-              <a:rPr lang="de-DE" sz="2200" dirty="0"/>
-              <a:t> Design)</a:t>
+              <a:t>)</a:t>
             </a:r>
             <a:br>
               <a:rPr lang="de-DE" sz="2200" dirty="0"/>
@@ -8269,27 +8250,27 @@
             </a:r>
             <a:r>
               <a:rPr lang="de-DE" sz="2200" dirty="0"/>
-              <a:t> 		(</a:t>
+              <a:t> 		(Tool </a:t>
             </a:r>
             <a:r>
               <a:rPr lang="de-DE" sz="2200" dirty="0" err="1"/>
-              <a:t>Full</a:t>
+              <a:t>Specialist</a:t>
             </a:r>
             <a:r>
               <a:rPr lang="de-DE" sz="2200" dirty="0"/>
-              <a:t> Stack Development </a:t>
+              <a:t>, </a:t>
             </a:r>
             <a:r>
               <a:rPr lang="de-DE" sz="2200" dirty="0" err="1"/>
-              <a:t>and</a:t>
+              <a:t>Requirements</a:t>
             </a:r>
             <a:r>
               <a:rPr lang="de-DE" sz="2200" dirty="0"/>
-              <a:t> DEV </a:t>
+              <a:t> </a:t>
             </a:r>
             <a:r>
               <a:rPr lang="de-DE" sz="2200" dirty="0" err="1"/>
-              <a:t>Ops</a:t>
+              <a:t>Specifier</a:t>
             </a:r>
             <a:r>
               <a:rPr lang="de-DE" sz="2200" dirty="0"/>

</xml_diff>